<commit_message>
done asynch and removed synch
</commit_message>
<xml_diff>
--- a/health/userDocs/UniboFigs.pptx
+++ b/health/userDocs/UniboFigs.pptx
@@ -20,10 +20,11 @@
     <p:sldId id="270" r:id="rId14"/>
     <p:sldId id="272" r:id="rId15"/>
     <p:sldId id="277" r:id="rId16"/>
-    <p:sldId id="273" r:id="rId17"/>
-    <p:sldId id="274" r:id="rId18"/>
-    <p:sldId id="275" r:id="rId19"/>
-    <p:sldId id="276" r:id="rId20"/>
+    <p:sldId id="278" r:id="rId17"/>
+    <p:sldId id="273" r:id="rId18"/>
+    <p:sldId id="274" r:id="rId19"/>
+    <p:sldId id="275" r:id="rId20"/>
+    <p:sldId id="276" r:id="rId21"/>
   </p:sldIdLst>
   <p:sldSz cx="9144000" cy="6858000" type="screen4x3"/>
   <p:notesSz cx="6858000" cy="9144000"/>
@@ -124,7 +125,7 @@
   </p:defaultTextStyle>
   <p:extLst>
     <p:ext uri="{EFAFB233-063F-42B5-8137-9DF3F51BA10A}">
-      <p15:sldGuideLst xmlns="" xmlns:p15="http://schemas.microsoft.com/office/powerpoint/2012/main">
+      <p15:sldGuideLst xmlns:p15="http://schemas.microsoft.com/office/powerpoint/2012/main" xmlns="">
         <p15:guide id="1" orient="horz" pos="2160">
           <p15:clr>
             <a:srgbClr val="A4A3A4"/>
@@ -322,7 +323,7 @@
           <a:p>
             <a:fld id="{486DFF9D-000F-417D-A1D1-C441A4010B1E}" type="datetimeFigureOut">
               <a:rPr lang="en-GB" smtClean="0"/>
-              <a:t>14/08/2020</a:t>
+              <a:t>20/08/2020</a:t>
             </a:fld>
             <a:endParaRPr lang="en-GB"/>
           </a:p>
@@ -492,7 +493,7 @@
           <a:p>
             <a:fld id="{486DFF9D-000F-417D-A1D1-C441A4010B1E}" type="datetimeFigureOut">
               <a:rPr lang="en-GB" smtClean="0"/>
-              <a:t>14/08/2020</a:t>
+              <a:t>20/08/2020</a:t>
             </a:fld>
             <a:endParaRPr lang="en-GB"/>
           </a:p>
@@ -672,7 +673,7 @@
           <a:p>
             <a:fld id="{486DFF9D-000F-417D-A1D1-C441A4010B1E}" type="datetimeFigureOut">
               <a:rPr lang="en-GB" smtClean="0"/>
-              <a:t>14/08/2020</a:t>
+              <a:t>20/08/2020</a:t>
             </a:fld>
             <a:endParaRPr lang="en-GB"/>
           </a:p>
@@ -842,7 +843,7 @@
           <a:p>
             <a:fld id="{486DFF9D-000F-417D-A1D1-C441A4010B1E}" type="datetimeFigureOut">
               <a:rPr lang="en-GB" smtClean="0"/>
-              <a:t>14/08/2020</a:t>
+              <a:t>20/08/2020</a:t>
             </a:fld>
             <a:endParaRPr lang="en-GB"/>
           </a:p>
@@ -1088,7 +1089,7 @@
           <a:p>
             <a:fld id="{486DFF9D-000F-417D-A1D1-C441A4010B1E}" type="datetimeFigureOut">
               <a:rPr lang="en-GB" smtClean="0"/>
-              <a:t>14/08/2020</a:t>
+              <a:t>20/08/2020</a:t>
             </a:fld>
             <a:endParaRPr lang="en-GB"/>
           </a:p>
@@ -1376,7 +1377,7 @@
           <a:p>
             <a:fld id="{486DFF9D-000F-417D-A1D1-C441A4010B1E}" type="datetimeFigureOut">
               <a:rPr lang="en-GB" smtClean="0"/>
-              <a:t>14/08/2020</a:t>
+              <a:t>20/08/2020</a:t>
             </a:fld>
             <a:endParaRPr lang="en-GB"/>
           </a:p>
@@ -1798,7 +1799,7 @@
           <a:p>
             <a:fld id="{486DFF9D-000F-417D-A1D1-C441A4010B1E}" type="datetimeFigureOut">
               <a:rPr lang="en-GB" smtClean="0"/>
-              <a:t>14/08/2020</a:t>
+              <a:t>20/08/2020</a:t>
             </a:fld>
             <a:endParaRPr lang="en-GB"/>
           </a:p>
@@ -1916,7 +1917,7 @@
           <a:p>
             <a:fld id="{486DFF9D-000F-417D-A1D1-C441A4010B1E}" type="datetimeFigureOut">
               <a:rPr lang="en-GB" smtClean="0"/>
-              <a:t>14/08/2020</a:t>
+              <a:t>20/08/2020</a:t>
             </a:fld>
             <a:endParaRPr lang="en-GB"/>
           </a:p>
@@ -2011,7 +2012,7 @@
           <a:p>
             <a:fld id="{486DFF9D-000F-417D-A1D1-C441A4010B1E}" type="datetimeFigureOut">
               <a:rPr lang="en-GB" smtClean="0"/>
-              <a:t>14/08/2020</a:t>
+              <a:t>20/08/2020</a:t>
             </a:fld>
             <a:endParaRPr lang="en-GB"/>
           </a:p>
@@ -2288,7 +2289,7 @@
           <a:p>
             <a:fld id="{486DFF9D-000F-417D-A1D1-C441A4010B1E}" type="datetimeFigureOut">
               <a:rPr lang="en-GB" smtClean="0"/>
-              <a:t>14/08/2020</a:t>
+              <a:t>20/08/2020</a:t>
             </a:fld>
             <a:endParaRPr lang="en-GB"/>
           </a:p>
@@ -2541,7 +2542,7 @@
           <a:p>
             <a:fld id="{486DFF9D-000F-417D-A1D1-C441A4010B1E}" type="datetimeFigureOut">
               <a:rPr lang="en-GB" smtClean="0"/>
-              <a:t>14/08/2020</a:t>
+              <a:t>20/08/2020</a:t>
             </a:fld>
             <a:endParaRPr lang="en-GB"/>
           </a:p>
@@ -2754,7 +2755,7 @@
           <a:p>
             <a:fld id="{486DFF9D-000F-417D-A1D1-C441A4010B1E}" type="datetimeFigureOut">
               <a:rPr lang="en-GB" smtClean="0"/>
-              <a:t>14/08/2020</a:t>
+              <a:t>20/08/2020</a:t>
             </a:fld>
             <a:endParaRPr lang="en-GB"/>
           </a:p>
@@ -6171,7 +6172,7 @@
           <p:cNvPr id="12" name="TextBox 45">
             <a:extLst>
               <a:ext uri="{FF2B5EF4-FFF2-40B4-BE49-F238E27FC236}">
-                <a16:creationId xmlns="" xmlns:a16="http://schemas.microsoft.com/office/drawing/2014/main" id="{6BDA7693-CA76-4C97-8FED-A4A65AB5032B}"/>
+                <a16:creationId xmlns:a16="http://schemas.microsoft.com/office/drawing/2014/main" xmlns="" id="{6BDA7693-CA76-4C97-8FED-A4A65AB5032B}"/>
               </a:ext>
             </a:extLst>
           </p:cNvPr>
@@ -7719,7 +7720,7 @@
           <p:cNvPr id="12" name="TextBox 45">
             <a:extLst>
               <a:ext uri="{FF2B5EF4-FFF2-40B4-BE49-F238E27FC236}">
-                <a16:creationId xmlns="" xmlns:a16="http://schemas.microsoft.com/office/drawing/2014/main" id="{6BDA7693-CA76-4C97-8FED-A4A65AB5032B}"/>
+                <a16:creationId xmlns:a16="http://schemas.microsoft.com/office/drawing/2014/main" xmlns="" id="{6BDA7693-CA76-4C97-8FED-A4A65AB5032B}"/>
               </a:ext>
             </a:extLst>
           </p:cNvPr>
@@ -9732,7 +9733,7 @@
           <p:cNvPr id="6" name="TextBox 45">
             <a:extLst>
               <a:ext uri="{FF2B5EF4-FFF2-40B4-BE49-F238E27FC236}">
-                <a16:creationId xmlns="" xmlns:a16="http://schemas.microsoft.com/office/drawing/2014/main" id="{6BDA7693-CA76-4C97-8FED-A4A65AB5032B}"/>
+                <a16:creationId xmlns:a16="http://schemas.microsoft.com/office/drawing/2014/main" xmlns="" id="{6BDA7693-CA76-4C97-8FED-A4A65AB5032B}"/>
               </a:ext>
             </a:extLst>
           </p:cNvPr>
@@ -10240,7 +10241,7 @@
           <p:cNvPr id="27" name="TextBox 45">
             <a:extLst>
               <a:ext uri="{FF2B5EF4-FFF2-40B4-BE49-F238E27FC236}">
-                <a16:creationId xmlns="" xmlns:a16="http://schemas.microsoft.com/office/drawing/2014/main" id="{6BDA7693-CA76-4C97-8FED-A4A65AB5032B}"/>
+                <a16:creationId xmlns:a16="http://schemas.microsoft.com/office/drawing/2014/main" xmlns="" id="{6BDA7693-CA76-4C97-8FED-A4A65AB5032B}"/>
               </a:ext>
             </a:extLst>
           </p:cNvPr>
@@ -10276,7 +10277,7 @@
           <p:cNvPr id="28" name="TextBox 45">
             <a:extLst>
               <a:ext uri="{FF2B5EF4-FFF2-40B4-BE49-F238E27FC236}">
-                <a16:creationId xmlns="" xmlns:a16="http://schemas.microsoft.com/office/drawing/2014/main" id="{6BDA7693-CA76-4C97-8FED-A4A65AB5032B}"/>
+                <a16:creationId xmlns:a16="http://schemas.microsoft.com/office/drawing/2014/main" xmlns="" id="{6BDA7693-CA76-4C97-8FED-A4A65AB5032B}"/>
               </a:ext>
             </a:extLst>
           </p:cNvPr>
@@ -11824,7 +11825,7 @@
           <p:cNvPr id="6" name="TextBox 45">
             <a:extLst>
               <a:ext uri="{FF2B5EF4-FFF2-40B4-BE49-F238E27FC236}">
-                <a16:creationId xmlns="" xmlns:a16="http://schemas.microsoft.com/office/drawing/2014/main" id="{6BDA7693-CA76-4C97-8FED-A4A65AB5032B}"/>
+                <a16:creationId xmlns:a16="http://schemas.microsoft.com/office/drawing/2014/main" xmlns="" id="{6BDA7693-CA76-4C97-8FED-A4A65AB5032B}"/>
               </a:ext>
             </a:extLst>
           </p:cNvPr>
@@ -13179,7 +13180,7 @@
           <p:cNvPr id="2" name="TextBox 45">
             <a:extLst>
               <a:ext uri="{FF2B5EF4-FFF2-40B4-BE49-F238E27FC236}">
-                <a16:creationId xmlns="" xmlns:a16="http://schemas.microsoft.com/office/drawing/2014/main" id="{6BDA7693-CA76-4C97-8FED-A4A65AB5032B}"/>
+                <a16:creationId xmlns:a16="http://schemas.microsoft.com/office/drawing/2014/main" xmlns="" id="{6BDA7693-CA76-4C97-8FED-A4A65AB5032B}"/>
               </a:ext>
             </a:extLst>
           </p:cNvPr>
@@ -13757,7 +13758,6 @@
               <a:rPr lang="it-IT" dirty="0" smtClean="0"/>
               <a:t> </a:t>
             </a:r>
-            <a:endParaRPr lang="it-IT" dirty="0" smtClean="0"/>
           </a:p>
         </p:txBody>
       </p:sp>
@@ -14143,7 +14143,6 @@
               <a:rPr lang="it-IT" dirty="0" smtClean="0"/>
               <a:t> </a:t>
             </a:r>
-            <a:endParaRPr lang="it-IT" dirty="0" smtClean="0"/>
           </a:p>
         </p:txBody>
       </p:sp>
@@ -14152,7 +14151,7 @@
           <p:cNvPr id="34" name="TextBox 45">
             <a:extLst>
               <a:ext uri="{FF2B5EF4-FFF2-40B4-BE49-F238E27FC236}">
-                <a16:creationId xmlns="" xmlns:a16="http://schemas.microsoft.com/office/drawing/2014/main" id="{6BDA7693-CA76-4C97-8FED-A4A65AB5032B}"/>
+                <a16:creationId xmlns:a16="http://schemas.microsoft.com/office/drawing/2014/main" xmlns="" id="{6BDA7693-CA76-4C97-8FED-A4A65AB5032B}"/>
               </a:ext>
             </a:extLst>
           </p:cNvPr>
@@ -15692,64 +15691,2576 @@
           <a:chExt cx="0" cy="0"/>
         </a:xfrm>
       </p:grpSpPr>
-      <p:pic>
-        <p:nvPicPr>
-          <p:cNvPr id="1027" name="Picture 3"/>
-          <p:cNvPicPr>
-            <a:picLocks noChangeAspect="1" noChangeArrowheads="1"/>
-          </p:cNvPicPr>
-          <p:nvPr/>
-        </p:nvPicPr>
-        <p:blipFill>
-          <a:blip r:embed="rId2">
+      <p:cxnSp>
+        <p:nvCxnSpPr>
+          <p:cNvPr id="117" name="Connettore 1 116"/>
+          <p:cNvCxnSpPr/>
+          <p:nvPr/>
+        </p:nvCxnSpPr>
+        <p:spPr>
+          <a:xfrm flipH="1">
+            <a:off x="4821060" y="599368"/>
+            <a:ext cx="103835" cy="6069992"/>
+          </a:xfrm>
+          <a:prstGeom prst="line">
+            <a:avLst/>
+          </a:prstGeom>
+        </p:spPr>
+        <p:style>
+          <a:lnRef idx="1">
+            <a:schemeClr val="accent1"/>
+          </a:lnRef>
+          <a:fillRef idx="0">
+            <a:schemeClr val="accent1"/>
+          </a:fillRef>
+          <a:effectRef idx="0">
+            <a:schemeClr val="accent1"/>
+          </a:effectRef>
+          <a:fontRef idx="minor">
+            <a:schemeClr val="tx1"/>
+          </a:fontRef>
+        </p:style>
+      </p:cxnSp>
+      <p:sp>
+        <p:nvSpPr>
+          <p:cNvPr id="2" name="TextBox 45">
             <a:extLst>
-              <a:ext uri="{28A0092B-C50C-407E-A947-70E740481C1C}">
-                <a14:useLocalDpi xmlns:a14="http://schemas.microsoft.com/office/drawing/2010/main" val="0"/>
+              <a:ext uri="{FF2B5EF4-FFF2-40B4-BE49-F238E27FC236}">
+                <a16:creationId xmlns:a16="http://schemas.microsoft.com/office/drawing/2014/main" xmlns="" id="{6BDA7693-CA76-4C97-8FED-A4A65AB5032B}"/>
               </a:ext>
             </a:extLst>
-          </a:blip>
-          <a:srcRect/>
-          <a:stretch>
-            <a:fillRect/>
-          </a:stretch>
-        </p:blipFill>
-        <p:spPr bwMode="auto">
-          <a:xfrm>
-            <a:off x="1252538" y="1119188"/>
-            <a:ext cx="6638925" cy="4619625"/>
+          </p:cNvPr>
+          <p:cNvSpPr txBox="1"/>
+          <p:nvPr/>
+        </p:nvSpPr>
+        <p:spPr>
+          <a:xfrm>
+            <a:off x="2006916" y="373306"/>
+            <a:ext cx="1568443" cy="369332"/>
           </a:xfrm>
           <a:prstGeom prst="rect">
             <a:avLst/>
           </a:prstGeom>
           <a:noFill/>
+        </p:spPr>
+        <p:txBody>
+          <a:bodyPr wrap="none" rtlCol="0">
+            <a:spAutoFit/>
+          </a:bodyPr>
+          <a:lstStyle/>
+          <a:p>
+            <a:r>
+              <a:rPr lang="en-US" b="1" dirty="0" err="1" smtClean="0"/>
+              <a:t>HealthProduct</a:t>
+            </a:r>
+            <a:endParaRPr lang="en-US" b="1" dirty="0"/>
+          </a:p>
+        </p:txBody>
+      </p:sp>
+      <p:grpSp>
+        <p:nvGrpSpPr>
+          <p:cNvPr id="3" name="Gruppo 2"/>
+          <p:cNvGrpSpPr/>
+          <p:nvPr/>
+        </p:nvGrpSpPr>
+        <p:grpSpPr>
+          <a:xfrm>
+            <a:off x="944709" y="764704"/>
+            <a:ext cx="4347370" cy="4213779"/>
+            <a:chOff x="565700" y="4940367"/>
+            <a:chExt cx="805955" cy="772447"/>
+          </a:xfrm>
+        </p:grpSpPr>
+        <p:sp>
+          <p:nvSpPr>
+            <p:cNvPr id="4" name="Ovale 3"/>
+            <p:cNvSpPr/>
+            <p:nvPr/>
+          </p:nvSpPr>
+          <p:spPr>
+            <a:xfrm>
+              <a:off x="565700" y="4983583"/>
+              <a:ext cx="805955" cy="729231"/>
+            </a:xfrm>
+            <a:prstGeom prst="ellipse">
+              <a:avLst/>
+            </a:prstGeom>
+            <a:ln/>
+          </p:spPr>
+          <p:style>
+            <a:lnRef idx="1">
+              <a:schemeClr val="accent4"/>
+            </a:lnRef>
+            <a:fillRef idx="2">
+              <a:schemeClr val="accent4"/>
+            </a:fillRef>
+            <a:effectRef idx="1">
+              <a:schemeClr val="accent4"/>
+            </a:effectRef>
+            <a:fontRef idx="minor">
+              <a:schemeClr val="dk1"/>
+            </a:fontRef>
+          </p:style>
+          <p:txBody>
+            <a:bodyPr rtlCol="0" anchor="ctr"/>
+            <a:lstStyle/>
+            <a:p>
+              <a:pPr algn="ctr"/>
+              <a:r>
+                <a:rPr lang="en-GB" sz="1200" dirty="0"/>
+                <a:t> </a:t>
+              </a:r>
+            </a:p>
+          </p:txBody>
+        </p:sp>
+        <p:sp>
+          <p:nvSpPr>
+            <p:cNvPr id="5" name="Triangolo isoscele 4"/>
+            <p:cNvSpPr/>
+            <p:nvPr/>
+          </p:nvSpPr>
+          <p:spPr>
+            <a:xfrm rot="16200000">
+              <a:off x="905299" y="4913952"/>
+              <a:ext cx="86434" cy="139263"/>
+            </a:xfrm>
+            <a:prstGeom prst="triangle">
+              <a:avLst/>
+            </a:prstGeom>
+            <a:solidFill>
+              <a:srgbClr val="C00000"/>
+            </a:solidFill>
+            <a:ln/>
+          </p:spPr>
+          <p:style>
+            <a:lnRef idx="1">
+              <a:schemeClr val="accent5"/>
+            </a:lnRef>
+            <a:fillRef idx="2">
+              <a:schemeClr val="accent5"/>
+            </a:fillRef>
+            <a:effectRef idx="1">
+              <a:schemeClr val="accent5"/>
+            </a:effectRef>
+            <a:fontRef idx="minor">
+              <a:schemeClr val="dk1"/>
+            </a:fontRef>
+          </p:style>
+          <p:txBody>
+            <a:bodyPr rtlCol="0" anchor="ctr"/>
+            <a:lstStyle/>
+            <a:p>
+              <a:pPr algn="ctr"/>
+              <a:endParaRPr lang="en-GB" sz="1200">
+                <a:solidFill>
+                  <a:schemeClr val="dk1"/>
+                </a:solidFill>
+              </a:endParaRPr>
+            </a:p>
+          </p:txBody>
+        </p:sp>
+      </p:grpSp>
+      <p:sp>
+        <p:nvSpPr>
+          <p:cNvPr id="6" name="Ovale 5"/>
+          <p:cNvSpPr/>
+          <p:nvPr/>
+        </p:nvSpPr>
+        <p:spPr>
+          <a:xfrm>
+            <a:off x="1953589" y="1316865"/>
+            <a:ext cx="2160240" cy="1007945"/>
+          </a:xfrm>
+          <a:prstGeom prst="ellipse">
+            <a:avLst/>
+          </a:prstGeom>
+        </p:spPr>
+        <p:style>
+          <a:lnRef idx="1">
+            <a:schemeClr val="accent5"/>
+          </a:lnRef>
+          <a:fillRef idx="2">
+            <a:schemeClr val="accent5"/>
+          </a:fillRef>
+          <a:effectRef idx="1">
+            <a:schemeClr val="accent5"/>
+          </a:effectRef>
+          <a:fontRef idx="minor">
+            <a:schemeClr val="dk1"/>
+          </a:fontRef>
+        </p:style>
+        <p:txBody>
+          <a:bodyPr rtlCol="0" anchor="ctr"/>
+          <a:lstStyle/>
+          <a:p>
+            <a:pPr algn="ctr"/>
+            <a:r>
+              <a:rPr lang="en-GB" sz="1600" dirty="0" err="1" smtClean="0"/>
+              <a:t>HealthService</a:t>
+            </a:r>
+            <a:endParaRPr lang="en-GB" sz="1600" dirty="0" smtClean="0"/>
+          </a:p>
+          <a:p>
+            <a:pPr algn="ctr"/>
+            <a:r>
+              <a:rPr lang="it-IT" sz="1600" dirty="0" smtClean="0"/>
+              <a:t>(</a:t>
+            </a:r>
+            <a:r>
+              <a:rPr lang="it-IT" sz="1600" dirty="0" err="1" smtClean="0"/>
+              <a:t>BusinessLogic</a:t>
+            </a:r>
+            <a:r>
+              <a:rPr lang="it-IT" sz="1600" dirty="0" smtClean="0"/>
+              <a:t>)</a:t>
+            </a:r>
+            <a:endParaRPr lang="en-GB" sz="1600" dirty="0"/>
+          </a:p>
+        </p:txBody>
+      </p:sp>
+      <p:sp>
+        <p:nvSpPr>
+          <p:cNvPr id="7" name="Ovale 6"/>
+          <p:cNvSpPr/>
+          <p:nvPr/>
+        </p:nvSpPr>
+        <p:spPr>
+          <a:xfrm>
+            <a:off x="2676914" y="3819357"/>
+            <a:ext cx="2247981" cy="807067"/>
+          </a:xfrm>
+          <a:prstGeom prst="ellipse">
+            <a:avLst/>
+          </a:prstGeom>
+        </p:spPr>
+        <p:style>
+          <a:lnRef idx="1">
+            <a:schemeClr val="accent5"/>
+          </a:lnRef>
+          <a:fillRef idx="2">
+            <a:schemeClr val="accent5"/>
+          </a:fillRef>
+          <a:effectRef idx="1">
+            <a:schemeClr val="accent5"/>
+          </a:effectRef>
+          <a:fontRef idx="minor">
+            <a:schemeClr val="dk1"/>
+          </a:fontRef>
+        </p:style>
+        <p:txBody>
+          <a:bodyPr rtlCol="0" anchor="ctr"/>
+          <a:lstStyle/>
+          <a:p>
+            <a:pPr algn="ctr"/>
+            <a:r>
+              <a:rPr lang="en-GB" sz="1600" dirty="0" err="1">
+                <a:cs typeface="Arial" panose="020B0604020202020204" pitchFamily="34" charset="0"/>
+              </a:rPr>
+              <a:t>FhirServiceClient</a:t>
+            </a:r>
+            <a:endParaRPr lang="en-GB" sz="1600" dirty="0">
+              <a:cs typeface="Arial" panose="020B0604020202020204" pitchFamily="34" charset="0"/>
+            </a:endParaRPr>
+          </a:p>
+        </p:txBody>
+      </p:sp>
+      <p:cxnSp>
+        <p:nvCxnSpPr>
+          <p:cNvPr id="9" name="Connettore 2 8"/>
+          <p:cNvCxnSpPr>
+            <a:stCxn id="40" idx="4"/>
+            <a:endCxn id="7" idx="0"/>
+          </p:cNvCxnSpPr>
+          <p:nvPr/>
+        </p:nvCxnSpPr>
+        <p:spPr>
+          <a:xfrm flipH="1">
+            <a:off x="3800905" y="2905213"/>
+            <a:ext cx="196917" cy="914144"/>
+          </a:xfrm>
+          <a:prstGeom prst="straightConnector1">
+            <a:avLst/>
+          </a:prstGeom>
           <a:ln>
-            <a:noFill/>
+            <a:tailEnd type="arrow"/>
           </a:ln>
-          <a:extLst>
-            <a:ext uri="{909E8E84-426E-40DD-AFC4-6F175D3DCCD1}">
-              <a14:hiddenFill xmlns:a14="http://schemas.microsoft.com/office/drawing/2010/main">
+        </p:spPr>
+        <p:style>
+          <a:lnRef idx="1">
+            <a:schemeClr val="accent1"/>
+          </a:lnRef>
+          <a:fillRef idx="0">
+            <a:schemeClr val="accent1"/>
+          </a:fillRef>
+          <a:effectRef idx="0">
+            <a:schemeClr val="accent1"/>
+          </a:effectRef>
+          <a:fontRef idx="minor">
+            <a:schemeClr val="tx1"/>
+          </a:fontRef>
+        </p:style>
+      </p:cxnSp>
+      <p:sp>
+        <p:nvSpPr>
+          <p:cNvPr id="10" name="Ovale 9"/>
+          <p:cNvSpPr/>
+          <p:nvPr/>
+        </p:nvSpPr>
+        <p:spPr>
+          <a:xfrm>
+            <a:off x="5687070" y="1412775"/>
+            <a:ext cx="3122339" cy="793693"/>
+          </a:xfrm>
+          <a:prstGeom prst="ellipse">
+            <a:avLst/>
+          </a:prstGeom>
+        </p:spPr>
+        <p:style>
+          <a:lnRef idx="1">
+            <a:schemeClr val="accent5"/>
+          </a:lnRef>
+          <a:fillRef idx="2">
+            <a:schemeClr val="accent5"/>
+          </a:fillRef>
+          <a:effectRef idx="1">
+            <a:schemeClr val="accent5"/>
+          </a:effectRef>
+          <a:fontRef idx="minor">
+            <a:schemeClr val="dk1"/>
+          </a:fontRef>
+        </p:style>
+        <p:txBody>
+          <a:bodyPr rtlCol="0" anchor="ctr"/>
+          <a:lstStyle/>
+          <a:p>
+            <a:pPr algn="ctr"/>
+            <a:r>
+              <a:rPr lang="en-GB" sz="1600" dirty="0" err="1"/>
+              <a:t>HealthServiceFhirUsage</a:t>
+            </a:r>
+            <a:endParaRPr lang="en-GB" sz="1600" dirty="0"/>
+          </a:p>
+        </p:txBody>
+      </p:sp>
+      <p:cxnSp>
+        <p:nvCxnSpPr>
+          <p:cNvPr id="12" name="Connettore 2 11"/>
+          <p:cNvCxnSpPr>
+            <a:stCxn id="10" idx="2"/>
+            <a:endCxn id="40" idx="7"/>
+          </p:cNvCxnSpPr>
+          <p:nvPr/>
+        </p:nvCxnSpPr>
+        <p:spPr>
+          <a:xfrm flipH="1">
+            <a:off x="4821060" y="1809622"/>
+            <a:ext cx="866010" cy="580260"/>
+          </a:xfrm>
+          <a:prstGeom prst="straightConnector1">
+            <a:avLst/>
+          </a:prstGeom>
+          <a:ln>
+            <a:tailEnd type="arrow"/>
+          </a:ln>
+        </p:spPr>
+        <p:style>
+          <a:lnRef idx="1">
+            <a:schemeClr val="accent1"/>
+          </a:lnRef>
+          <a:fillRef idx="0">
+            <a:schemeClr val="accent1"/>
+          </a:fillRef>
+          <a:effectRef idx="0">
+            <a:schemeClr val="accent1"/>
+          </a:effectRef>
+          <a:fontRef idx="minor">
+            <a:schemeClr val="tx1"/>
+          </a:fontRef>
+        </p:style>
+      </p:cxnSp>
+      <p:grpSp>
+        <p:nvGrpSpPr>
+          <p:cNvPr id="13" name="Gruppo 12"/>
+          <p:cNvGrpSpPr/>
+          <p:nvPr/>
+        </p:nvGrpSpPr>
+        <p:grpSpPr>
+          <a:xfrm>
+            <a:off x="4977454" y="4342781"/>
+            <a:ext cx="666895" cy="86434"/>
+            <a:chOff x="4592177" y="4419530"/>
+            <a:chExt cx="666895" cy="86434"/>
+          </a:xfrm>
+        </p:grpSpPr>
+        <p:cxnSp>
+          <p:nvCxnSpPr>
+            <p:cNvPr id="14" name="Connettore 1 13"/>
+            <p:cNvCxnSpPr/>
+            <p:nvPr/>
+          </p:nvCxnSpPr>
+          <p:spPr>
+            <a:xfrm>
+              <a:off x="4611000" y="4462747"/>
+              <a:ext cx="648072" cy="0"/>
+            </a:xfrm>
+            <a:prstGeom prst="line">
+              <a:avLst/>
+            </a:prstGeom>
+            <a:ln>
+              <a:prstDash val="dash"/>
+            </a:ln>
+          </p:spPr>
+          <p:style>
+            <a:lnRef idx="1">
+              <a:schemeClr val="accent1"/>
+            </a:lnRef>
+            <a:fillRef idx="0">
+              <a:schemeClr val="accent1"/>
+            </a:fillRef>
+            <a:effectRef idx="0">
+              <a:schemeClr val="accent1"/>
+            </a:effectRef>
+            <a:fontRef idx="minor">
+              <a:schemeClr val="tx1"/>
+            </a:fontRef>
+          </p:style>
+        </p:cxnSp>
+        <p:sp>
+          <p:nvSpPr>
+            <p:cNvPr id="15" name="Triangolo isoscele 14"/>
+            <p:cNvSpPr/>
+            <p:nvPr/>
+          </p:nvSpPr>
+          <p:spPr>
+            <a:xfrm rot="16200000">
+              <a:off x="4618592" y="4393115"/>
+              <a:ext cx="86434" cy="139263"/>
+            </a:xfrm>
+            <a:prstGeom prst="triangle">
+              <a:avLst/>
+            </a:prstGeom>
+            <a:solidFill>
+              <a:schemeClr val="bg1"/>
+            </a:solidFill>
+            <a:ln/>
+          </p:spPr>
+          <p:style>
+            <a:lnRef idx="1">
+              <a:schemeClr val="accent5"/>
+            </a:lnRef>
+            <a:fillRef idx="2">
+              <a:schemeClr val="accent5"/>
+            </a:fillRef>
+            <a:effectRef idx="1">
+              <a:schemeClr val="accent5"/>
+            </a:effectRef>
+            <a:fontRef idx="minor">
+              <a:schemeClr val="dk1"/>
+            </a:fontRef>
+          </p:style>
+          <p:txBody>
+            <a:bodyPr rtlCol="0" anchor="ctr"/>
+            <a:lstStyle/>
+            <a:p>
+              <a:pPr algn="ctr"/>
+              <a:endParaRPr lang="en-GB" sz="1200"/>
+            </a:p>
+          </p:txBody>
+        </p:sp>
+      </p:grpSp>
+      <p:grpSp>
+        <p:nvGrpSpPr>
+          <p:cNvPr id="16" name="Gruppo 15"/>
+          <p:cNvGrpSpPr/>
+          <p:nvPr/>
+        </p:nvGrpSpPr>
+        <p:grpSpPr>
+          <a:xfrm>
+            <a:off x="4969367" y="4146576"/>
+            <a:ext cx="787334" cy="86434"/>
+            <a:chOff x="3452446" y="4176616"/>
+            <a:chExt cx="787334" cy="86434"/>
+          </a:xfrm>
+        </p:grpSpPr>
+        <p:sp>
+          <p:nvSpPr>
+            <p:cNvPr id="17" name="Triangolo isoscele 16"/>
+            <p:cNvSpPr/>
+            <p:nvPr/>
+          </p:nvSpPr>
+          <p:spPr>
+            <a:xfrm rot="5400000" flipH="1">
+              <a:off x="4126932" y="4150201"/>
+              <a:ext cx="86434" cy="139263"/>
+            </a:xfrm>
+            <a:prstGeom prst="triangle">
+              <a:avLst/>
+            </a:prstGeom>
+            <a:solidFill>
+              <a:schemeClr val="bg1"/>
+            </a:solidFill>
+            <a:ln/>
+          </p:spPr>
+          <p:style>
+            <a:lnRef idx="1">
+              <a:schemeClr val="accent5"/>
+            </a:lnRef>
+            <a:fillRef idx="2">
+              <a:schemeClr val="accent5"/>
+            </a:fillRef>
+            <a:effectRef idx="1">
+              <a:schemeClr val="accent5"/>
+            </a:effectRef>
+            <a:fontRef idx="minor">
+              <a:schemeClr val="dk1"/>
+            </a:fontRef>
+          </p:style>
+          <p:txBody>
+            <a:bodyPr rtlCol="0" anchor="ctr"/>
+            <a:lstStyle/>
+            <a:p>
+              <a:pPr algn="ctr"/>
+              <a:endParaRPr lang="en-GB" sz="1200"/>
+            </a:p>
+          </p:txBody>
+        </p:sp>
+        <p:cxnSp>
+          <p:nvCxnSpPr>
+            <p:cNvPr id="18" name="Connettore 1 17"/>
+            <p:cNvCxnSpPr>
+              <a:endCxn id="17" idx="3"/>
+            </p:cNvCxnSpPr>
+            <p:nvPr/>
+          </p:nvCxnSpPr>
+          <p:spPr>
+            <a:xfrm>
+              <a:off x="3452446" y="4219627"/>
+              <a:ext cx="648072" cy="206"/>
+            </a:xfrm>
+            <a:prstGeom prst="line">
+              <a:avLst/>
+            </a:prstGeom>
+          </p:spPr>
+          <p:style>
+            <a:lnRef idx="1">
+              <a:schemeClr val="accent1"/>
+            </a:lnRef>
+            <a:fillRef idx="0">
+              <a:schemeClr val="accent1"/>
+            </a:fillRef>
+            <a:effectRef idx="0">
+              <a:schemeClr val="accent1"/>
+            </a:effectRef>
+            <a:fontRef idx="minor">
+              <a:schemeClr val="tx1"/>
+            </a:fontRef>
+          </p:style>
+        </p:cxnSp>
+      </p:grpSp>
+      <p:sp>
+        <p:nvSpPr>
+          <p:cNvPr id="19" name="CasellaDiTesto 18"/>
+          <p:cNvSpPr txBox="1"/>
+          <p:nvPr/>
+        </p:nvSpPr>
+        <p:spPr>
+          <a:xfrm>
+            <a:off x="4787441" y="4515670"/>
+            <a:ext cx="1202380" cy="369332"/>
+          </a:xfrm>
+          <a:prstGeom prst="rect">
+            <a:avLst/>
+          </a:prstGeom>
+        </p:spPr>
+        <p:style>
+          <a:lnRef idx="1">
+            <a:schemeClr val="accent3"/>
+          </a:lnRef>
+          <a:fillRef idx="2">
+            <a:schemeClr val="accent3"/>
+          </a:fillRef>
+          <a:effectRef idx="1">
+            <a:schemeClr val="accent3"/>
+          </a:effectRef>
+          <a:fontRef idx="minor">
+            <a:schemeClr val="dk1"/>
+          </a:fontRef>
+        </p:style>
+        <p:txBody>
+          <a:bodyPr wrap="none" rtlCol="0">
+            <a:spAutoFit/>
+          </a:bodyPr>
+          <a:lstStyle/>
+          <a:p>
+            <a:r>
+              <a:rPr lang="it-IT" dirty="0" smtClean="0"/>
+              <a:t>M2M </a:t>
+            </a:r>
+            <a:r>
+              <a:rPr lang="it-IT" dirty="0" err="1" smtClean="0"/>
+              <a:t>Rest</a:t>
+            </a:r>
+            <a:r>
+              <a:rPr lang="it-IT" dirty="0" smtClean="0"/>
+              <a:t> </a:t>
+            </a:r>
+          </a:p>
+        </p:txBody>
+      </p:sp>
+      <p:grpSp>
+        <p:nvGrpSpPr>
+          <p:cNvPr id="20" name="Gruppo 19"/>
+          <p:cNvGrpSpPr/>
+          <p:nvPr/>
+        </p:nvGrpSpPr>
+        <p:grpSpPr>
+          <a:xfrm>
+            <a:off x="6459193" y="3926578"/>
+            <a:ext cx="805955" cy="772447"/>
+            <a:chOff x="565700" y="4940367"/>
+            <a:chExt cx="805955" cy="772447"/>
+          </a:xfrm>
+        </p:grpSpPr>
+        <p:sp>
+          <p:nvSpPr>
+            <p:cNvPr id="21" name="Ovale 20"/>
+            <p:cNvSpPr/>
+            <p:nvPr/>
+          </p:nvSpPr>
+          <p:spPr>
+            <a:xfrm>
+              <a:off x="565700" y="4983583"/>
+              <a:ext cx="805955" cy="729231"/>
+            </a:xfrm>
+            <a:prstGeom prst="ellipse">
+              <a:avLst/>
+            </a:prstGeom>
+            <a:solidFill>
+              <a:srgbClr val="FF99CC"/>
+            </a:solidFill>
+          </p:spPr>
+          <p:style>
+            <a:lnRef idx="2">
+              <a:schemeClr val="accent1">
+                <a:shade val="50000"/>
+              </a:schemeClr>
+            </a:lnRef>
+            <a:fillRef idx="1">
+              <a:schemeClr val="accent1"/>
+            </a:fillRef>
+            <a:effectRef idx="0">
+              <a:schemeClr val="accent1"/>
+            </a:effectRef>
+            <a:fontRef idx="minor">
+              <a:schemeClr val="lt1"/>
+            </a:fontRef>
+          </p:style>
+          <p:txBody>
+            <a:bodyPr rtlCol="0" anchor="ctr"/>
+            <a:lstStyle/>
+            <a:p>
+              <a:pPr algn="ctr"/>
+              <a:r>
+                <a:rPr lang="en-GB" dirty="0">
+                  <a:solidFill>
+                    <a:schemeClr val="lt1"/>
+                  </a:solidFill>
+                </a:rPr>
+                <a:t> </a:t>
+              </a:r>
+            </a:p>
+          </p:txBody>
+        </p:sp>
+        <p:sp>
+          <p:nvSpPr>
+            <p:cNvPr id="22" name="Triangolo isoscele 21"/>
+            <p:cNvSpPr/>
+            <p:nvPr/>
+          </p:nvSpPr>
+          <p:spPr>
+            <a:xfrm rot="16200000">
+              <a:off x="905299" y="4913952"/>
+              <a:ext cx="86434" cy="139263"/>
+            </a:xfrm>
+            <a:prstGeom prst="triangle">
+              <a:avLst/>
+            </a:prstGeom>
+            <a:solidFill>
+              <a:srgbClr val="FF99CC"/>
+            </a:solidFill>
+            <a:ln>
+              <a:solidFill>
+                <a:schemeClr val="tx1"/>
+              </a:solidFill>
+            </a:ln>
+          </p:spPr>
+          <p:style>
+            <a:lnRef idx="2">
+              <a:schemeClr val="accent1">
+                <a:shade val="50000"/>
+              </a:schemeClr>
+            </a:lnRef>
+            <a:fillRef idx="1">
+              <a:schemeClr val="accent1"/>
+            </a:fillRef>
+            <a:effectRef idx="0">
+              <a:schemeClr val="accent1"/>
+            </a:effectRef>
+            <a:fontRef idx="minor">
+              <a:schemeClr val="lt1"/>
+            </a:fontRef>
+          </p:style>
+          <p:txBody>
+            <a:bodyPr rtlCol="0" anchor="ctr"/>
+            <a:lstStyle/>
+            <a:p>
+              <a:pPr algn="ctr"/>
+              <a:endParaRPr lang="en-GB">
                 <a:solidFill>
-                  <a:schemeClr val="accent1"/>
+                  <a:schemeClr val="lt1"/>
                 </a:solidFill>
-              </a14:hiddenFill>
-            </a:ext>
-            <a:ext uri="{91240B29-F687-4F45-9708-019B960494DF}">
-              <a14:hiddenLine xmlns:a14="http://schemas.microsoft.com/office/drawing/2010/main" w="9525">
+              </a:endParaRPr>
+            </a:p>
+          </p:txBody>
+        </p:sp>
+      </p:grpSp>
+      <p:sp>
+        <p:nvSpPr>
+          <p:cNvPr id="23" name="Rettangolo 22"/>
+          <p:cNvSpPr/>
+          <p:nvPr/>
+        </p:nvSpPr>
+        <p:spPr>
+          <a:xfrm>
+            <a:off x="7418582" y="3982445"/>
+            <a:ext cx="1513428" cy="646331"/>
+          </a:xfrm>
+          <a:prstGeom prst="rect">
+            <a:avLst/>
+          </a:prstGeom>
+        </p:spPr>
+        <p:txBody>
+          <a:bodyPr wrap="none">
+            <a:spAutoFit/>
+          </a:bodyPr>
+          <a:lstStyle/>
+          <a:p>
+            <a:r>
+              <a:rPr lang="it-IT" b="1" dirty="0" err="1" smtClean="0"/>
+              <a:t>CentroHealth</a:t>
+            </a:r>
+            <a:r>
+              <a:rPr lang="it-IT" b="1" dirty="0" smtClean="0"/>
+              <a:t> </a:t>
+            </a:r>
+          </a:p>
+          <a:p>
+            <a:r>
+              <a:rPr lang="it-IT" dirty="0" smtClean="0"/>
+              <a:t>FHIR server</a:t>
+            </a:r>
+            <a:endParaRPr lang="en-GB" dirty="0"/>
+          </a:p>
+        </p:txBody>
+      </p:sp>
+      <p:grpSp>
+        <p:nvGrpSpPr>
+          <p:cNvPr id="26" name="Gruppo 25"/>
+          <p:cNvGrpSpPr/>
+          <p:nvPr/>
+        </p:nvGrpSpPr>
+        <p:grpSpPr>
+          <a:xfrm>
+            <a:off x="277814" y="1469556"/>
+            <a:ext cx="666895" cy="86434"/>
+            <a:chOff x="4592177" y="4419530"/>
+            <a:chExt cx="666895" cy="86434"/>
+          </a:xfrm>
+        </p:grpSpPr>
+        <p:cxnSp>
+          <p:nvCxnSpPr>
+            <p:cNvPr id="27" name="Connettore 1 26"/>
+            <p:cNvCxnSpPr/>
+            <p:nvPr/>
+          </p:nvCxnSpPr>
+          <p:spPr>
+            <a:xfrm>
+              <a:off x="4611000" y="4462747"/>
+              <a:ext cx="648072" cy="0"/>
+            </a:xfrm>
+            <a:prstGeom prst="line">
+              <a:avLst/>
+            </a:prstGeom>
+            <a:ln>
+              <a:prstDash val="dash"/>
+            </a:ln>
+          </p:spPr>
+          <p:style>
+            <a:lnRef idx="1">
+              <a:schemeClr val="accent1"/>
+            </a:lnRef>
+            <a:fillRef idx="0">
+              <a:schemeClr val="accent1"/>
+            </a:fillRef>
+            <a:effectRef idx="0">
+              <a:schemeClr val="accent1"/>
+            </a:effectRef>
+            <a:fontRef idx="minor">
+              <a:schemeClr val="tx1"/>
+            </a:fontRef>
+          </p:style>
+        </p:cxnSp>
+        <p:sp>
+          <p:nvSpPr>
+            <p:cNvPr id="28" name="Triangolo isoscele 27"/>
+            <p:cNvSpPr/>
+            <p:nvPr/>
+          </p:nvSpPr>
+          <p:spPr>
+            <a:xfrm rot="16200000">
+              <a:off x="4618592" y="4393115"/>
+              <a:ext cx="86434" cy="139263"/>
+            </a:xfrm>
+            <a:prstGeom prst="triangle">
+              <a:avLst/>
+            </a:prstGeom>
+            <a:solidFill>
+              <a:schemeClr val="bg1"/>
+            </a:solidFill>
+            <a:ln/>
+          </p:spPr>
+          <p:style>
+            <a:lnRef idx="1">
+              <a:schemeClr val="accent5"/>
+            </a:lnRef>
+            <a:fillRef idx="2">
+              <a:schemeClr val="accent5"/>
+            </a:fillRef>
+            <a:effectRef idx="1">
+              <a:schemeClr val="accent5"/>
+            </a:effectRef>
+            <a:fontRef idx="minor">
+              <a:schemeClr val="dk1"/>
+            </a:fontRef>
+          </p:style>
+          <p:txBody>
+            <a:bodyPr rtlCol="0" anchor="ctr"/>
+            <a:lstStyle/>
+            <a:p>
+              <a:pPr algn="ctr"/>
+              <a:endParaRPr lang="en-GB" sz="1200"/>
+            </a:p>
+          </p:txBody>
+        </p:sp>
+      </p:grpSp>
+      <p:grpSp>
+        <p:nvGrpSpPr>
+          <p:cNvPr id="29" name="Gruppo 28"/>
+          <p:cNvGrpSpPr/>
+          <p:nvPr/>
+        </p:nvGrpSpPr>
+        <p:grpSpPr>
+          <a:xfrm>
+            <a:off x="269727" y="1273351"/>
+            <a:ext cx="787334" cy="86434"/>
+            <a:chOff x="3452446" y="4176616"/>
+            <a:chExt cx="787334" cy="86434"/>
+          </a:xfrm>
+        </p:grpSpPr>
+        <p:sp>
+          <p:nvSpPr>
+            <p:cNvPr id="30" name="Triangolo isoscele 29"/>
+            <p:cNvSpPr/>
+            <p:nvPr/>
+          </p:nvSpPr>
+          <p:spPr>
+            <a:xfrm rot="5400000" flipH="1">
+              <a:off x="4126932" y="4150201"/>
+              <a:ext cx="86434" cy="139263"/>
+            </a:xfrm>
+            <a:prstGeom prst="triangle">
+              <a:avLst/>
+            </a:prstGeom>
+            <a:solidFill>
+              <a:schemeClr val="bg1"/>
+            </a:solidFill>
+            <a:ln/>
+          </p:spPr>
+          <p:style>
+            <a:lnRef idx="1">
+              <a:schemeClr val="accent5"/>
+            </a:lnRef>
+            <a:fillRef idx="2">
+              <a:schemeClr val="accent5"/>
+            </a:fillRef>
+            <a:effectRef idx="1">
+              <a:schemeClr val="accent5"/>
+            </a:effectRef>
+            <a:fontRef idx="minor">
+              <a:schemeClr val="dk1"/>
+            </a:fontRef>
+          </p:style>
+          <p:txBody>
+            <a:bodyPr rtlCol="0" anchor="ctr"/>
+            <a:lstStyle/>
+            <a:p>
+              <a:pPr algn="ctr"/>
+              <a:endParaRPr lang="en-GB" sz="1200"/>
+            </a:p>
+          </p:txBody>
+        </p:sp>
+        <p:cxnSp>
+          <p:nvCxnSpPr>
+            <p:cNvPr id="31" name="Connettore 1 30"/>
+            <p:cNvCxnSpPr>
+              <a:endCxn id="30" idx="3"/>
+            </p:cNvCxnSpPr>
+            <p:nvPr/>
+          </p:nvCxnSpPr>
+          <p:spPr>
+            <a:xfrm>
+              <a:off x="3452446" y="4219627"/>
+              <a:ext cx="648072" cy="206"/>
+            </a:xfrm>
+            <a:prstGeom prst="line">
+              <a:avLst/>
+            </a:prstGeom>
+          </p:spPr>
+          <p:style>
+            <a:lnRef idx="1">
+              <a:schemeClr val="accent1"/>
+            </a:lnRef>
+            <a:fillRef idx="0">
+              <a:schemeClr val="accent1"/>
+            </a:fillRef>
+            <a:effectRef idx="0">
+              <a:schemeClr val="accent1"/>
+            </a:effectRef>
+            <a:fontRef idx="minor">
+              <a:schemeClr val="tx1"/>
+            </a:fontRef>
+          </p:style>
+        </p:cxnSp>
+      </p:grpSp>
+      <p:sp>
+        <p:nvSpPr>
+          <p:cNvPr id="32" name="CasellaDiTesto 31"/>
+          <p:cNvSpPr txBox="1"/>
+          <p:nvPr/>
+        </p:nvSpPr>
+        <p:spPr>
+          <a:xfrm>
+            <a:off x="269727" y="1654996"/>
+            <a:ext cx="1202380" cy="369332"/>
+          </a:xfrm>
+          <a:prstGeom prst="rect">
+            <a:avLst/>
+          </a:prstGeom>
+        </p:spPr>
+        <p:style>
+          <a:lnRef idx="1">
+            <a:schemeClr val="accent3"/>
+          </a:lnRef>
+          <a:fillRef idx="2">
+            <a:schemeClr val="accent3"/>
+          </a:fillRef>
+          <a:effectRef idx="1">
+            <a:schemeClr val="accent3"/>
+          </a:effectRef>
+          <a:fontRef idx="minor">
+            <a:schemeClr val="dk1"/>
+          </a:fontRef>
+        </p:style>
+        <p:txBody>
+          <a:bodyPr wrap="none" rtlCol="0">
+            <a:spAutoFit/>
+          </a:bodyPr>
+          <a:lstStyle/>
+          <a:p>
+            <a:r>
+              <a:rPr lang="it-IT" dirty="0" smtClean="0"/>
+              <a:t>M2M </a:t>
+            </a:r>
+            <a:r>
+              <a:rPr lang="it-IT" dirty="0" err="1" smtClean="0"/>
+              <a:t>Rest</a:t>
+            </a:r>
+            <a:r>
+              <a:rPr lang="it-IT" dirty="0" smtClean="0"/>
+              <a:t> </a:t>
+            </a:r>
+          </a:p>
+        </p:txBody>
+      </p:sp>
+      <p:sp>
+        <p:nvSpPr>
+          <p:cNvPr id="34" name="TextBox 45">
+            <a:extLst>
+              <a:ext uri="{FF2B5EF4-FFF2-40B4-BE49-F238E27FC236}">
+                <a16:creationId xmlns:a16="http://schemas.microsoft.com/office/drawing/2014/main" xmlns="" id="{6BDA7693-CA76-4C97-8FED-A4A65AB5032B}"/>
+              </a:ext>
+            </a:extLst>
+          </p:cNvPr>
+          <p:cNvSpPr txBox="1"/>
+          <p:nvPr/>
+        </p:nvSpPr>
+        <p:spPr>
+          <a:xfrm>
+            <a:off x="6244200" y="417111"/>
+            <a:ext cx="1548694" cy="369332"/>
+          </a:xfrm>
+          <a:prstGeom prst="rect">
+            <a:avLst/>
+          </a:prstGeom>
+          <a:noFill/>
+        </p:spPr>
+        <p:txBody>
+          <a:bodyPr wrap="none" rtlCol="0">
+            <a:spAutoFit/>
+          </a:bodyPr>
+          <a:lstStyle/>
+          <a:p>
+            <a:r>
+              <a:rPr lang="en-US" b="1" dirty="0" smtClean="0"/>
+              <a:t>Java programs</a:t>
+            </a:r>
+            <a:endParaRPr lang="en-US" b="1" dirty="0"/>
+          </a:p>
+        </p:txBody>
+      </p:sp>
+      <p:sp>
+        <p:nvSpPr>
+          <p:cNvPr id="40" name="Ovale 39"/>
+          <p:cNvSpPr/>
+          <p:nvPr/>
+        </p:nvSpPr>
+        <p:spPr>
+          <a:xfrm>
+            <a:off x="2833586" y="2301465"/>
+            <a:ext cx="2328471" cy="603748"/>
+          </a:xfrm>
+          <a:prstGeom prst="ellipse">
+            <a:avLst/>
+          </a:prstGeom>
+        </p:spPr>
+        <p:style>
+          <a:lnRef idx="1">
+            <a:schemeClr val="accent5"/>
+          </a:lnRef>
+          <a:fillRef idx="2">
+            <a:schemeClr val="accent5"/>
+          </a:fillRef>
+          <a:effectRef idx="1">
+            <a:schemeClr val="accent5"/>
+          </a:effectRef>
+          <a:fontRef idx="minor">
+            <a:schemeClr val="dk1"/>
+          </a:fontRef>
+        </p:style>
+        <p:txBody>
+          <a:bodyPr rtlCol="0" anchor="ctr"/>
+          <a:lstStyle/>
+          <a:p>
+            <a:pPr algn="ctr"/>
+            <a:r>
+              <a:rPr lang="en-GB" sz="1600" dirty="0" err="1"/>
+              <a:t>HealthServiceFhir</a:t>
+            </a:r>
+            <a:endParaRPr lang="en-GB" sz="1600" dirty="0">
+              <a:cs typeface="Arial" panose="020B0604020202020204" pitchFamily="34" charset="0"/>
+            </a:endParaRPr>
+          </a:p>
+        </p:txBody>
+      </p:sp>
+      <p:sp>
+        <p:nvSpPr>
+          <p:cNvPr id="48" name="Ovale 47"/>
+          <p:cNvSpPr/>
+          <p:nvPr/>
+        </p:nvSpPr>
+        <p:spPr>
+          <a:xfrm>
+            <a:off x="906319" y="2206468"/>
+            <a:ext cx="1927267" cy="603748"/>
+          </a:xfrm>
+          <a:prstGeom prst="ellipse">
+            <a:avLst/>
+          </a:prstGeom>
+        </p:spPr>
+        <p:style>
+          <a:lnRef idx="1">
+            <a:schemeClr val="accent5"/>
+          </a:lnRef>
+          <a:fillRef idx="2">
+            <a:schemeClr val="accent5"/>
+          </a:fillRef>
+          <a:effectRef idx="1">
+            <a:schemeClr val="accent5"/>
+          </a:effectRef>
+          <a:fontRef idx="minor">
+            <a:schemeClr val="dk1"/>
+          </a:fontRef>
+        </p:style>
+        <p:txBody>
+          <a:bodyPr rtlCol="0" anchor="ctr"/>
+          <a:lstStyle/>
+          <a:p>
+            <a:pPr algn="ctr"/>
+            <a:r>
+              <a:rPr lang="en-GB" sz="1200" dirty="0"/>
+              <a:t>HealthServiceHL7</a:t>
+            </a:r>
+            <a:endParaRPr lang="en-GB" sz="1200" dirty="0">
+              <a:cs typeface="Arial" panose="020B0604020202020204" pitchFamily="34" charset="0"/>
+            </a:endParaRPr>
+          </a:p>
+        </p:txBody>
+      </p:sp>
+      <p:cxnSp>
+        <p:nvCxnSpPr>
+          <p:cNvPr id="52" name="Connettore 2 51"/>
+          <p:cNvCxnSpPr>
+            <a:stCxn id="55" idx="2"/>
+            <a:endCxn id="7" idx="7"/>
+          </p:cNvCxnSpPr>
+          <p:nvPr/>
+        </p:nvCxnSpPr>
+        <p:spPr>
+          <a:xfrm flipH="1">
+            <a:off x="4595686" y="3096540"/>
+            <a:ext cx="1150349" cy="841009"/>
+          </a:xfrm>
+          <a:prstGeom prst="straightConnector1">
+            <a:avLst/>
+          </a:prstGeom>
+          <a:ln>
+            <a:tailEnd type="arrow"/>
+          </a:ln>
+        </p:spPr>
+        <p:style>
+          <a:lnRef idx="1">
+            <a:schemeClr val="accent1"/>
+          </a:lnRef>
+          <a:fillRef idx="0">
+            <a:schemeClr val="accent1"/>
+          </a:fillRef>
+          <a:effectRef idx="0">
+            <a:schemeClr val="accent1"/>
+          </a:effectRef>
+          <a:fontRef idx="minor">
+            <a:schemeClr val="tx1"/>
+          </a:fontRef>
+        </p:style>
+      </p:cxnSp>
+      <p:sp>
+        <p:nvSpPr>
+          <p:cNvPr id="55" name="Ovale 54"/>
+          <p:cNvSpPr/>
+          <p:nvPr/>
+        </p:nvSpPr>
+        <p:spPr>
+          <a:xfrm>
+            <a:off x="5746035" y="2699693"/>
+            <a:ext cx="3083816" cy="793693"/>
+          </a:xfrm>
+          <a:prstGeom prst="ellipse">
+            <a:avLst/>
+          </a:prstGeom>
+        </p:spPr>
+        <p:style>
+          <a:lnRef idx="1">
+            <a:schemeClr val="accent5"/>
+          </a:lnRef>
+          <a:fillRef idx="2">
+            <a:schemeClr val="accent5"/>
+          </a:fillRef>
+          <a:effectRef idx="1">
+            <a:schemeClr val="accent5"/>
+          </a:effectRef>
+          <a:fontRef idx="minor">
+            <a:schemeClr val="dk1"/>
+          </a:fontRef>
+        </p:style>
+        <p:txBody>
+          <a:bodyPr rtlCol="0" anchor="ctr"/>
+          <a:lstStyle/>
+          <a:p>
+            <a:pPr algn="ctr"/>
+            <a:r>
+              <a:rPr lang="en-GB" sz="1600" dirty="0" err="1"/>
+              <a:t>FhirServiceClientUsage</a:t>
+            </a:r>
+            <a:endParaRPr lang="en-GB" sz="1600" dirty="0"/>
+          </a:p>
+        </p:txBody>
+      </p:sp>
+      <p:cxnSp>
+        <p:nvCxnSpPr>
+          <p:cNvPr id="79" name="Connettore 2 78"/>
+          <p:cNvCxnSpPr/>
+          <p:nvPr/>
+        </p:nvCxnSpPr>
+        <p:spPr>
+          <a:xfrm flipH="1">
+            <a:off x="8388424" y="1613071"/>
+            <a:ext cx="13466" cy="393101"/>
+          </a:xfrm>
+          <a:prstGeom prst="straightConnector1">
+            <a:avLst/>
+          </a:prstGeom>
+          <a:ln>
+            <a:solidFill>
+              <a:srgbClr val="C00000"/>
+            </a:solidFill>
+            <a:tailEnd type="arrow"/>
+          </a:ln>
+        </p:spPr>
+        <p:style>
+          <a:lnRef idx="1">
+            <a:schemeClr val="accent1"/>
+          </a:lnRef>
+          <a:fillRef idx="0">
+            <a:schemeClr val="accent1"/>
+          </a:fillRef>
+          <a:effectRef idx="0">
+            <a:schemeClr val="accent1"/>
+          </a:effectRef>
+          <a:fontRef idx="minor">
+            <a:schemeClr val="tx1"/>
+          </a:fontRef>
+        </p:style>
+      </p:cxnSp>
+      <p:cxnSp>
+        <p:nvCxnSpPr>
+          <p:cNvPr id="80" name="Connettore 2 79"/>
+          <p:cNvCxnSpPr/>
+          <p:nvPr/>
+        </p:nvCxnSpPr>
+        <p:spPr>
+          <a:xfrm flipH="1">
+            <a:off x="8330062" y="2922083"/>
+            <a:ext cx="13466" cy="393101"/>
+          </a:xfrm>
+          <a:prstGeom prst="straightConnector1">
+            <a:avLst/>
+          </a:prstGeom>
+          <a:ln>
+            <a:solidFill>
+              <a:srgbClr val="C00000"/>
+            </a:solidFill>
+            <a:tailEnd type="arrow"/>
+          </a:ln>
+        </p:spPr>
+        <p:style>
+          <a:lnRef idx="1">
+            <a:schemeClr val="accent1"/>
+          </a:lnRef>
+          <a:fillRef idx="0">
+            <a:schemeClr val="accent1"/>
+          </a:fillRef>
+          <a:effectRef idx="0">
+            <a:schemeClr val="accent1"/>
+          </a:effectRef>
+          <a:fontRef idx="minor">
+            <a:schemeClr val="tx1"/>
+          </a:fontRef>
+        </p:style>
+      </p:cxnSp>
+      <p:cxnSp>
+        <p:nvCxnSpPr>
+          <p:cNvPr id="82" name="Connettore 1 81"/>
+          <p:cNvCxnSpPr>
+            <a:stCxn id="32" idx="3"/>
+            <a:endCxn id="6" idx="2"/>
+          </p:cNvCxnSpPr>
+          <p:nvPr/>
+        </p:nvCxnSpPr>
+        <p:spPr>
+          <a:xfrm flipV="1">
+            <a:off x="1472107" y="1820838"/>
+            <a:ext cx="481482" cy="18824"/>
+          </a:xfrm>
+          <a:prstGeom prst="line">
+            <a:avLst/>
+          </a:prstGeom>
+          <a:ln>
+            <a:prstDash val="dash"/>
+          </a:ln>
+        </p:spPr>
+        <p:style>
+          <a:lnRef idx="1">
+            <a:schemeClr val="accent1"/>
+          </a:lnRef>
+          <a:fillRef idx="0">
+            <a:schemeClr val="accent1"/>
+          </a:fillRef>
+          <a:effectRef idx="0">
+            <a:schemeClr val="accent1"/>
+          </a:effectRef>
+          <a:fontRef idx="minor">
+            <a:schemeClr val="tx1"/>
+          </a:fontRef>
+        </p:style>
+      </p:cxnSp>
+      <p:sp>
+        <p:nvSpPr>
+          <p:cNvPr id="83" name="Ovale 82"/>
+          <p:cNvSpPr/>
+          <p:nvPr/>
+        </p:nvSpPr>
+        <p:spPr>
+          <a:xfrm>
+            <a:off x="2956622" y="2810238"/>
+            <a:ext cx="260828" cy="245237"/>
+          </a:xfrm>
+          <a:prstGeom prst="ellipse">
+            <a:avLst/>
+          </a:prstGeom>
+        </p:spPr>
+        <p:style>
+          <a:lnRef idx="1">
+            <a:schemeClr val="accent3"/>
+          </a:lnRef>
+          <a:fillRef idx="2">
+            <a:schemeClr val="accent3"/>
+          </a:fillRef>
+          <a:effectRef idx="1">
+            <a:schemeClr val="accent3"/>
+          </a:effectRef>
+          <a:fontRef idx="minor">
+            <a:schemeClr val="dk1"/>
+          </a:fontRef>
+        </p:style>
+        <p:txBody>
+          <a:bodyPr rtlCol="0" anchor="ctr"/>
+          <a:lstStyle/>
+          <a:p>
+            <a:pPr algn="ctr"/>
+            <a:endParaRPr lang="en-GB"/>
+          </a:p>
+        </p:txBody>
+      </p:sp>
+      <p:sp>
+        <p:nvSpPr>
+          <p:cNvPr id="87" name="Rettangolo 86"/>
+          <p:cNvSpPr/>
+          <p:nvPr/>
+        </p:nvSpPr>
+        <p:spPr>
+          <a:xfrm>
+            <a:off x="1472107" y="3096540"/>
+            <a:ext cx="2317686" cy="369332"/>
+          </a:xfrm>
+          <a:prstGeom prst="rect">
+            <a:avLst/>
+          </a:prstGeom>
+          <a:solidFill>
+            <a:srgbClr val="CCFF99"/>
+          </a:solidFill>
+        </p:spPr>
+        <p:style>
+          <a:lnRef idx="1">
+            <a:schemeClr val="accent3"/>
+          </a:lnRef>
+          <a:fillRef idx="3">
+            <a:schemeClr val="accent3"/>
+          </a:fillRef>
+          <a:effectRef idx="2">
+            <a:schemeClr val="accent3"/>
+          </a:effectRef>
+          <a:fontRef idx="minor">
+            <a:schemeClr val="lt1"/>
+          </a:fontRef>
+        </p:style>
+        <p:txBody>
+          <a:bodyPr wrap="none">
+            <a:spAutoFit/>
+          </a:bodyPr>
+          <a:lstStyle/>
+          <a:p>
+            <a:r>
+              <a:rPr lang="en-GB" dirty="0" err="1">
                 <a:solidFill>
-                  <a:schemeClr val="tx1"/>
+                  <a:srgbClr val="C00000"/>
                 </a:solidFill>
-                <a:miter lim="800000"/>
-                <a:headEnd/>
-                <a:tailEnd/>
-              </a14:hiddenLine>
-            </a:ext>
-          </a:extLst>
-        </p:spPr>
-      </p:pic>
+              </a:rPr>
+              <a:t>HealthServiceInterface</a:t>
+            </a:r>
+            <a:endParaRPr lang="en-GB" dirty="0">
+              <a:solidFill>
+                <a:srgbClr val="C00000"/>
+              </a:solidFill>
+            </a:endParaRPr>
+          </a:p>
+        </p:txBody>
+      </p:sp>
+      <p:sp>
+        <p:nvSpPr>
+          <p:cNvPr id="88" name="Ovale 87"/>
+          <p:cNvSpPr/>
+          <p:nvPr/>
+        </p:nvSpPr>
+        <p:spPr>
+          <a:xfrm>
+            <a:off x="1746088" y="2812594"/>
+            <a:ext cx="260828" cy="245237"/>
+          </a:xfrm>
+          <a:prstGeom prst="ellipse">
+            <a:avLst/>
+          </a:prstGeom>
+        </p:spPr>
+        <p:style>
+          <a:lnRef idx="1">
+            <a:schemeClr val="accent3"/>
+          </a:lnRef>
+          <a:fillRef idx="2">
+            <a:schemeClr val="accent3"/>
+          </a:fillRef>
+          <a:effectRef idx="1">
+            <a:schemeClr val="accent3"/>
+          </a:effectRef>
+          <a:fontRef idx="minor">
+            <a:schemeClr val="dk1"/>
+          </a:fontRef>
+        </p:style>
+        <p:txBody>
+          <a:bodyPr rtlCol="0" anchor="ctr"/>
+          <a:lstStyle/>
+          <a:p>
+            <a:pPr algn="ctr"/>
+            <a:endParaRPr lang="en-GB"/>
+          </a:p>
+        </p:txBody>
+      </p:sp>
+      <p:sp>
+        <p:nvSpPr>
+          <p:cNvPr id="91" name="Ovale 90"/>
+          <p:cNvSpPr/>
+          <p:nvPr/>
+        </p:nvSpPr>
+        <p:spPr>
+          <a:xfrm>
+            <a:off x="4850890" y="5181283"/>
+            <a:ext cx="3083816" cy="593051"/>
+          </a:xfrm>
+          <a:prstGeom prst="ellipse">
+            <a:avLst/>
+          </a:prstGeom>
+        </p:spPr>
+        <p:style>
+          <a:lnRef idx="1">
+            <a:schemeClr val="accent5"/>
+          </a:lnRef>
+          <a:fillRef idx="2">
+            <a:schemeClr val="accent5"/>
+          </a:fillRef>
+          <a:effectRef idx="1">
+            <a:schemeClr val="accent5"/>
+          </a:effectRef>
+          <a:fontRef idx="minor">
+            <a:schemeClr val="dk1"/>
+          </a:fontRef>
+        </p:style>
+        <p:txBody>
+          <a:bodyPr rtlCol="0" anchor="ctr"/>
+          <a:lstStyle/>
+          <a:p>
+            <a:pPr algn="ctr"/>
+            <a:r>
+              <a:rPr lang="en-GB" sz="1600" dirty="0" err="1"/>
+              <a:t>HealthHttpClient</a:t>
+            </a:r>
+            <a:endParaRPr lang="en-GB" sz="1600" dirty="0"/>
+          </a:p>
+        </p:txBody>
+      </p:sp>
+      <p:grpSp>
+        <p:nvGrpSpPr>
+          <p:cNvPr id="92" name="Gruppo 91"/>
+          <p:cNvGrpSpPr/>
+          <p:nvPr/>
+        </p:nvGrpSpPr>
+        <p:grpSpPr>
+          <a:xfrm flipH="1">
+            <a:off x="3789793" y="5549660"/>
+            <a:ext cx="666895" cy="86434"/>
+            <a:chOff x="4592177" y="4419530"/>
+            <a:chExt cx="666895" cy="86434"/>
+          </a:xfrm>
+        </p:grpSpPr>
+        <p:cxnSp>
+          <p:nvCxnSpPr>
+            <p:cNvPr id="93" name="Connettore 1 92"/>
+            <p:cNvCxnSpPr/>
+            <p:nvPr/>
+          </p:nvCxnSpPr>
+          <p:spPr>
+            <a:xfrm>
+              <a:off x="4611000" y="4462747"/>
+              <a:ext cx="648072" cy="0"/>
+            </a:xfrm>
+            <a:prstGeom prst="line">
+              <a:avLst/>
+            </a:prstGeom>
+            <a:ln>
+              <a:prstDash val="dash"/>
+            </a:ln>
+          </p:spPr>
+          <p:style>
+            <a:lnRef idx="1">
+              <a:schemeClr val="accent1"/>
+            </a:lnRef>
+            <a:fillRef idx="0">
+              <a:schemeClr val="accent1"/>
+            </a:fillRef>
+            <a:effectRef idx="0">
+              <a:schemeClr val="accent1"/>
+            </a:effectRef>
+            <a:fontRef idx="minor">
+              <a:schemeClr val="tx1"/>
+            </a:fontRef>
+          </p:style>
+        </p:cxnSp>
+        <p:sp>
+          <p:nvSpPr>
+            <p:cNvPr id="94" name="Triangolo isoscele 93"/>
+            <p:cNvSpPr/>
+            <p:nvPr/>
+          </p:nvSpPr>
+          <p:spPr>
+            <a:xfrm rot="16200000">
+              <a:off x="4618592" y="4393115"/>
+              <a:ext cx="86434" cy="139263"/>
+            </a:xfrm>
+            <a:prstGeom prst="triangle">
+              <a:avLst/>
+            </a:prstGeom>
+            <a:solidFill>
+              <a:schemeClr val="bg1"/>
+            </a:solidFill>
+            <a:ln/>
+          </p:spPr>
+          <p:style>
+            <a:lnRef idx="1">
+              <a:schemeClr val="accent5"/>
+            </a:lnRef>
+            <a:fillRef idx="2">
+              <a:schemeClr val="accent5"/>
+            </a:fillRef>
+            <a:effectRef idx="1">
+              <a:schemeClr val="accent5"/>
+            </a:effectRef>
+            <a:fontRef idx="minor">
+              <a:schemeClr val="dk1"/>
+            </a:fontRef>
+          </p:style>
+          <p:txBody>
+            <a:bodyPr rtlCol="0" anchor="ctr"/>
+            <a:lstStyle/>
+            <a:p>
+              <a:pPr algn="ctr"/>
+              <a:endParaRPr lang="en-GB" sz="1200"/>
+            </a:p>
+          </p:txBody>
+        </p:sp>
+      </p:grpSp>
+      <p:grpSp>
+        <p:nvGrpSpPr>
+          <p:cNvPr id="95" name="Gruppo 94"/>
+          <p:cNvGrpSpPr/>
+          <p:nvPr/>
+        </p:nvGrpSpPr>
+        <p:grpSpPr>
+          <a:xfrm flipH="1">
+            <a:off x="3781706" y="5353455"/>
+            <a:ext cx="787334" cy="86434"/>
+            <a:chOff x="3452446" y="4176616"/>
+            <a:chExt cx="787334" cy="86434"/>
+          </a:xfrm>
+        </p:grpSpPr>
+        <p:sp>
+          <p:nvSpPr>
+            <p:cNvPr id="96" name="Triangolo isoscele 95"/>
+            <p:cNvSpPr/>
+            <p:nvPr/>
+          </p:nvSpPr>
+          <p:spPr>
+            <a:xfrm rot="5400000" flipH="1">
+              <a:off x="4126932" y="4150201"/>
+              <a:ext cx="86434" cy="139263"/>
+            </a:xfrm>
+            <a:prstGeom prst="triangle">
+              <a:avLst/>
+            </a:prstGeom>
+            <a:solidFill>
+              <a:schemeClr val="bg1"/>
+            </a:solidFill>
+            <a:ln/>
+          </p:spPr>
+          <p:style>
+            <a:lnRef idx="1">
+              <a:schemeClr val="accent5"/>
+            </a:lnRef>
+            <a:fillRef idx="2">
+              <a:schemeClr val="accent5"/>
+            </a:fillRef>
+            <a:effectRef idx="1">
+              <a:schemeClr val="accent5"/>
+            </a:effectRef>
+            <a:fontRef idx="minor">
+              <a:schemeClr val="dk1"/>
+            </a:fontRef>
+          </p:style>
+          <p:txBody>
+            <a:bodyPr rtlCol="0" anchor="ctr"/>
+            <a:lstStyle/>
+            <a:p>
+              <a:pPr algn="ctr"/>
+              <a:endParaRPr lang="en-GB" sz="1200"/>
+            </a:p>
+          </p:txBody>
+        </p:sp>
+        <p:cxnSp>
+          <p:nvCxnSpPr>
+            <p:cNvPr id="97" name="Connettore 1 96"/>
+            <p:cNvCxnSpPr>
+              <a:endCxn id="96" idx="3"/>
+            </p:cNvCxnSpPr>
+            <p:nvPr/>
+          </p:nvCxnSpPr>
+          <p:spPr>
+            <a:xfrm>
+              <a:off x="3452446" y="4219627"/>
+              <a:ext cx="648072" cy="206"/>
+            </a:xfrm>
+            <a:prstGeom prst="line">
+              <a:avLst/>
+            </a:prstGeom>
+          </p:spPr>
+          <p:style>
+            <a:lnRef idx="1">
+              <a:schemeClr val="accent1"/>
+            </a:lnRef>
+            <a:fillRef idx="0">
+              <a:schemeClr val="accent1"/>
+            </a:fillRef>
+            <a:effectRef idx="0">
+              <a:schemeClr val="accent1"/>
+            </a:effectRef>
+            <a:fontRef idx="minor">
+              <a:schemeClr val="tx1"/>
+            </a:fontRef>
+          </p:style>
+        </p:cxnSp>
+      </p:grpSp>
+      <p:sp>
+        <p:nvSpPr>
+          <p:cNvPr id="98" name="Ovale 97"/>
+          <p:cNvSpPr/>
+          <p:nvPr/>
+        </p:nvSpPr>
+        <p:spPr>
+          <a:xfrm>
+            <a:off x="5599791" y="5915090"/>
+            <a:ext cx="3083816" cy="593051"/>
+          </a:xfrm>
+          <a:prstGeom prst="ellipse">
+            <a:avLst/>
+          </a:prstGeom>
+        </p:spPr>
+        <p:style>
+          <a:lnRef idx="1">
+            <a:schemeClr val="accent5"/>
+          </a:lnRef>
+          <a:fillRef idx="2">
+            <a:schemeClr val="accent5"/>
+          </a:fillRef>
+          <a:effectRef idx="1">
+            <a:schemeClr val="accent5"/>
+          </a:effectRef>
+          <a:fontRef idx="minor">
+            <a:schemeClr val="dk1"/>
+          </a:fontRef>
+        </p:style>
+        <p:txBody>
+          <a:bodyPr rtlCol="0" anchor="ctr"/>
+          <a:lstStyle/>
+          <a:p>
+            <a:pPr algn="ctr"/>
+            <a:r>
+              <a:rPr lang="en-GB" sz="1600" dirty="0" err="1"/>
+              <a:t>HealthWebClient</a:t>
+            </a:r>
+            <a:endParaRPr lang="en-GB" sz="1600" dirty="0"/>
+          </a:p>
+        </p:txBody>
+      </p:sp>
+      <p:grpSp>
+        <p:nvGrpSpPr>
+          <p:cNvPr id="99" name="Gruppo 98"/>
+          <p:cNvGrpSpPr/>
+          <p:nvPr/>
+        </p:nvGrpSpPr>
+        <p:grpSpPr>
+          <a:xfrm rot="5400000" flipH="1">
+            <a:off x="8100524" y="5290322"/>
+            <a:ext cx="472540" cy="98326"/>
+            <a:chOff x="4592177" y="4419530"/>
+            <a:chExt cx="666895" cy="86434"/>
+          </a:xfrm>
+        </p:grpSpPr>
+        <p:cxnSp>
+          <p:nvCxnSpPr>
+            <p:cNvPr id="100" name="Connettore 1 99"/>
+            <p:cNvCxnSpPr/>
+            <p:nvPr/>
+          </p:nvCxnSpPr>
+          <p:spPr>
+            <a:xfrm>
+              <a:off x="4611000" y="4462747"/>
+              <a:ext cx="648072" cy="0"/>
+            </a:xfrm>
+            <a:prstGeom prst="line">
+              <a:avLst/>
+            </a:prstGeom>
+            <a:ln>
+              <a:prstDash val="dash"/>
+            </a:ln>
+          </p:spPr>
+          <p:style>
+            <a:lnRef idx="1">
+              <a:schemeClr val="accent1"/>
+            </a:lnRef>
+            <a:fillRef idx="0">
+              <a:schemeClr val="accent1"/>
+            </a:fillRef>
+            <a:effectRef idx="0">
+              <a:schemeClr val="accent1"/>
+            </a:effectRef>
+            <a:fontRef idx="minor">
+              <a:schemeClr val="tx1"/>
+            </a:fontRef>
+          </p:style>
+        </p:cxnSp>
+        <p:sp>
+          <p:nvSpPr>
+            <p:cNvPr id="101" name="Triangolo isoscele 100"/>
+            <p:cNvSpPr/>
+            <p:nvPr/>
+          </p:nvSpPr>
+          <p:spPr>
+            <a:xfrm rot="16200000">
+              <a:off x="4618592" y="4393115"/>
+              <a:ext cx="86434" cy="139263"/>
+            </a:xfrm>
+            <a:prstGeom prst="triangle">
+              <a:avLst/>
+            </a:prstGeom>
+            <a:solidFill>
+              <a:schemeClr val="bg1"/>
+            </a:solidFill>
+            <a:ln/>
+          </p:spPr>
+          <p:style>
+            <a:lnRef idx="1">
+              <a:schemeClr val="accent5"/>
+            </a:lnRef>
+            <a:fillRef idx="2">
+              <a:schemeClr val="accent5"/>
+            </a:fillRef>
+            <a:effectRef idx="1">
+              <a:schemeClr val="accent5"/>
+            </a:effectRef>
+            <a:fontRef idx="minor">
+              <a:schemeClr val="dk1"/>
+            </a:fontRef>
+          </p:style>
+          <p:txBody>
+            <a:bodyPr rtlCol="0" anchor="ctr"/>
+            <a:lstStyle/>
+            <a:p>
+              <a:pPr algn="ctr"/>
+              <a:endParaRPr lang="en-GB" sz="1200"/>
+            </a:p>
+          </p:txBody>
+        </p:sp>
+      </p:grpSp>
+      <p:grpSp>
+        <p:nvGrpSpPr>
+          <p:cNvPr id="102" name="Gruppo 101"/>
+          <p:cNvGrpSpPr/>
+          <p:nvPr/>
+        </p:nvGrpSpPr>
+        <p:grpSpPr>
+          <a:xfrm rot="5400000" flipH="1" flipV="1">
+            <a:off x="7824088" y="5246291"/>
+            <a:ext cx="582125" cy="120293"/>
+            <a:chOff x="3452446" y="4176616"/>
+            <a:chExt cx="787334" cy="86434"/>
+          </a:xfrm>
+        </p:grpSpPr>
+        <p:sp>
+          <p:nvSpPr>
+            <p:cNvPr id="103" name="Triangolo isoscele 102"/>
+            <p:cNvSpPr/>
+            <p:nvPr/>
+          </p:nvSpPr>
+          <p:spPr>
+            <a:xfrm rot="5400000" flipH="1">
+              <a:off x="4126932" y="4150201"/>
+              <a:ext cx="86434" cy="139263"/>
+            </a:xfrm>
+            <a:prstGeom prst="triangle">
+              <a:avLst/>
+            </a:prstGeom>
+            <a:solidFill>
+              <a:schemeClr val="bg1"/>
+            </a:solidFill>
+            <a:ln/>
+          </p:spPr>
+          <p:style>
+            <a:lnRef idx="1">
+              <a:schemeClr val="accent5"/>
+            </a:lnRef>
+            <a:fillRef idx="2">
+              <a:schemeClr val="accent5"/>
+            </a:fillRef>
+            <a:effectRef idx="1">
+              <a:schemeClr val="accent5"/>
+            </a:effectRef>
+            <a:fontRef idx="minor">
+              <a:schemeClr val="dk1"/>
+            </a:fontRef>
+          </p:style>
+          <p:txBody>
+            <a:bodyPr rtlCol="0" anchor="ctr"/>
+            <a:lstStyle/>
+            <a:p>
+              <a:pPr algn="ctr"/>
+              <a:endParaRPr lang="en-GB" sz="1200"/>
+            </a:p>
+          </p:txBody>
+        </p:sp>
+        <p:cxnSp>
+          <p:nvCxnSpPr>
+            <p:cNvPr id="104" name="Connettore 1 103"/>
+            <p:cNvCxnSpPr>
+              <a:endCxn id="103" idx="3"/>
+            </p:cNvCxnSpPr>
+            <p:nvPr/>
+          </p:nvCxnSpPr>
+          <p:spPr>
+            <a:xfrm>
+              <a:off x="3452446" y="4219627"/>
+              <a:ext cx="648072" cy="206"/>
+            </a:xfrm>
+            <a:prstGeom prst="line">
+              <a:avLst/>
+            </a:prstGeom>
+          </p:spPr>
+          <p:style>
+            <a:lnRef idx="1">
+              <a:schemeClr val="accent1"/>
+            </a:lnRef>
+            <a:fillRef idx="0">
+              <a:schemeClr val="accent1"/>
+            </a:fillRef>
+            <a:effectRef idx="0">
+              <a:schemeClr val="accent1"/>
+            </a:effectRef>
+            <a:fontRef idx="minor">
+              <a:schemeClr val="tx1"/>
+            </a:fontRef>
+          </p:style>
+        </p:cxnSp>
+      </p:grpSp>
+      <p:grpSp>
+        <p:nvGrpSpPr>
+          <p:cNvPr id="105" name="Gruppo 104"/>
+          <p:cNvGrpSpPr/>
+          <p:nvPr/>
+        </p:nvGrpSpPr>
+        <p:grpSpPr>
+          <a:xfrm flipH="1">
+            <a:off x="3985452" y="6223259"/>
+            <a:ext cx="666895" cy="86434"/>
+            <a:chOff x="4592177" y="4419530"/>
+            <a:chExt cx="666895" cy="86434"/>
+          </a:xfrm>
+        </p:grpSpPr>
+        <p:cxnSp>
+          <p:nvCxnSpPr>
+            <p:cNvPr id="106" name="Connettore 1 105"/>
+            <p:cNvCxnSpPr/>
+            <p:nvPr/>
+          </p:nvCxnSpPr>
+          <p:spPr>
+            <a:xfrm>
+              <a:off x="4611000" y="4462747"/>
+              <a:ext cx="648072" cy="0"/>
+            </a:xfrm>
+            <a:prstGeom prst="line">
+              <a:avLst/>
+            </a:prstGeom>
+            <a:ln>
+              <a:prstDash val="dash"/>
+            </a:ln>
+          </p:spPr>
+          <p:style>
+            <a:lnRef idx="1">
+              <a:schemeClr val="accent1"/>
+            </a:lnRef>
+            <a:fillRef idx="0">
+              <a:schemeClr val="accent1"/>
+            </a:fillRef>
+            <a:effectRef idx="0">
+              <a:schemeClr val="accent1"/>
+            </a:effectRef>
+            <a:fontRef idx="minor">
+              <a:schemeClr val="tx1"/>
+            </a:fontRef>
+          </p:style>
+        </p:cxnSp>
+        <p:sp>
+          <p:nvSpPr>
+            <p:cNvPr id="107" name="Triangolo isoscele 106"/>
+            <p:cNvSpPr/>
+            <p:nvPr/>
+          </p:nvSpPr>
+          <p:spPr>
+            <a:xfrm rot="16200000">
+              <a:off x="4618592" y="4393115"/>
+              <a:ext cx="86434" cy="139263"/>
+            </a:xfrm>
+            <a:prstGeom prst="triangle">
+              <a:avLst/>
+            </a:prstGeom>
+            <a:solidFill>
+              <a:schemeClr val="bg1"/>
+            </a:solidFill>
+            <a:ln/>
+          </p:spPr>
+          <p:style>
+            <a:lnRef idx="1">
+              <a:schemeClr val="accent5"/>
+            </a:lnRef>
+            <a:fillRef idx="2">
+              <a:schemeClr val="accent5"/>
+            </a:fillRef>
+            <a:effectRef idx="1">
+              <a:schemeClr val="accent5"/>
+            </a:effectRef>
+            <a:fontRef idx="minor">
+              <a:schemeClr val="dk1"/>
+            </a:fontRef>
+          </p:style>
+          <p:txBody>
+            <a:bodyPr rtlCol="0" anchor="ctr"/>
+            <a:lstStyle/>
+            <a:p>
+              <a:pPr algn="ctr"/>
+              <a:endParaRPr lang="en-GB" sz="1200"/>
+            </a:p>
+          </p:txBody>
+        </p:sp>
+      </p:grpSp>
+      <p:grpSp>
+        <p:nvGrpSpPr>
+          <p:cNvPr id="108" name="Gruppo 107"/>
+          <p:cNvGrpSpPr/>
+          <p:nvPr/>
+        </p:nvGrpSpPr>
+        <p:grpSpPr>
+          <a:xfrm flipH="1">
+            <a:off x="3977365" y="6027054"/>
+            <a:ext cx="787334" cy="86434"/>
+            <a:chOff x="3452446" y="4176616"/>
+            <a:chExt cx="787334" cy="86434"/>
+          </a:xfrm>
+        </p:grpSpPr>
+        <p:sp>
+          <p:nvSpPr>
+            <p:cNvPr id="109" name="Triangolo isoscele 108"/>
+            <p:cNvSpPr/>
+            <p:nvPr/>
+          </p:nvSpPr>
+          <p:spPr>
+            <a:xfrm rot="5400000" flipH="1">
+              <a:off x="4126932" y="4150201"/>
+              <a:ext cx="86434" cy="139263"/>
+            </a:xfrm>
+            <a:prstGeom prst="triangle">
+              <a:avLst/>
+            </a:prstGeom>
+            <a:solidFill>
+              <a:schemeClr val="bg1"/>
+            </a:solidFill>
+            <a:ln/>
+          </p:spPr>
+          <p:style>
+            <a:lnRef idx="1">
+              <a:schemeClr val="accent5"/>
+            </a:lnRef>
+            <a:fillRef idx="2">
+              <a:schemeClr val="accent5"/>
+            </a:fillRef>
+            <a:effectRef idx="1">
+              <a:schemeClr val="accent5"/>
+            </a:effectRef>
+            <a:fontRef idx="minor">
+              <a:schemeClr val="dk1"/>
+            </a:fontRef>
+          </p:style>
+          <p:txBody>
+            <a:bodyPr rtlCol="0" anchor="ctr"/>
+            <a:lstStyle/>
+            <a:p>
+              <a:pPr algn="ctr"/>
+              <a:endParaRPr lang="en-GB" sz="1200"/>
+            </a:p>
+          </p:txBody>
+        </p:sp>
+        <p:cxnSp>
+          <p:nvCxnSpPr>
+            <p:cNvPr id="110" name="Connettore 1 109"/>
+            <p:cNvCxnSpPr>
+              <a:endCxn id="109" idx="3"/>
+            </p:cNvCxnSpPr>
+            <p:nvPr/>
+          </p:nvCxnSpPr>
+          <p:spPr>
+            <a:xfrm>
+              <a:off x="3452446" y="4219627"/>
+              <a:ext cx="648072" cy="206"/>
+            </a:xfrm>
+            <a:prstGeom prst="line">
+              <a:avLst/>
+            </a:prstGeom>
+          </p:spPr>
+          <p:style>
+            <a:lnRef idx="1">
+              <a:schemeClr val="accent1"/>
+            </a:lnRef>
+            <a:fillRef idx="0">
+              <a:schemeClr val="accent1"/>
+            </a:fillRef>
+            <a:effectRef idx="0">
+              <a:schemeClr val="accent1"/>
+            </a:effectRef>
+            <a:fontRef idx="minor">
+              <a:schemeClr val="tx1"/>
+            </a:fontRef>
+          </p:style>
+        </p:cxnSp>
+      </p:grpSp>
+      <p:cxnSp>
+        <p:nvCxnSpPr>
+          <p:cNvPr id="111" name="Connettore 2 110"/>
+          <p:cNvCxnSpPr/>
+          <p:nvPr/>
+        </p:nvCxnSpPr>
+        <p:spPr>
+          <a:xfrm flipH="1">
+            <a:off x="5364673" y="5281257"/>
+            <a:ext cx="13466" cy="393101"/>
+          </a:xfrm>
+          <a:prstGeom prst="straightConnector1">
+            <a:avLst/>
+          </a:prstGeom>
+          <a:ln>
+            <a:solidFill>
+              <a:srgbClr val="C00000"/>
+            </a:solidFill>
+            <a:tailEnd type="arrow"/>
+          </a:ln>
+        </p:spPr>
+        <p:style>
+          <a:lnRef idx="1">
+            <a:schemeClr val="accent1"/>
+          </a:lnRef>
+          <a:fillRef idx="0">
+            <a:schemeClr val="accent1"/>
+          </a:fillRef>
+          <a:effectRef idx="0">
+            <a:schemeClr val="accent1"/>
+          </a:effectRef>
+          <a:fontRef idx="minor">
+            <a:schemeClr val="tx1"/>
+          </a:fontRef>
+        </p:style>
+      </p:cxnSp>
+      <p:cxnSp>
+        <p:nvCxnSpPr>
+          <p:cNvPr id="112" name="Connettore 2 111"/>
+          <p:cNvCxnSpPr/>
+          <p:nvPr/>
+        </p:nvCxnSpPr>
+        <p:spPr>
+          <a:xfrm flipH="1">
+            <a:off x="6156176" y="6028030"/>
+            <a:ext cx="13466" cy="393101"/>
+          </a:xfrm>
+          <a:prstGeom prst="straightConnector1">
+            <a:avLst/>
+          </a:prstGeom>
+          <a:ln>
+            <a:solidFill>
+              <a:srgbClr val="C00000"/>
+            </a:solidFill>
+            <a:tailEnd type="arrow"/>
+          </a:ln>
+        </p:spPr>
+        <p:style>
+          <a:lnRef idx="1">
+            <a:schemeClr val="accent1"/>
+          </a:lnRef>
+          <a:fillRef idx="0">
+            <a:schemeClr val="accent1"/>
+          </a:fillRef>
+          <a:effectRef idx="0">
+            <a:schemeClr val="accent1"/>
+          </a:effectRef>
+          <a:fontRef idx="minor">
+            <a:schemeClr val="tx1"/>
+          </a:fontRef>
+        </p:style>
+      </p:cxnSp>
+      <p:sp>
+        <p:nvSpPr>
+          <p:cNvPr id="120" name="Rettangolo 119"/>
+          <p:cNvSpPr/>
+          <p:nvPr/>
+        </p:nvSpPr>
+        <p:spPr>
+          <a:xfrm>
+            <a:off x="1004657" y="5184702"/>
+            <a:ext cx="1936428" cy="1354217"/>
+          </a:xfrm>
+          <a:prstGeom prst="rect">
+            <a:avLst/>
+          </a:prstGeom>
+        </p:spPr>
+        <p:style>
+          <a:lnRef idx="1">
+            <a:schemeClr val="accent3"/>
+          </a:lnRef>
+          <a:fillRef idx="2">
+            <a:schemeClr val="accent3"/>
+          </a:fillRef>
+          <a:effectRef idx="1">
+            <a:schemeClr val="accent3"/>
+          </a:effectRef>
+          <a:fontRef idx="minor">
+            <a:schemeClr val="dk1"/>
+          </a:fontRef>
+        </p:style>
+        <p:txBody>
+          <a:bodyPr wrap="none">
+            <a:spAutoFit/>
+          </a:bodyPr>
+          <a:lstStyle/>
+          <a:p>
+            <a:r>
+              <a:rPr lang="en-GB" sz="1600" b="1" dirty="0">
+                <a:solidFill>
+                  <a:srgbClr val="0070C0"/>
+                </a:solidFill>
+              </a:rPr>
+              <a:t>/</a:t>
+            </a:r>
+            <a:r>
+              <a:rPr lang="en-GB" sz="1600" b="1" dirty="0" err="1">
+                <a:solidFill>
+                  <a:srgbClr val="0070C0"/>
+                </a:solidFill>
+              </a:rPr>
+              <a:t>selectHealthCenter</a:t>
+            </a:r>
+            <a:r>
+              <a:rPr lang="en-GB" sz="1600" b="1" dirty="0">
+                <a:solidFill>
+                  <a:srgbClr val="0070C0"/>
+                </a:solidFill>
+              </a:rPr>
+              <a:t> </a:t>
+            </a:r>
+            <a:endParaRPr lang="en-GB" sz="1600" b="1" dirty="0" smtClean="0">
+              <a:solidFill>
+                <a:srgbClr val="0070C0"/>
+              </a:solidFill>
+            </a:endParaRPr>
+          </a:p>
+          <a:p>
+            <a:r>
+              <a:rPr lang="en-GB" sz="1600" b="1" dirty="0" smtClean="0">
+                <a:solidFill>
+                  <a:srgbClr val="0070C0"/>
+                </a:solidFill>
+              </a:rPr>
+              <a:t>/</a:t>
+            </a:r>
+            <a:r>
+              <a:rPr lang="en-GB" sz="1600" b="1" dirty="0" err="1" smtClean="0">
+                <a:solidFill>
+                  <a:srgbClr val="0070C0"/>
+                </a:solidFill>
+              </a:rPr>
+              <a:t>createResource</a:t>
+            </a:r>
+            <a:endParaRPr lang="en-GB" sz="1600" b="1" dirty="0" smtClean="0">
+              <a:solidFill>
+                <a:srgbClr val="0070C0"/>
+              </a:solidFill>
+            </a:endParaRPr>
+          </a:p>
+          <a:p>
+            <a:r>
+              <a:rPr lang="en-GB" sz="1600" b="1" dirty="0">
+                <a:solidFill>
+                  <a:srgbClr val="0070C0"/>
+                </a:solidFill>
+              </a:rPr>
+              <a:t>/</a:t>
+            </a:r>
+            <a:r>
+              <a:rPr lang="en-GB" sz="1600" b="1" dirty="0" err="1">
+                <a:solidFill>
+                  <a:srgbClr val="0070C0"/>
+                </a:solidFill>
+              </a:rPr>
+              <a:t>searchResource</a:t>
+            </a:r>
+            <a:endParaRPr lang="en-GB" sz="1600" b="1" dirty="0">
+              <a:solidFill>
+                <a:srgbClr val="0070C0"/>
+              </a:solidFill>
+            </a:endParaRPr>
+          </a:p>
+          <a:p>
+            <a:r>
+              <a:rPr lang="en-GB" sz="1600" b="1" dirty="0">
+                <a:solidFill>
+                  <a:srgbClr val="0070C0"/>
+                </a:solidFill>
+              </a:rPr>
+              <a:t>/</a:t>
+            </a:r>
+            <a:r>
+              <a:rPr lang="en-GB" sz="1600" b="1" dirty="0" err="1" smtClean="0">
+                <a:solidFill>
+                  <a:srgbClr val="0070C0"/>
+                </a:solidFill>
+              </a:rPr>
+              <a:t>readResource</a:t>
+            </a:r>
+            <a:endParaRPr lang="en-GB" sz="1600" b="1" dirty="0">
+              <a:solidFill>
+                <a:srgbClr val="0070C0"/>
+              </a:solidFill>
+            </a:endParaRPr>
+          </a:p>
+          <a:p>
+            <a:r>
+              <a:rPr lang="en-GB" sz="1600" b="1" dirty="0">
+                <a:solidFill>
+                  <a:srgbClr val="0070C0"/>
+                </a:solidFill>
+              </a:rPr>
+              <a:t>/</a:t>
+            </a:r>
+            <a:r>
+              <a:rPr lang="en-GB" sz="1600" b="1" dirty="0" err="1">
+                <a:solidFill>
+                  <a:srgbClr val="0070C0"/>
+                </a:solidFill>
+              </a:rPr>
+              <a:t>deleteResource</a:t>
+            </a:r>
+            <a:endParaRPr lang="en-GB" sz="1600" b="1" dirty="0">
+              <a:solidFill>
+                <a:srgbClr val="0070C0"/>
+              </a:solidFill>
+            </a:endParaRPr>
+          </a:p>
+        </p:txBody>
+      </p:sp>
+      <p:grpSp>
+        <p:nvGrpSpPr>
+          <p:cNvPr id="124" name="Gruppo 123"/>
+          <p:cNvGrpSpPr/>
+          <p:nvPr/>
+        </p:nvGrpSpPr>
+        <p:grpSpPr>
+          <a:xfrm>
+            <a:off x="43278" y="3860044"/>
+            <a:ext cx="1053702" cy="965471"/>
+            <a:chOff x="565700" y="4940367"/>
+            <a:chExt cx="805955" cy="772447"/>
+          </a:xfrm>
+        </p:grpSpPr>
+        <p:sp>
+          <p:nvSpPr>
+            <p:cNvPr id="125" name="Ovale 124"/>
+            <p:cNvSpPr/>
+            <p:nvPr/>
+          </p:nvSpPr>
+          <p:spPr>
+            <a:xfrm>
+              <a:off x="565700" y="4983583"/>
+              <a:ext cx="805955" cy="729231"/>
+            </a:xfrm>
+            <a:prstGeom prst="ellipse">
+              <a:avLst/>
+            </a:prstGeom>
+            <a:solidFill>
+              <a:srgbClr val="FF99CC"/>
+            </a:solidFill>
+            <a:ln/>
+          </p:spPr>
+          <p:style>
+            <a:lnRef idx="1">
+              <a:schemeClr val="accent4"/>
+            </a:lnRef>
+            <a:fillRef idx="2">
+              <a:schemeClr val="accent4"/>
+            </a:fillRef>
+            <a:effectRef idx="1">
+              <a:schemeClr val="accent4"/>
+            </a:effectRef>
+            <a:fontRef idx="minor">
+              <a:schemeClr val="dk1"/>
+            </a:fontRef>
+          </p:style>
+          <p:txBody>
+            <a:bodyPr rtlCol="0" anchor="ctr"/>
+            <a:lstStyle/>
+            <a:p>
+              <a:pPr algn="ctr"/>
+              <a:r>
+                <a:rPr lang="en-GB" sz="1200" dirty="0"/>
+                <a:t> </a:t>
+              </a:r>
+            </a:p>
+          </p:txBody>
+        </p:sp>
+        <p:sp>
+          <p:nvSpPr>
+            <p:cNvPr id="126" name="Triangolo isoscele 125"/>
+            <p:cNvSpPr/>
+            <p:nvPr/>
+          </p:nvSpPr>
+          <p:spPr>
+            <a:xfrm rot="16200000">
+              <a:off x="905299" y="4913952"/>
+              <a:ext cx="86434" cy="139263"/>
+            </a:xfrm>
+            <a:prstGeom prst="triangle">
+              <a:avLst/>
+            </a:prstGeom>
+            <a:solidFill>
+              <a:srgbClr val="C00000"/>
+            </a:solidFill>
+            <a:ln/>
+          </p:spPr>
+          <p:style>
+            <a:lnRef idx="1">
+              <a:schemeClr val="accent5"/>
+            </a:lnRef>
+            <a:fillRef idx="2">
+              <a:schemeClr val="accent5"/>
+            </a:fillRef>
+            <a:effectRef idx="1">
+              <a:schemeClr val="accent5"/>
+            </a:effectRef>
+            <a:fontRef idx="minor">
+              <a:schemeClr val="dk1"/>
+            </a:fontRef>
+          </p:style>
+          <p:txBody>
+            <a:bodyPr rtlCol="0" anchor="ctr"/>
+            <a:lstStyle/>
+            <a:p>
+              <a:pPr algn="ctr"/>
+              <a:endParaRPr lang="en-GB" sz="1200">
+                <a:solidFill>
+                  <a:schemeClr val="dk1"/>
+                </a:solidFill>
+              </a:endParaRPr>
+            </a:p>
+          </p:txBody>
+        </p:sp>
+      </p:grpSp>
+      <p:sp>
+        <p:nvSpPr>
+          <p:cNvPr id="127" name="CasellaDiTesto 126"/>
+          <p:cNvSpPr txBox="1"/>
+          <p:nvPr/>
+        </p:nvSpPr>
+        <p:spPr>
+          <a:xfrm>
+            <a:off x="90395" y="4208677"/>
+            <a:ext cx="920060" cy="523220"/>
+          </a:xfrm>
+          <a:prstGeom prst="rect">
+            <a:avLst/>
+          </a:prstGeom>
+          <a:noFill/>
+        </p:spPr>
+        <p:txBody>
+          <a:bodyPr wrap="none" rtlCol="0">
+            <a:spAutoFit/>
+          </a:bodyPr>
+          <a:lstStyle/>
+          <a:p>
+            <a:pPr algn="ctr"/>
+            <a:r>
+              <a:rPr lang="en-GB" sz="1400" b="1" dirty="0" err="1" smtClean="0"/>
+              <a:t>ICoreFHIR</a:t>
+            </a:r>
+            <a:endParaRPr lang="en-GB" sz="1400" b="1" dirty="0" smtClean="0"/>
+          </a:p>
+          <a:p>
+            <a:pPr algn="ctr"/>
+            <a:r>
+              <a:rPr lang="it-IT" sz="1400" b="1" dirty="0" smtClean="0"/>
+              <a:t>server</a:t>
+            </a:r>
+            <a:endParaRPr lang="en-GB" sz="1400" dirty="0"/>
+          </a:p>
+        </p:txBody>
+      </p:sp>
+      <p:cxnSp>
+        <p:nvCxnSpPr>
+          <p:cNvPr id="129" name="Connettore 2 128"/>
+          <p:cNvCxnSpPr>
+            <a:stCxn id="7" idx="2"/>
+            <a:endCxn id="127" idx="3"/>
+          </p:cNvCxnSpPr>
+          <p:nvPr/>
+        </p:nvCxnSpPr>
+        <p:spPr>
+          <a:xfrm flipH="1">
+            <a:off x="1010455" y="4222891"/>
+            <a:ext cx="1666459" cy="247396"/>
+          </a:xfrm>
+          <a:prstGeom prst="straightConnector1">
+            <a:avLst/>
+          </a:prstGeom>
+          <a:ln w="28575">
+            <a:solidFill>
+              <a:srgbClr val="FF0000"/>
+            </a:solidFill>
+            <a:prstDash val="dash"/>
+            <a:tailEnd type="arrow"/>
+          </a:ln>
+        </p:spPr>
+        <p:style>
+          <a:lnRef idx="1">
+            <a:schemeClr val="accent1"/>
+          </a:lnRef>
+          <a:fillRef idx="0">
+            <a:schemeClr val="accent1"/>
+          </a:fillRef>
+          <a:effectRef idx="0">
+            <a:schemeClr val="accent1"/>
+          </a:effectRef>
+          <a:fontRef idx="minor">
+            <a:schemeClr val="tx1"/>
+          </a:fontRef>
+        </p:style>
+      </p:cxnSp>
+      <p:sp>
+        <p:nvSpPr>
+          <p:cNvPr id="130" name="CasellaDiTesto 129"/>
+          <p:cNvSpPr txBox="1"/>
+          <p:nvPr/>
+        </p:nvSpPr>
+        <p:spPr>
+          <a:xfrm>
+            <a:off x="1589191" y="3844653"/>
+            <a:ext cx="677750" cy="369332"/>
+          </a:xfrm>
+          <a:prstGeom prst="rect">
+            <a:avLst/>
+          </a:prstGeom>
+        </p:spPr>
+        <p:style>
+          <a:lnRef idx="1">
+            <a:schemeClr val="accent6"/>
+          </a:lnRef>
+          <a:fillRef idx="2">
+            <a:schemeClr val="accent6"/>
+          </a:fillRef>
+          <a:effectRef idx="1">
+            <a:schemeClr val="accent6"/>
+          </a:effectRef>
+          <a:fontRef idx="minor">
+            <a:schemeClr val="dk1"/>
+          </a:fontRef>
+        </p:style>
+        <p:txBody>
+          <a:bodyPr wrap="none" rtlCol="0">
+            <a:spAutoFit/>
+          </a:bodyPr>
+          <a:lstStyle/>
+          <a:p>
+            <a:r>
+              <a:rPr lang="it-IT" dirty="0" smtClean="0"/>
+              <a:t> </a:t>
+            </a:r>
+            <a:r>
+              <a:rPr lang="it-IT" dirty="0" err="1" smtClean="0"/>
+              <a:t>todo</a:t>
+            </a:r>
+            <a:endParaRPr lang="en-GB" dirty="0"/>
+          </a:p>
+        </p:txBody>
+      </p:sp>
+      <p:cxnSp>
+        <p:nvCxnSpPr>
+          <p:cNvPr id="25" name="Connettore 4 24"/>
+          <p:cNvCxnSpPr>
+            <a:stCxn id="125" idx="4"/>
+            <a:endCxn id="4" idx="4"/>
+          </p:cNvCxnSpPr>
+          <p:nvPr/>
+        </p:nvCxnSpPr>
+        <p:spPr>
+          <a:xfrm rot="16200000" flipH="1">
+            <a:off x="1767777" y="3627866"/>
+            <a:ext cx="152968" cy="2548265"/>
+          </a:xfrm>
+          <a:prstGeom prst="bentConnector3">
+            <a:avLst>
+              <a:gd name="adj1" fmla="val 249443"/>
+            </a:avLst>
+          </a:prstGeom>
+          <a:ln w="28575">
+            <a:solidFill>
+              <a:srgbClr val="C00000"/>
+            </a:solidFill>
+            <a:tailEnd type="arrow"/>
+          </a:ln>
+        </p:spPr>
+        <p:style>
+          <a:lnRef idx="1">
+            <a:schemeClr val="accent1"/>
+          </a:lnRef>
+          <a:fillRef idx="0">
+            <a:schemeClr val="accent1"/>
+          </a:fillRef>
+          <a:effectRef idx="0">
+            <a:schemeClr val="accent1"/>
+          </a:effectRef>
+          <a:fontRef idx="minor">
+            <a:schemeClr val="tx1"/>
+          </a:fontRef>
+        </p:style>
+      </p:cxnSp>
     </p:spTree>
     <p:extLst>
       <p:ext uri="{BB962C8B-B14F-4D97-AF65-F5344CB8AC3E}">
-        <p14:creationId xmlns:p14="http://schemas.microsoft.com/office/powerpoint/2010/main" val="2167669677"/>
+        <p14:creationId xmlns:p14="http://schemas.microsoft.com/office/powerpoint/2010/main" val="3166074293"/>
       </p:ext>
     </p:extLst>
   </p:cSld>
@@ -15778,7 +18289,7 @@
       </p:grpSpPr>
       <p:pic>
         <p:nvPicPr>
-          <p:cNvPr id="2050" name="Picture 2"/>
+          <p:cNvPr id="1027" name="Picture 3"/>
           <p:cNvPicPr>
             <a:picLocks noChangeAspect="1" noChangeArrowheads="1"/>
           </p:cNvPicPr>
@@ -15799,8 +18310,8 @@
         </p:blipFill>
         <p:spPr bwMode="auto">
           <a:xfrm>
-            <a:off x="1252538" y="1252538"/>
-            <a:ext cx="6638925" cy="4352925"/>
+            <a:off x="1252538" y="1119188"/>
+            <a:ext cx="6638925" cy="4619625"/>
           </a:xfrm>
           <a:prstGeom prst="rect">
             <a:avLst/>
@@ -15833,7 +18344,7 @@
     </p:spTree>
     <p:extLst>
       <p:ext uri="{BB962C8B-B14F-4D97-AF65-F5344CB8AC3E}">
-        <p14:creationId xmlns:p14="http://schemas.microsoft.com/office/powerpoint/2010/main" val="1461316647"/>
+        <p14:creationId xmlns:p14="http://schemas.microsoft.com/office/powerpoint/2010/main" val="2167669677"/>
       </p:ext>
     </p:extLst>
   </p:cSld>
@@ -15862,7 +18373,7 @@
       </p:grpSpPr>
       <p:pic>
         <p:nvPicPr>
-          <p:cNvPr id="3074" name="Picture 2"/>
+          <p:cNvPr id="2050" name="Picture 2"/>
           <p:cNvPicPr>
             <a:picLocks noChangeAspect="1" noChangeArrowheads="1"/>
           </p:cNvPicPr>
@@ -15883,8 +18394,8 @@
         </p:blipFill>
         <p:spPr bwMode="auto">
           <a:xfrm>
-            <a:off x="1252538" y="600075"/>
-            <a:ext cx="6638925" cy="5657850"/>
+            <a:off x="1252538" y="1252538"/>
+            <a:ext cx="6638925" cy="4352925"/>
           </a:xfrm>
           <a:prstGeom prst="rect">
             <a:avLst/>
@@ -15917,7 +18428,7 @@
     </p:spTree>
     <p:extLst>
       <p:ext uri="{BB962C8B-B14F-4D97-AF65-F5344CB8AC3E}">
-        <p14:creationId xmlns:p14="http://schemas.microsoft.com/office/powerpoint/2010/main" val="3157537335"/>
+        <p14:creationId xmlns:p14="http://schemas.microsoft.com/office/powerpoint/2010/main" val="1461316647"/>
       </p:ext>
     </p:extLst>
   </p:cSld>
@@ -15946,7 +18457,7 @@
       </p:grpSpPr>
       <p:pic>
         <p:nvPicPr>
-          <p:cNvPr id="1026" name="Picture 2"/>
+          <p:cNvPr id="3074" name="Picture 2"/>
           <p:cNvPicPr>
             <a:picLocks noChangeAspect="1" noChangeArrowheads="1"/>
           </p:cNvPicPr>
@@ -15967,8 +18478,8 @@
         </p:blipFill>
         <p:spPr bwMode="auto">
           <a:xfrm>
-            <a:off x="1871663" y="766763"/>
-            <a:ext cx="5400675" cy="5324475"/>
+            <a:off x="1252538" y="600075"/>
+            <a:ext cx="6638925" cy="5657850"/>
           </a:xfrm>
           <a:prstGeom prst="rect">
             <a:avLst/>
@@ -16001,7 +18512,7 @@
     </p:spTree>
     <p:extLst>
       <p:ext uri="{BB962C8B-B14F-4D97-AF65-F5344CB8AC3E}">
-        <p14:creationId xmlns:p14="http://schemas.microsoft.com/office/powerpoint/2010/main" val="1958561616"/>
+        <p14:creationId xmlns:p14="http://schemas.microsoft.com/office/powerpoint/2010/main" val="3157537335"/>
       </p:ext>
     </p:extLst>
   </p:cSld>
@@ -17407,6 +19918,90 @@
       </p:par>
     </p:tnLst>
   </p:timing>
+</p:sld>
+</file>
+
+<file path=ppt/slides/slide20.xml><?xml version="1.0" encoding="utf-8"?>
+<p:sld xmlns:a="http://schemas.openxmlformats.org/drawingml/2006/main" xmlns:r="http://schemas.openxmlformats.org/officeDocument/2006/relationships" xmlns:p="http://schemas.openxmlformats.org/presentationml/2006/main">
+  <p:cSld>
+    <p:spTree>
+      <p:nvGrpSpPr>
+        <p:cNvPr id="1" name=""/>
+        <p:cNvGrpSpPr/>
+        <p:nvPr/>
+      </p:nvGrpSpPr>
+      <p:grpSpPr>
+        <a:xfrm>
+          <a:off x="0" y="0"/>
+          <a:ext cx="0" cy="0"/>
+          <a:chOff x="0" y="0"/>
+          <a:chExt cx="0" cy="0"/>
+        </a:xfrm>
+      </p:grpSpPr>
+      <p:pic>
+        <p:nvPicPr>
+          <p:cNvPr id="1026" name="Picture 2"/>
+          <p:cNvPicPr>
+            <a:picLocks noChangeAspect="1" noChangeArrowheads="1"/>
+          </p:cNvPicPr>
+          <p:nvPr/>
+        </p:nvPicPr>
+        <p:blipFill>
+          <a:blip r:embed="rId2">
+            <a:extLst>
+              <a:ext uri="{28A0092B-C50C-407E-A947-70E740481C1C}">
+                <a14:useLocalDpi xmlns:a14="http://schemas.microsoft.com/office/drawing/2010/main" val="0"/>
+              </a:ext>
+            </a:extLst>
+          </a:blip>
+          <a:srcRect/>
+          <a:stretch>
+            <a:fillRect/>
+          </a:stretch>
+        </p:blipFill>
+        <p:spPr bwMode="auto">
+          <a:xfrm>
+            <a:off x="1871663" y="766763"/>
+            <a:ext cx="5400675" cy="5324475"/>
+          </a:xfrm>
+          <a:prstGeom prst="rect">
+            <a:avLst/>
+          </a:prstGeom>
+          <a:noFill/>
+          <a:ln>
+            <a:noFill/>
+          </a:ln>
+          <a:extLst>
+            <a:ext uri="{909E8E84-426E-40DD-AFC4-6F175D3DCCD1}">
+              <a14:hiddenFill xmlns:a14="http://schemas.microsoft.com/office/drawing/2010/main">
+                <a:solidFill>
+                  <a:schemeClr val="accent1"/>
+                </a:solidFill>
+              </a14:hiddenFill>
+            </a:ext>
+            <a:ext uri="{91240B29-F687-4F45-9708-019B960494DF}">
+              <a14:hiddenLine xmlns:a14="http://schemas.microsoft.com/office/drawing/2010/main" w="9525">
+                <a:solidFill>
+                  <a:schemeClr val="tx1"/>
+                </a:solidFill>
+                <a:miter lim="800000"/>
+                <a:headEnd/>
+                <a:tailEnd/>
+              </a14:hiddenLine>
+            </a:ext>
+          </a:extLst>
+        </p:spPr>
+      </p:pic>
+    </p:spTree>
+    <p:extLst>
+      <p:ext uri="{BB962C8B-B14F-4D97-AF65-F5344CB8AC3E}">
+        <p14:creationId xmlns:p14="http://schemas.microsoft.com/office/powerpoint/2010/main" val="1958561616"/>
+      </p:ext>
+    </p:extLst>
+  </p:cSld>
+  <p:clrMapOvr>
+    <a:masterClrMapping/>
+  </p:clrMapOvr>
 </p:sld>
 </file>
 
@@ -21266,7 +23861,7 @@
           <p:cNvPr id="51" name="TextBox 50">
             <a:extLst>
               <a:ext uri="{FF2B5EF4-FFF2-40B4-BE49-F238E27FC236}">
-                <a16:creationId xmlns="" xmlns:a16="http://schemas.microsoft.com/office/drawing/2014/main" id="{38D92C47-6A24-433B-A9D7-48400DFBEE88}"/>
+                <a16:creationId xmlns:a16="http://schemas.microsoft.com/office/drawing/2014/main" xmlns="" id="{38D92C47-6A24-433B-A9D7-48400DFBEE88}"/>
               </a:ext>
             </a:extLst>
           </p:cNvPr>
@@ -21307,7 +23902,7 @@
           <p:cNvPr id="52" name="TextBox 51">
             <a:extLst>
               <a:ext uri="{FF2B5EF4-FFF2-40B4-BE49-F238E27FC236}">
-                <a16:creationId xmlns="" xmlns:a16="http://schemas.microsoft.com/office/drawing/2014/main" id="{46370455-EDDE-4BAF-A68F-1E721D22CFA3}"/>
+                <a16:creationId xmlns:a16="http://schemas.microsoft.com/office/drawing/2014/main" xmlns="" id="{46370455-EDDE-4BAF-A68F-1E721D22CFA3}"/>
               </a:ext>
             </a:extLst>
           </p:cNvPr>
@@ -21348,7 +23943,7 @@
           <p:cNvPr id="54" name="TextBox 53">
             <a:extLst>
               <a:ext uri="{FF2B5EF4-FFF2-40B4-BE49-F238E27FC236}">
-                <a16:creationId xmlns="" xmlns:a16="http://schemas.microsoft.com/office/drawing/2014/main" id="{1F0BD362-AB28-4ABC-B01D-E5FB51A4284F}"/>
+                <a16:creationId xmlns:a16="http://schemas.microsoft.com/office/drawing/2014/main" xmlns="" id="{1F0BD362-AB28-4ABC-B01D-E5FB51A4284F}"/>
               </a:ext>
             </a:extLst>
           </p:cNvPr>
@@ -21383,7 +23978,7 @@
           <p:cNvPr id="55" name="TextBox 54">
             <a:extLst>
               <a:ext uri="{FF2B5EF4-FFF2-40B4-BE49-F238E27FC236}">
-                <a16:creationId xmlns="" xmlns:a16="http://schemas.microsoft.com/office/drawing/2014/main" id="{66A6D040-E92F-405E-8F1C-224FD73DEB6A}"/>
+                <a16:creationId xmlns:a16="http://schemas.microsoft.com/office/drawing/2014/main" xmlns="" id="{66A6D040-E92F-405E-8F1C-224FD73DEB6A}"/>
               </a:ext>
             </a:extLst>
           </p:cNvPr>
@@ -21424,7 +24019,7 @@
           <p:cNvPr id="59" name="TextBox 58">
             <a:extLst>
               <a:ext uri="{FF2B5EF4-FFF2-40B4-BE49-F238E27FC236}">
-                <a16:creationId xmlns="" xmlns:a16="http://schemas.microsoft.com/office/drawing/2014/main" id="{8B737B46-BF72-4F50-880F-A81417342B9C}"/>
+                <a16:creationId xmlns:a16="http://schemas.microsoft.com/office/drawing/2014/main" xmlns="" id="{8B737B46-BF72-4F50-880F-A81417342B9C}"/>
               </a:ext>
             </a:extLst>
           </p:cNvPr>
@@ -21465,7 +24060,7 @@
           <p:cNvPr id="60" name="TextBox 59">
             <a:extLst>
               <a:ext uri="{FF2B5EF4-FFF2-40B4-BE49-F238E27FC236}">
-                <a16:creationId xmlns="" xmlns:a16="http://schemas.microsoft.com/office/drawing/2014/main" id="{635E5AB3-11BB-4188-A9F5-6624D8487908}"/>
+                <a16:creationId xmlns:a16="http://schemas.microsoft.com/office/drawing/2014/main" xmlns="" id="{635E5AB3-11BB-4188-A9F5-6624D8487908}"/>
               </a:ext>
             </a:extLst>
           </p:cNvPr>
@@ -23539,7 +26134,7 @@
           <p:cNvPr id="43" name="TextBox 42">
             <a:extLst>
               <a:ext uri="{FF2B5EF4-FFF2-40B4-BE49-F238E27FC236}">
-                <a16:creationId xmlns="" xmlns:a16="http://schemas.microsoft.com/office/drawing/2014/main" id="{C66D85E0-1A23-448C-9466-6DADEA26156A}"/>
+                <a16:creationId xmlns:a16="http://schemas.microsoft.com/office/drawing/2014/main" xmlns="" id="{C66D85E0-1A23-448C-9466-6DADEA26156A}"/>
               </a:ext>
             </a:extLst>
           </p:cNvPr>
@@ -23580,7 +26175,7 @@
           <p:cNvPr id="44" name="TextBox 43">
             <a:extLst>
               <a:ext uri="{FF2B5EF4-FFF2-40B4-BE49-F238E27FC236}">
-                <a16:creationId xmlns="" xmlns:a16="http://schemas.microsoft.com/office/drawing/2014/main" id="{73BB0B6F-DBD2-4682-88DA-A68E1C43C8EE}"/>
+                <a16:creationId xmlns:a16="http://schemas.microsoft.com/office/drawing/2014/main" xmlns="" id="{73BB0B6F-DBD2-4682-88DA-A68E1C43C8EE}"/>
               </a:ext>
             </a:extLst>
           </p:cNvPr>
@@ -23621,7 +26216,7 @@
           <p:cNvPr id="45" name="TextBox 44">
             <a:extLst>
               <a:ext uri="{FF2B5EF4-FFF2-40B4-BE49-F238E27FC236}">
-                <a16:creationId xmlns="" xmlns:a16="http://schemas.microsoft.com/office/drawing/2014/main" id="{06BB9D57-20AB-4911-8F91-1EAAD2C3D635}"/>
+                <a16:creationId xmlns:a16="http://schemas.microsoft.com/office/drawing/2014/main" xmlns="" id="{06BB9D57-20AB-4911-8F91-1EAAD2C3D635}"/>
               </a:ext>
             </a:extLst>
           </p:cNvPr>
@@ -23656,7 +26251,7 @@
           <p:cNvPr id="46" name="TextBox 45">
             <a:extLst>
               <a:ext uri="{FF2B5EF4-FFF2-40B4-BE49-F238E27FC236}">
-                <a16:creationId xmlns="" xmlns:a16="http://schemas.microsoft.com/office/drawing/2014/main" id="{6BDA7693-CA76-4C97-8FED-A4A65AB5032B}"/>
+                <a16:creationId xmlns:a16="http://schemas.microsoft.com/office/drawing/2014/main" xmlns="" id="{6BDA7693-CA76-4C97-8FED-A4A65AB5032B}"/>
               </a:ext>
             </a:extLst>
           </p:cNvPr>
@@ -23697,7 +26292,7 @@
           <p:cNvPr id="47" name="TextBox 46">
             <a:extLst>
               <a:ext uri="{FF2B5EF4-FFF2-40B4-BE49-F238E27FC236}">
-                <a16:creationId xmlns="" xmlns:a16="http://schemas.microsoft.com/office/drawing/2014/main" id="{F3FF60E3-5733-4A51-BB64-B5D227CFB6FE}"/>
+                <a16:creationId xmlns:a16="http://schemas.microsoft.com/office/drawing/2014/main" xmlns="" id="{F3FF60E3-5733-4A51-BB64-B5D227CFB6FE}"/>
               </a:ext>
             </a:extLst>
           </p:cNvPr>
@@ -23738,7 +26333,7 @@
           <p:cNvPr id="48" name="TextBox 47">
             <a:extLst>
               <a:ext uri="{FF2B5EF4-FFF2-40B4-BE49-F238E27FC236}">
-                <a16:creationId xmlns="" xmlns:a16="http://schemas.microsoft.com/office/drawing/2014/main" id="{6CFBFA02-2444-480B-B78F-A1A7AD55973E}"/>
+                <a16:creationId xmlns:a16="http://schemas.microsoft.com/office/drawing/2014/main" xmlns="" id="{6CFBFA02-2444-480B-B78F-A1A7AD55973E}"/>
               </a:ext>
             </a:extLst>
           </p:cNvPr>
@@ -24529,7 +27124,7 @@
           <p:cNvPr id="12" name="TextBox 45">
             <a:extLst>
               <a:ext uri="{FF2B5EF4-FFF2-40B4-BE49-F238E27FC236}">
-                <a16:creationId xmlns="" xmlns:a16="http://schemas.microsoft.com/office/drawing/2014/main" id="{6BDA7693-CA76-4C97-8FED-A4A65AB5032B}"/>
+                <a16:creationId xmlns:a16="http://schemas.microsoft.com/office/drawing/2014/main" xmlns="" id="{6BDA7693-CA76-4C97-8FED-A4A65AB5032B}"/>
               </a:ext>
             </a:extLst>
           </p:cNvPr>
@@ -25207,7 +27802,7 @@
           <p:cNvPr id="33" name="TextBox 45">
             <a:extLst>
               <a:ext uri="{FF2B5EF4-FFF2-40B4-BE49-F238E27FC236}">
-                <a16:creationId xmlns="" xmlns:a16="http://schemas.microsoft.com/office/drawing/2014/main" id="{6BDA7693-CA76-4C97-8FED-A4A65AB5032B}"/>
+                <a16:creationId xmlns:a16="http://schemas.microsoft.com/office/drawing/2014/main" xmlns="" id="{6BDA7693-CA76-4C97-8FED-A4A65AB5032B}"/>
               </a:ext>
             </a:extLst>
           </p:cNvPr>
@@ -25243,7 +27838,7 @@
           <p:cNvPr id="34" name="TextBox 45">
             <a:extLst>
               <a:ext uri="{FF2B5EF4-FFF2-40B4-BE49-F238E27FC236}">
-                <a16:creationId xmlns="" xmlns:a16="http://schemas.microsoft.com/office/drawing/2014/main" id="{6BDA7693-CA76-4C97-8FED-A4A65AB5032B}"/>
+                <a16:creationId xmlns:a16="http://schemas.microsoft.com/office/drawing/2014/main" xmlns="" id="{6BDA7693-CA76-4C97-8FED-A4A65AB5032B}"/>
               </a:ext>
             </a:extLst>
           </p:cNvPr>
@@ -25653,7 +28248,7 @@
           <p:cNvPr id="52" name="TextBox 45">
             <a:extLst>
               <a:ext uri="{FF2B5EF4-FFF2-40B4-BE49-F238E27FC236}">
-                <a16:creationId xmlns="" xmlns:a16="http://schemas.microsoft.com/office/drawing/2014/main" id="{6BDA7693-CA76-4C97-8FED-A4A65AB5032B}"/>
+                <a16:creationId xmlns:a16="http://schemas.microsoft.com/office/drawing/2014/main" xmlns="" id="{6BDA7693-CA76-4C97-8FED-A4A65AB5032B}"/>
               </a:ext>
             </a:extLst>
           </p:cNvPr>

</xml_diff>

<commit_message>
analisi interazione server non-FHIR
</commit_message>
<xml_diff>
--- a/health/userDocs/UniboFigs.pptx
+++ b/health/userDocs/UniboFigs.pptx
@@ -19,13 +19,14 @@
     <p:sldId id="271" r:id="rId13"/>
     <p:sldId id="270" r:id="rId14"/>
     <p:sldId id="272" r:id="rId15"/>
-    <p:sldId id="277" r:id="rId16"/>
-    <p:sldId id="278" r:id="rId17"/>
-    <p:sldId id="280" r:id="rId18"/>
-    <p:sldId id="273" r:id="rId19"/>
-    <p:sldId id="274" r:id="rId20"/>
-    <p:sldId id="275" r:id="rId21"/>
-    <p:sldId id="276" r:id="rId22"/>
+    <p:sldId id="281" r:id="rId16"/>
+    <p:sldId id="277" r:id="rId17"/>
+    <p:sldId id="278" r:id="rId18"/>
+    <p:sldId id="280" r:id="rId19"/>
+    <p:sldId id="273" r:id="rId20"/>
+    <p:sldId id="274" r:id="rId21"/>
+    <p:sldId id="275" r:id="rId22"/>
+    <p:sldId id="276" r:id="rId23"/>
   </p:sldIdLst>
   <p:sldSz cx="9144000" cy="6858000" type="screen4x3"/>
   <p:notesSz cx="6858000" cy="9144000"/>
@@ -126,7 +127,7 @@
   </p:defaultTextStyle>
   <p:extLst>
     <p:ext uri="{EFAFB233-063F-42B5-8137-9DF3F51BA10A}">
-      <p15:sldGuideLst xmlns="" xmlns:p15="http://schemas.microsoft.com/office/powerpoint/2012/main">
+      <p15:sldGuideLst xmlns:p15="http://schemas.microsoft.com/office/powerpoint/2012/main" xmlns="">
         <p15:guide id="1" orient="horz" pos="2160">
           <p15:clr>
             <a:srgbClr val="A4A3A4"/>
@@ -324,7 +325,7 @@
           <a:p>
             <a:fld id="{486DFF9D-000F-417D-A1D1-C441A4010B1E}" type="datetimeFigureOut">
               <a:rPr lang="en-GB" smtClean="0"/>
-              <a:t>24/08/2020</a:t>
+              <a:t>26/08/2020</a:t>
             </a:fld>
             <a:endParaRPr lang="en-GB"/>
           </a:p>
@@ -494,7 +495,7 @@
           <a:p>
             <a:fld id="{486DFF9D-000F-417D-A1D1-C441A4010B1E}" type="datetimeFigureOut">
               <a:rPr lang="en-GB" smtClean="0"/>
-              <a:t>24/08/2020</a:t>
+              <a:t>26/08/2020</a:t>
             </a:fld>
             <a:endParaRPr lang="en-GB"/>
           </a:p>
@@ -674,7 +675,7 @@
           <a:p>
             <a:fld id="{486DFF9D-000F-417D-A1D1-C441A4010B1E}" type="datetimeFigureOut">
               <a:rPr lang="en-GB" smtClean="0"/>
-              <a:t>24/08/2020</a:t>
+              <a:t>26/08/2020</a:t>
             </a:fld>
             <a:endParaRPr lang="en-GB"/>
           </a:p>
@@ -844,7 +845,7 @@
           <a:p>
             <a:fld id="{486DFF9D-000F-417D-A1D1-C441A4010B1E}" type="datetimeFigureOut">
               <a:rPr lang="en-GB" smtClean="0"/>
-              <a:t>24/08/2020</a:t>
+              <a:t>26/08/2020</a:t>
             </a:fld>
             <a:endParaRPr lang="en-GB"/>
           </a:p>
@@ -1090,7 +1091,7 @@
           <a:p>
             <a:fld id="{486DFF9D-000F-417D-A1D1-C441A4010B1E}" type="datetimeFigureOut">
               <a:rPr lang="en-GB" smtClean="0"/>
-              <a:t>24/08/2020</a:t>
+              <a:t>26/08/2020</a:t>
             </a:fld>
             <a:endParaRPr lang="en-GB"/>
           </a:p>
@@ -1378,7 +1379,7 @@
           <a:p>
             <a:fld id="{486DFF9D-000F-417D-A1D1-C441A4010B1E}" type="datetimeFigureOut">
               <a:rPr lang="en-GB" smtClean="0"/>
-              <a:t>24/08/2020</a:t>
+              <a:t>26/08/2020</a:t>
             </a:fld>
             <a:endParaRPr lang="en-GB"/>
           </a:p>
@@ -1800,7 +1801,7 @@
           <a:p>
             <a:fld id="{486DFF9D-000F-417D-A1D1-C441A4010B1E}" type="datetimeFigureOut">
               <a:rPr lang="en-GB" smtClean="0"/>
-              <a:t>24/08/2020</a:t>
+              <a:t>26/08/2020</a:t>
             </a:fld>
             <a:endParaRPr lang="en-GB"/>
           </a:p>
@@ -1918,7 +1919,7 @@
           <a:p>
             <a:fld id="{486DFF9D-000F-417D-A1D1-C441A4010B1E}" type="datetimeFigureOut">
               <a:rPr lang="en-GB" smtClean="0"/>
-              <a:t>24/08/2020</a:t>
+              <a:t>26/08/2020</a:t>
             </a:fld>
             <a:endParaRPr lang="en-GB"/>
           </a:p>
@@ -2013,7 +2014,7 @@
           <a:p>
             <a:fld id="{486DFF9D-000F-417D-A1D1-C441A4010B1E}" type="datetimeFigureOut">
               <a:rPr lang="en-GB" smtClean="0"/>
-              <a:t>24/08/2020</a:t>
+              <a:t>26/08/2020</a:t>
             </a:fld>
             <a:endParaRPr lang="en-GB"/>
           </a:p>
@@ -2290,7 +2291,7 @@
           <a:p>
             <a:fld id="{486DFF9D-000F-417D-A1D1-C441A4010B1E}" type="datetimeFigureOut">
               <a:rPr lang="en-GB" smtClean="0"/>
-              <a:t>24/08/2020</a:t>
+              <a:t>26/08/2020</a:t>
             </a:fld>
             <a:endParaRPr lang="en-GB"/>
           </a:p>
@@ -2543,7 +2544,7 @@
           <a:p>
             <a:fld id="{486DFF9D-000F-417D-A1D1-C441A4010B1E}" type="datetimeFigureOut">
               <a:rPr lang="en-GB" smtClean="0"/>
-              <a:t>24/08/2020</a:t>
+              <a:t>26/08/2020</a:t>
             </a:fld>
             <a:endParaRPr lang="en-GB"/>
           </a:p>
@@ -2756,7 +2757,7 @@
           <a:p>
             <a:fld id="{486DFF9D-000F-417D-A1D1-C441A4010B1E}" type="datetimeFigureOut">
               <a:rPr lang="en-GB" smtClean="0"/>
-              <a:t>24/08/2020</a:t>
+              <a:t>26/08/2020</a:t>
             </a:fld>
             <a:endParaRPr lang="en-GB"/>
           </a:p>
@@ -6173,7 +6174,7 @@
           <p:cNvPr id="12" name="TextBox 45">
             <a:extLst>
               <a:ext uri="{FF2B5EF4-FFF2-40B4-BE49-F238E27FC236}">
-                <a16:creationId xmlns="" xmlns:a16="http://schemas.microsoft.com/office/drawing/2014/main" id="{6BDA7693-CA76-4C97-8FED-A4A65AB5032B}"/>
+                <a16:creationId xmlns:a16="http://schemas.microsoft.com/office/drawing/2014/main" xmlns="" id="{6BDA7693-CA76-4C97-8FED-A4A65AB5032B}"/>
               </a:ext>
             </a:extLst>
           </p:cNvPr>
@@ -7721,7 +7722,7 @@
           <p:cNvPr id="12" name="TextBox 45">
             <a:extLst>
               <a:ext uri="{FF2B5EF4-FFF2-40B4-BE49-F238E27FC236}">
-                <a16:creationId xmlns="" xmlns:a16="http://schemas.microsoft.com/office/drawing/2014/main" id="{6BDA7693-CA76-4C97-8FED-A4A65AB5032B}"/>
+                <a16:creationId xmlns:a16="http://schemas.microsoft.com/office/drawing/2014/main" xmlns="" id="{6BDA7693-CA76-4C97-8FED-A4A65AB5032B}"/>
               </a:ext>
             </a:extLst>
           </p:cNvPr>
@@ -9734,7 +9735,7 @@
           <p:cNvPr id="6" name="TextBox 45">
             <a:extLst>
               <a:ext uri="{FF2B5EF4-FFF2-40B4-BE49-F238E27FC236}">
-                <a16:creationId xmlns="" xmlns:a16="http://schemas.microsoft.com/office/drawing/2014/main" id="{6BDA7693-CA76-4C97-8FED-A4A65AB5032B}"/>
+                <a16:creationId xmlns:a16="http://schemas.microsoft.com/office/drawing/2014/main" xmlns="" id="{6BDA7693-CA76-4C97-8FED-A4A65AB5032B}"/>
               </a:ext>
             </a:extLst>
           </p:cNvPr>
@@ -10242,7 +10243,7 @@
           <p:cNvPr id="27" name="TextBox 45">
             <a:extLst>
               <a:ext uri="{FF2B5EF4-FFF2-40B4-BE49-F238E27FC236}">
-                <a16:creationId xmlns="" xmlns:a16="http://schemas.microsoft.com/office/drawing/2014/main" id="{6BDA7693-CA76-4C97-8FED-A4A65AB5032B}"/>
+                <a16:creationId xmlns:a16="http://schemas.microsoft.com/office/drawing/2014/main" xmlns="" id="{6BDA7693-CA76-4C97-8FED-A4A65AB5032B}"/>
               </a:ext>
             </a:extLst>
           </p:cNvPr>
@@ -10278,7 +10279,7 @@
           <p:cNvPr id="28" name="TextBox 45">
             <a:extLst>
               <a:ext uri="{FF2B5EF4-FFF2-40B4-BE49-F238E27FC236}">
-                <a16:creationId xmlns="" xmlns:a16="http://schemas.microsoft.com/office/drawing/2014/main" id="{6BDA7693-CA76-4C97-8FED-A4A65AB5032B}"/>
+                <a16:creationId xmlns:a16="http://schemas.microsoft.com/office/drawing/2014/main" xmlns="" id="{6BDA7693-CA76-4C97-8FED-A4A65AB5032B}"/>
               </a:ext>
             </a:extLst>
           </p:cNvPr>
@@ -11826,7 +11827,7 @@
           <p:cNvPr id="6" name="TextBox 45">
             <a:extLst>
               <a:ext uri="{FF2B5EF4-FFF2-40B4-BE49-F238E27FC236}">
-                <a16:creationId xmlns="" xmlns:a16="http://schemas.microsoft.com/office/drawing/2014/main" id="{6BDA7693-CA76-4C97-8FED-A4A65AB5032B}"/>
+                <a16:creationId xmlns:a16="http://schemas.microsoft.com/office/drawing/2014/main" xmlns="" id="{6BDA7693-CA76-4C97-8FED-A4A65AB5032B}"/>
               </a:ext>
             </a:extLst>
           </p:cNvPr>
@@ -13148,6 +13149,1616 @@
       </p:grpSpPr>
       <p:cxnSp>
         <p:nvCxnSpPr>
+          <p:cNvPr id="39" name="Connettore 1 38"/>
+          <p:cNvCxnSpPr/>
+          <p:nvPr/>
+        </p:nvCxnSpPr>
+        <p:spPr>
+          <a:xfrm flipH="1">
+            <a:off x="3170215" y="1288864"/>
+            <a:ext cx="33952" cy="3130316"/>
+          </a:xfrm>
+          <a:prstGeom prst="line">
+            <a:avLst/>
+          </a:prstGeom>
+        </p:spPr>
+        <p:style>
+          <a:lnRef idx="1">
+            <a:schemeClr val="accent1"/>
+          </a:lnRef>
+          <a:fillRef idx="0">
+            <a:schemeClr val="accent1"/>
+          </a:fillRef>
+          <a:effectRef idx="0">
+            <a:schemeClr val="accent1"/>
+          </a:effectRef>
+          <a:fontRef idx="minor">
+            <a:schemeClr val="tx1"/>
+          </a:fontRef>
+        </p:style>
+      </p:cxnSp>
+      <p:cxnSp>
+        <p:nvCxnSpPr>
+          <p:cNvPr id="40" name="Connettore 1 39"/>
+          <p:cNvCxnSpPr/>
+          <p:nvPr/>
+        </p:nvCxnSpPr>
+        <p:spPr>
+          <a:xfrm>
+            <a:off x="5773965" y="1096756"/>
+            <a:ext cx="0" cy="3400564"/>
+          </a:xfrm>
+          <a:prstGeom prst="line">
+            <a:avLst/>
+          </a:prstGeom>
+        </p:spPr>
+        <p:style>
+          <a:lnRef idx="1">
+            <a:schemeClr val="accent1"/>
+          </a:lnRef>
+          <a:fillRef idx="0">
+            <a:schemeClr val="accent1"/>
+          </a:fillRef>
+          <a:effectRef idx="0">
+            <a:schemeClr val="accent1"/>
+          </a:effectRef>
+          <a:fontRef idx="minor">
+            <a:schemeClr val="tx1"/>
+          </a:fontRef>
+        </p:style>
+      </p:cxnSp>
+      <p:grpSp>
+        <p:nvGrpSpPr>
+          <p:cNvPr id="2" name="Gruppo 1"/>
+          <p:cNvGrpSpPr/>
+          <p:nvPr/>
+        </p:nvGrpSpPr>
+        <p:grpSpPr>
+          <a:xfrm>
+            <a:off x="6432359" y="3248126"/>
+            <a:ext cx="805955" cy="772447"/>
+            <a:chOff x="565700" y="4940367"/>
+            <a:chExt cx="805955" cy="772447"/>
+          </a:xfrm>
+        </p:grpSpPr>
+        <p:sp>
+          <p:nvSpPr>
+            <p:cNvPr id="3" name="Ovale 2"/>
+            <p:cNvSpPr/>
+            <p:nvPr/>
+          </p:nvSpPr>
+          <p:spPr>
+            <a:xfrm>
+              <a:off x="565700" y="4983583"/>
+              <a:ext cx="805955" cy="729231"/>
+            </a:xfrm>
+            <a:prstGeom prst="ellipse">
+              <a:avLst/>
+            </a:prstGeom>
+            <a:solidFill>
+              <a:srgbClr val="FF99CC"/>
+            </a:solidFill>
+          </p:spPr>
+          <p:style>
+            <a:lnRef idx="2">
+              <a:schemeClr val="accent1">
+                <a:shade val="50000"/>
+              </a:schemeClr>
+            </a:lnRef>
+            <a:fillRef idx="1">
+              <a:schemeClr val="accent1"/>
+            </a:fillRef>
+            <a:effectRef idx="0">
+              <a:schemeClr val="accent1"/>
+            </a:effectRef>
+            <a:fontRef idx="minor">
+              <a:schemeClr val="lt1"/>
+            </a:fontRef>
+          </p:style>
+          <p:txBody>
+            <a:bodyPr rtlCol="0" anchor="ctr"/>
+            <a:lstStyle/>
+            <a:p>
+              <a:pPr algn="ctr"/>
+              <a:r>
+                <a:rPr lang="en-GB" dirty="0">
+                  <a:solidFill>
+                    <a:schemeClr val="lt1"/>
+                  </a:solidFill>
+                </a:rPr>
+                <a:t> </a:t>
+              </a:r>
+            </a:p>
+          </p:txBody>
+        </p:sp>
+        <p:sp>
+          <p:nvSpPr>
+            <p:cNvPr id="4" name="Triangolo isoscele 3"/>
+            <p:cNvSpPr/>
+            <p:nvPr/>
+          </p:nvSpPr>
+          <p:spPr>
+            <a:xfrm rot="16200000">
+              <a:off x="905299" y="4913952"/>
+              <a:ext cx="86434" cy="139263"/>
+            </a:xfrm>
+            <a:prstGeom prst="triangle">
+              <a:avLst/>
+            </a:prstGeom>
+            <a:solidFill>
+              <a:srgbClr val="FF99CC"/>
+            </a:solidFill>
+            <a:ln>
+              <a:solidFill>
+                <a:schemeClr val="tx1"/>
+              </a:solidFill>
+            </a:ln>
+          </p:spPr>
+          <p:style>
+            <a:lnRef idx="2">
+              <a:schemeClr val="accent1">
+                <a:shade val="50000"/>
+              </a:schemeClr>
+            </a:lnRef>
+            <a:fillRef idx="1">
+              <a:schemeClr val="accent1"/>
+            </a:fillRef>
+            <a:effectRef idx="0">
+              <a:schemeClr val="accent1"/>
+            </a:effectRef>
+            <a:fontRef idx="minor">
+              <a:schemeClr val="lt1"/>
+            </a:fontRef>
+          </p:style>
+          <p:txBody>
+            <a:bodyPr rtlCol="0" anchor="ctr"/>
+            <a:lstStyle/>
+            <a:p>
+              <a:pPr algn="ctr"/>
+              <a:endParaRPr lang="en-GB">
+                <a:solidFill>
+                  <a:schemeClr val="lt1"/>
+                </a:solidFill>
+              </a:endParaRPr>
+            </a:p>
+          </p:txBody>
+        </p:sp>
+      </p:grpSp>
+      <p:sp>
+        <p:nvSpPr>
+          <p:cNvPr id="5" name="CasellaDiTesto 4"/>
+          <p:cNvSpPr txBox="1"/>
+          <p:nvPr/>
+        </p:nvSpPr>
+        <p:spPr>
+          <a:xfrm>
+            <a:off x="6572463" y="1205059"/>
+            <a:ext cx="1460528" cy="369332"/>
+          </a:xfrm>
+          <a:prstGeom prst="rect">
+            <a:avLst/>
+          </a:prstGeom>
+          <a:noFill/>
+        </p:spPr>
+        <p:txBody>
+          <a:bodyPr wrap="none" rtlCol="0">
+            <a:spAutoFit/>
+          </a:bodyPr>
+          <a:lstStyle/>
+          <a:p>
+            <a:r>
+              <a:rPr lang="en-GB" b="1" dirty="0" err="1"/>
+              <a:t>CentroHealth</a:t>
+            </a:r>
+            <a:endParaRPr lang="en-GB" dirty="0"/>
+          </a:p>
+        </p:txBody>
+      </p:sp>
+      <p:sp>
+        <p:nvSpPr>
+          <p:cNvPr id="6" name="TextBox 45">
+            <a:extLst>
+              <a:ext uri="{FF2B5EF4-FFF2-40B4-BE49-F238E27FC236}">
+                <a16:creationId xmlns:a16="http://schemas.microsoft.com/office/drawing/2014/main" xmlns="" id="{6BDA7693-CA76-4C97-8FED-A4A65AB5032B}"/>
+              </a:ext>
+            </a:extLst>
+          </p:cNvPr>
+          <p:cNvSpPr txBox="1"/>
+          <p:nvPr/>
+        </p:nvSpPr>
+        <p:spPr>
+          <a:xfrm>
+            <a:off x="3648643" y="1205059"/>
+            <a:ext cx="1568443" cy="369332"/>
+          </a:xfrm>
+          <a:prstGeom prst="rect">
+            <a:avLst/>
+          </a:prstGeom>
+          <a:noFill/>
+        </p:spPr>
+        <p:txBody>
+          <a:bodyPr wrap="none" rtlCol="0">
+            <a:spAutoFit/>
+          </a:bodyPr>
+          <a:lstStyle/>
+          <a:p>
+            <a:r>
+              <a:rPr lang="en-US" b="1" dirty="0" err="1"/>
+              <a:t>HealthProduct</a:t>
+            </a:r>
+            <a:endParaRPr lang="en-US" b="1" dirty="0"/>
+          </a:p>
+        </p:txBody>
+      </p:sp>
+      <p:grpSp>
+        <p:nvGrpSpPr>
+          <p:cNvPr id="7" name="Gruppo 6"/>
+          <p:cNvGrpSpPr/>
+          <p:nvPr/>
+        </p:nvGrpSpPr>
+        <p:grpSpPr>
+          <a:xfrm>
+            <a:off x="3971455" y="2036757"/>
+            <a:ext cx="805955" cy="772447"/>
+            <a:chOff x="565700" y="4940367"/>
+            <a:chExt cx="805955" cy="772447"/>
+          </a:xfrm>
+        </p:grpSpPr>
+        <p:sp>
+          <p:nvSpPr>
+            <p:cNvPr id="8" name="Ovale 7"/>
+            <p:cNvSpPr/>
+            <p:nvPr/>
+          </p:nvSpPr>
+          <p:spPr>
+            <a:xfrm>
+              <a:off x="565700" y="4983583"/>
+              <a:ext cx="805955" cy="729231"/>
+            </a:xfrm>
+            <a:prstGeom prst="ellipse">
+              <a:avLst/>
+            </a:prstGeom>
+            <a:ln/>
+          </p:spPr>
+          <p:style>
+            <a:lnRef idx="1">
+              <a:schemeClr val="accent4"/>
+            </a:lnRef>
+            <a:fillRef idx="2">
+              <a:schemeClr val="accent4"/>
+            </a:fillRef>
+            <a:effectRef idx="1">
+              <a:schemeClr val="accent4"/>
+            </a:effectRef>
+            <a:fontRef idx="minor">
+              <a:schemeClr val="dk1"/>
+            </a:fontRef>
+          </p:style>
+          <p:txBody>
+            <a:bodyPr rtlCol="0" anchor="ctr"/>
+            <a:lstStyle/>
+            <a:p>
+              <a:pPr algn="ctr"/>
+              <a:r>
+                <a:rPr lang="en-GB" sz="1200" dirty="0"/>
+                <a:t> </a:t>
+              </a:r>
+            </a:p>
+          </p:txBody>
+        </p:sp>
+        <p:sp>
+          <p:nvSpPr>
+            <p:cNvPr id="9" name="Triangolo isoscele 8"/>
+            <p:cNvSpPr/>
+            <p:nvPr/>
+          </p:nvSpPr>
+          <p:spPr>
+            <a:xfrm rot="16200000">
+              <a:off x="905299" y="4913952"/>
+              <a:ext cx="86434" cy="139263"/>
+            </a:xfrm>
+            <a:prstGeom prst="triangle">
+              <a:avLst/>
+            </a:prstGeom>
+            <a:solidFill>
+              <a:srgbClr val="C00000"/>
+            </a:solidFill>
+            <a:ln/>
+          </p:spPr>
+          <p:style>
+            <a:lnRef idx="1">
+              <a:schemeClr val="accent5"/>
+            </a:lnRef>
+            <a:fillRef idx="2">
+              <a:schemeClr val="accent5"/>
+            </a:fillRef>
+            <a:effectRef idx="1">
+              <a:schemeClr val="accent5"/>
+            </a:effectRef>
+            <a:fontRef idx="minor">
+              <a:schemeClr val="dk1"/>
+            </a:fontRef>
+          </p:style>
+          <p:txBody>
+            <a:bodyPr rtlCol="0" anchor="ctr"/>
+            <a:lstStyle/>
+            <a:p>
+              <a:pPr algn="ctr"/>
+              <a:endParaRPr lang="en-GB" sz="1200">
+                <a:solidFill>
+                  <a:schemeClr val="dk1"/>
+                </a:solidFill>
+              </a:endParaRPr>
+            </a:p>
+          </p:txBody>
+        </p:sp>
+      </p:grpSp>
+      <p:grpSp>
+        <p:nvGrpSpPr>
+          <p:cNvPr id="16" name="Gruppo 15"/>
+          <p:cNvGrpSpPr/>
+          <p:nvPr/>
+        </p:nvGrpSpPr>
+        <p:grpSpPr>
+          <a:xfrm>
+            <a:off x="5259578" y="3480121"/>
+            <a:ext cx="666895" cy="86434"/>
+            <a:chOff x="4592177" y="4419530"/>
+            <a:chExt cx="666895" cy="86434"/>
+          </a:xfrm>
+        </p:grpSpPr>
+        <p:cxnSp>
+          <p:nvCxnSpPr>
+            <p:cNvPr id="17" name="Connettore 1 16"/>
+            <p:cNvCxnSpPr/>
+            <p:nvPr/>
+          </p:nvCxnSpPr>
+          <p:spPr>
+            <a:xfrm>
+              <a:off x="4611000" y="4462747"/>
+              <a:ext cx="648072" cy="0"/>
+            </a:xfrm>
+            <a:prstGeom prst="line">
+              <a:avLst/>
+            </a:prstGeom>
+            <a:ln/>
+          </p:spPr>
+          <p:style>
+            <a:lnRef idx="1">
+              <a:schemeClr val="accent6"/>
+            </a:lnRef>
+            <a:fillRef idx="2">
+              <a:schemeClr val="accent6"/>
+            </a:fillRef>
+            <a:effectRef idx="1">
+              <a:schemeClr val="accent6"/>
+            </a:effectRef>
+            <a:fontRef idx="minor">
+              <a:schemeClr val="dk1"/>
+            </a:fontRef>
+          </p:style>
+        </p:cxnSp>
+        <p:sp>
+          <p:nvSpPr>
+            <p:cNvPr id="18" name="Triangolo isoscele 17"/>
+            <p:cNvSpPr/>
+            <p:nvPr/>
+          </p:nvSpPr>
+          <p:spPr>
+            <a:xfrm rot="16200000">
+              <a:off x="4618592" y="4393115"/>
+              <a:ext cx="86434" cy="139263"/>
+            </a:xfrm>
+            <a:prstGeom prst="triangle">
+              <a:avLst/>
+            </a:prstGeom>
+            <a:ln/>
+          </p:spPr>
+          <p:style>
+            <a:lnRef idx="1">
+              <a:schemeClr val="accent6"/>
+            </a:lnRef>
+            <a:fillRef idx="2">
+              <a:schemeClr val="accent6"/>
+            </a:fillRef>
+            <a:effectRef idx="1">
+              <a:schemeClr val="accent6"/>
+            </a:effectRef>
+            <a:fontRef idx="minor">
+              <a:schemeClr val="dk1"/>
+            </a:fontRef>
+          </p:style>
+          <p:txBody>
+            <a:bodyPr rtlCol="0" anchor="ctr"/>
+            <a:lstStyle/>
+            <a:p>
+              <a:pPr algn="ctr"/>
+              <a:endParaRPr lang="en-GB" sz="1200"/>
+            </a:p>
+          </p:txBody>
+        </p:sp>
+      </p:grpSp>
+      <p:grpSp>
+        <p:nvGrpSpPr>
+          <p:cNvPr id="19" name="Gruppo 18"/>
+          <p:cNvGrpSpPr/>
+          <p:nvPr/>
+        </p:nvGrpSpPr>
+        <p:grpSpPr>
+          <a:xfrm>
+            <a:off x="5251491" y="3283916"/>
+            <a:ext cx="787334" cy="86434"/>
+            <a:chOff x="3452446" y="4176616"/>
+            <a:chExt cx="787334" cy="86434"/>
+          </a:xfrm>
+        </p:grpSpPr>
+        <p:sp>
+          <p:nvSpPr>
+            <p:cNvPr id="20" name="Triangolo isoscele 19"/>
+            <p:cNvSpPr/>
+            <p:nvPr/>
+          </p:nvSpPr>
+          <p:spPr>
+            <a:xfrm rot="5400000" flipH="1">
+              <a:off x="4126932" y="4150201"/>
+              <a:ext cx="86434" cy="139263"/>
+            </a:xfrm>
+            <a:prstGeom prst="triangle">
+              <a:avLst/>
+            </a:prstGeom>
+            <a:ln/>
+          </p:spPr>
+          <p:style>
+            <a:lnRef idx="1">
+              <a:schemeClr val="accent6"/>
+            </a:lnRef>
+            <a:fillRef idx="2">
+              <a:schemeClr val="accent6"/>
+            </a:fillRef>
+            <a:effectRef idx="1">
+              <a:schemeClr val="accent6"/>
+            </a:effectRef>
+            <a:fontRef idx="minor">
+              <a:schemeClr val="dk1"/>
+            </a:fontRef>
+          </p:style>
+          <p:txBody>
+            <a:bodyPr rtlCol="0" anchor="ctr"/>
+            <a:lstStyle/>
+            <a:p>
+              <a:pPr algn="ctr"/>
+              <a:endParaRPr lang="en-GB" sz="1200"/>
+            </a:p>
+          </p:txBody>
+        </p:sp>
+        <p:cxnSp>
+          <p:nvCxnSpPr>
+            <p:cNvPr id="21" name="Connettore 1 20"/>
+            <p:cNvCxnSpPr>
+              <a:endCxn id="20" idx="3"/>
+            </p:cNvCxnSpPr>
+            <p:nvPr/>
+          </p:nvCxnSpPr>
+          <p:spPr>
+            <a:xfrm>
+              <a:off x="3452446" y="4219627"/>
+              <a:ext cx="648072" cy="206"/>
+            </a:xfrm>
+            <a:prstGeom prst="line">
+              <a:avLst/>
+            </a:prstGeom>
+          </p:spPr>
+          <p:style>
+            <a:lnRef idx="1">
+              <a:schemeClr val="accent6"/>
+            </a:lnRef>
+            <a:fillRef idx="2">
+              <a:schemeClr val="accent6"/>
+            </a:fillRef>
+            <a:effectRef idx="1">
+              <a:schemeClr val="accent6"/>
+            </a:effectRef>
+            <a:fontRef idx="minor">
+              <a:schemeClr val="dk1"/>
+            </a:fontRef>
+          </p:style>
+        </p:cxnSp>
+      </p:grpSp>
+      <p:sp>
+        <p:nvSpPr>
+          <p:cNvPr id="35" name="Rettangolo 34"/>
+          <p:cNvSpPr/>
+          <p:nvPr/>
+        </p:nvSpPr>
+        <p:spPr>
+          <a:xfrm>
+            <a:off x="860950" y="1217239"/>
+            <a:ext cx="1004827" cy="369332"/>
+          </a:xfrm>
+          <a:prstGeom prst="rect">
+            <a:avLst/>
+          </a:prstGeom>
+        </p:spPr>
+        <p:txBody>
+          <a:bodyPr wrap="none">
+            <a:spAutoFit/>
+          </a:bodyPr>
+          <a:lstStyle/>
+          <a:p>
+            <a:r>
+              <a:rPr lang="en-GB" b="1" dirty="0" smtClean="0"/>
+              <a:t>Core-</a:t>
+            </a:r>
+            <a:r>
+              <a:rPr lang="en-GB" b="1" dirty="0" err="1" smtClean="0"/>
+              <a:t>Itel</a:t>
+            </a:r>
+            <a:endParaRPr lang="en-GB" dirty="0"/>
+          </a:p>
+        </p:txBody>
+      </p:sp>
+      <p:cxnSp>
+        <p:nvCxnSpPr>
+          <p:cNvPr id="36" name="Connettore 1 35"/>
+          <p:cNvCxnSpPr/>
+          <p:nvPr/>
+        </p:nvCxnSpPr>
+        <p:spPr>
+          <a:xfrm>
+            <a:off x="738151" y="1555674"/>
+            <a:ext cx="7465934" cy="1"/>
+          </a:xfrm>
+          <a:prstGeom prst="line">
+            <a:avLst/>
+          </a:prstGeom>
+        </p:spPr>
+        <p:style>
+          <a:lnRef idx="1">
+            <a:schemeClr val="accent1"/>
+          </a:lnRef>
+          <a:fillRef idx="0">
+            <a:schemeClr val="accent1"/>
+          </a:fillRef>
+          <a:effectRef idx="0">
+            <a:schemeClr val="accent1"/>
+          </a:effectRef>
+          <a:fontRef idx="minor">
+            <a:schemeClr val="tx1"/>
+          </a:fontRef>
+        </p:style>
+      </p:cxnSp>
+      <p:sp>
+        <p:nvSpPr>
+          <p:cNvPr id="37" name="CasellaDiTesto 36"/>
+          <p:cNvSpPr txBox="1"/>
+          <p:nvPr/>
+        </p:nvSpPr>
+        <p:spPr>
+          <a:xfrm>
+            <a:off x="2851153" y="2727905"/>
+            <a:ext cx="638123" cy="369332"/>
+          </a:xfrm>
+          <a:prstGeom prst="rect">
+            <a:avLst/>
+          </a:prstGeom>
+        </p:spPr>
+        <p:style>
+          <a:lnRef idx="1">
+            <a:schemeClr val="accent3"/>
+          </a:lnRef>
+          <a:fillRef idx="2">
+            <a:schemeClr val="accent3"/>
+          </a:fillRef>
+          <a:effectRef idx="1">
+            <a:schemeClr val="accent3"/>
+          </a:effectRef>
+          <a:fontRef idx="minor">
+            <a:schemeClr val="dk1"/>
+          </a:fontRef>
+        </p:style>
+        <p:txBody>
+          <a:bodyPr wrap="none" rtlCol="0">
+            <a:spAutoFit/>
+          </a:bodyPr>
+          <a:lstStyle/>
+          <a:p>
+            <a:r>
+              <a:rPr lang="it-IT" dirty="0" err="1" smtClean="0"/>
+              <a:t>Rest</a:t>
+            </a:r>
+            <a:r>
+              <a:rPr lang="it-IT" dirty="0" smtClean="0"/>
+              <a:t> </a:t>
+            </a:r>
+          </a:p>
+        </p:txBody>
+      </p:sp>
+      <p:sp>
+        <p:nvSpPr>
+          <p:cNvPr id="41" name="CasellaDiTesto 40"/>
+          <p:cNvSpPr txBox="1"/>
+          <p:nvPr/>
+        </p:nvSpPr>
+        <p:spPr>
+          <a:xfrm>
+            <a:off x="471412" y="256292"/>
+            <a:ext cx="2149114" cy="584775"/>
+          </a:xfrm>
+          <a:prstGeom prst="rect">
+            <a:avLst/>
+          </a:prstGeom>
+        </p:spPr>
+        <p:style>
+          <a:lnRef idx="3">
+            <a:schemeClr val="lt1"/>
+          </a:lnRef>
+          <a:fillRef idx="1">
+            <a:schemeClr val="accent5"/>
+          </a:fillRef>
+          <a:effectRef idx="1">
+            <a:schemeClr val="accent5"/>
+          </a:effectRef>
+          <a:fontRef idx="minor">
+            <a:schemeClr val="lt1"/>
+          </a:fontRef>
+        </p:style>
+        <p:txBody>
+          <a:bodyPr wrap="none" rtlCol="0">
+            <a:spAutoFit/>
+          </a:bodyPr>
+          <a:lstStyle/>
+          <a:p>
+            <a:r>
+              <a:rPr lang="it-IT" sz="3200" dirty="0" err="1"/>
+              <a:t>Sm@rteven</a:t>
+            </a:r>
+            <a:endParaRPr lang="en-GB" sz="3200" dirty="0"/>
+          </a:p>
+        </p:txBody>
+      </p:sp>
+      <p:cxnSp>
+        <p:nvCxnSpPr>
+          <p:cNvPr id="48" name="Connettore 4 47"/>
+          <p:cNvCxnSpPr>
+            <a:stCxn id="8" idx="7"/>
+            <a:endCxn id="46" idx="1"/>
+          </p:cNvCxnSpPr>
+          <p:nvPr/>
+        </p:nvCxnSpPr>
+        <p:spPr>
+          <a:xfrm rot="5400000" flipH="1" flipV="1">
+            <a:off x="5404779" y="1187332"/>
+            <a:ext cx="254036" cy="1744833"/>
+          </a:xfrm>
+          <a:prstGeom prst="bentConnector2">
+            <a:avLst/>
+          </a:prstGeom>
+          <a:ln>
+            <a:prstDash val="lgDashDotDot"/>
+            <a:tailEnd type="arrow"/>
+          </a:ln>
+        </p:spPr>
+        <p:style>
+          <a:lnRef idx="1">
+            <a:schemeClr val="accent1"/>
+          </a:lnRef>
+          <a:fillRef idx="0">
+            <a:schemeClr val="accent1"/>
+          </a:fillRef>
+          <a:effectRef idx="0">
+            <a:schemeClr val="accent1"/>
+          </a:effectRef>
+          <a:fontRef idx="minor">
+            <a:schemeClr val="tx1"/>
+          </a:fontRef>
+        </p:style>
+      </p:cxnSp>
+      <p:cxnSp>
+        <p:nvCxnSpPr>
+          <p:cNvPr id="49" name="Connettore 4 48"/>
+          <p:cNvCxnSpPr>
+            <a:stCxn id="8" idx="6"/>
+            <a:endCxn id="56" idx="2"/>
+          </p:cNvCxnSpPr>
+          <p:nvPr/>
+        </p:nvCxnSpPr>
+        <p:spPr>
+          <a:xfrm>
+            <a:off x="4777410" y="2444589"/>
+            <a:ext cx="1634549" cy="343008"/>
+          </a:xfrm>
+          <a:prstGeom prst="bentConnector3">
+            <a:avLst>
+              <a:gd name="adj1" fmla="val 50000"/>
+            </a:avLst>
+          </a:prstGeom>
+          <a:ln>
+            <a:prstDash val="lgDashDotDot"/>
+            <a:tailEnd type="arrow"/>
+          </a:ln>
+        </p:spPr>
+        <p:style>
+          <a:lnRef idx="1">
+            <a:schemeClr val="accent1"/>
+          </a:lnRef>
+          <a:fillRef idx="0">
+            <a:schemeClr val="accent1"/>
+          </a:fillRef>
+          <a:effectRef idx="0">
+            <a:schemeClr val="accent1"/>
+          </a:effectRef>
+          <a:fontRef idx="minor">
+            <a:schemeClr val="tx1"/>
+          </a:fontRef>
+        </p:style>
+      </p:cxnSp>
+      <p:sp>
+        <p:nvSpPr>
+          <p:cNvPr id="53" name="CasellaDiTesto 52"/>
+          <p:cNvSpPr txBox="1"/>
+          <p:nvPr/>
+        </p:nvSpPr>
+        <p:spPr>
+          <a:xfrm>
+            <a:off x="7209555" y="1698561"/>
+            <a:ext cx="1451551" cy="369332"/>
+          </a:xfrm>
+          <a:prstGeom prst="rect">
+            <a:avLst/>
+          </a:prstGeom>
+          <a:noFill/>
+        </p:spPr>
+        <p:txBody>
+          <a:bodyPr wrap="none" rtlCol="0">
+            <a:spAutoFit/>
+          </a:bodyPr>
+          <a:lstStyle/>
+          <a:p>
+            <a:r>
+              <a:rPr lang="it-IT" dirty="0" smtClean="0"/>
+              <a:t>A) </a:t>
+            </a:r>
+            <a:r>
+              <a:rPr lang="it-IT" dirty="0" err="1" smtClean="0"/>
+              <a:t>Legacy</a:t>
+            </a:r>
+            <a:r>
+              <a:rPr lang="it-IT" dirty="0" smtClean="0"/>
+              <a:t> </a:t>
+            </a:r>
+            <a:r>
+              <a:rPr lang="it-IT" dirty="0" err="1" smtClean="0"/>
+              <a:t>Old</a:t>
+            </a:r>
+            <a:endParaRPr lang="en-GB" dirty="0"/>
+          </a:p>
+        </p:txBody>
+      </p:sp>
+      <p:sp>
+        <p:nvSpPr>
+          <p:cNvPr id="54" name="CasellaDiTesto 53"/>
+          <p:cNvSpPr txBox="1"/>
+          <p:nvPr/>
+        </p:nvSpPr>
+        <p:spPr>
+          <a:xfrm>
+            <a:off x="7238314" y="2571154"/>
+            <a:ext cx="1937262" cy="369332"/>
+          </a:xfrm>
+          <a:prstGeom prst="rect">
+            <a:avLst/>
+          </a:prstGeom>
+          <a:noFill/>
+        </p:spPr>
+        <p:txBody>
+          <a:bodyPr wrap="none" rtlCol="0">
+            <a:spAutoFit/>
+          </a:bodyPr>
+          <a:lstStyle/>
+          <a:p>
+            <a:r>
+              <a:rPr lang="it-IT" dirty="0" smtClean="0"/>
+              <a:t>B) </a:t>
+            </a:r>
+            <a:r>
+              <a:rPr lang="it-IT" dirty="0" err="1" smtClean="0"/>
+              <a:t>Legacy</a:t>
+            </a:r>
+            <a:r>
+              <a:rPr lang="it-IT" dirty="0" smtClean="0"/>
+              <a:t> with HL7</a:t>
+            </a:r>
+            <a:endParaRPr lang="en-GB" dirty="0"/>
+          </a:p>
+        </p:txBody>
+      </p:sp>
+      <p:sp>
+        <p:nvSpPr>
+          <p:cNvPr id="58" name="CasellaDiTesto 57"/>
+          <p:cNvSpPr txBox="1"/>
+          <p:nvPr/>
+        </p:nvSpPr>
+        <p:spPr>
+          <a:xfrm>
+            <a:off x="7302727" y="3419790"/>
+            <a:ext cx="1548694" cy="369332"/>
+          </a:xfrm>
+          <a:prstGeom prst="rect">
+            <a:avLst/>
+          </a:prstGeom>
+          <a:noFill/>
+        </p:spPr>
+        <p:txBody>
+          <a:bodyPr wrap="none" rtlCol="0">
+            <a:spAutoFit/>
+          </a:bodyPr>
+          <a:lstStyle/>
+          <a:p>
+            <a:r>
+              <a:rPr lang="it-IT" dirty="0" smtClean="0"/>
+              <a:t>C)  FHIR server</a:t>
+            </a:r>
+            <a:endParaRPr lang="en-GB" dirty="0"/>
+          </a:p>
+        </p:txBody>
+      </p:sp>
+      <p:sp>
+        <p:nvSpPr>
+          <p:cNvPr id="60" name="CasellaDiTesto 59"/>
+          <p:cNvSpPr txBox="1"/>
+          <p:nvPr/>
+        </p:nvSpPr>
+        <p:spPr>
+          <a:xfrm>
+            <a:off x="3542243" y="3612324"/>
+            <a:ext cx="2035494" cy="369332"/>
+          </a:xfrm>
+          <a:prstGeom prst="rect">
+            <a:avLst/>
+          </a:prstGeom>
+          <a:noFill/>
+        </p:spPr>
+        <p:txBody>
+          <a:bodyPr wrap="none" rtlCol="0">
+            <a:spAutoFit/>
+          </a:bodyPr>
+          <a:lstStyle/>
+          <a:p>
+            <a:r>
+              <a:rPr lang="en-GB" dirty="0" smtClean="0"/>
+              <a:t>E</a:t>
+            </a:r>
+            <a:r>
+              <a:rPr lang="en-GB" dirty="0" smtClean="0"/>
+              <a:t>xposes</a:t>
+            </a:r>
+            <a:r>
+              <a:rPr lang="en-GB" dirty="0"/>
+              <a:t> </a:t>
+            </a:r>
+            <a:r>
+              <a:rPr lang="it-IT" dirty="0" smtClean="0"/>
+              <a:t>a </a:t>
+            </a:r>
+            <a:r>
+              <a:rPr lang="it-IT" dirty="0"/>
+              <a:t>REST-API </a:t>
+            </a:r>
+            <a:endParaRPr lang="en-GB" dirty="0"/>
+          </a:p>
+        </p:txBody>
+      </p:sp>
+      <p:sp>
+        <p:nvSpPr>
+          <p:cNvPr id="69" name="CasellaDiTesto 68"/>
+          <p:cNvSpPr txBox="1"/>
+          <p:nvPr/>
+        </p:nvSpPr>
+        <p:spPr>
+          <a:xfrm>
+            <a:off x="471412" y="3622006"/>
+            <a:ext cx="2483372" cy="369332"/>
+          </a:xfrm>
+          <a:prstGeom prst="rect">
+            <a:avLst/>
+          </a:prstGeom>
+          <a:noFill/>
+        </p:spPr>
+        <p:txBody>
+          <a:bodyPr wrap="none" rtlCol="0">
+            <a:spAutoFit/>
+          </a:bodyPr>
+          <a:lstStyle/>
+          <a:p>
+            <a:r>
+              <a:rPr lang="it-IT" dirty="0" err="1" smtClean="0"/>
+              <a:t>Exposes</a:t>
+            </a:r>
+            <a:r>
+              <a:rPr lang="it-IT" dirty="0" smtClean="0"/>
+              <a:t> an </a:t>
+            </a:r>
+            <a:r>
+              <a:rPr lang="it-IT" dirty="0" smtClean="0"/>
+              <a:t>API </a:t>
+            </a:r>
+            <a:r>
+              <a:rPr lang="it-IT" sz="1400" b="1" dirty="0" smtClean="0">
+                <a:latin typeface="Arial Black" panose="020B0A04020102020204" pitchFamily="34" charset="0"/>
+              </a:rPr>
+              <a:t>full FHIR</a:t>
+            </a:r>
+            <a:endParaRPr lang="en-GB" dirty="0" smtClean="0"/>
+          </a:p>
+        </p:txBody>
+      </p:sp>
+      <p:grpSp>
+        <p:nvGrpSpPr>
+          <p:cNvPr id="43" name="Gruppo 42"/>
+          <p:cNvGrpSpPr/>
+          <p:nvPr/>
+        </p:nvGrpSpPr>
+        <p:grpSpPr>
+          <a:xfrm>
+            <a:off x="6404214" y="1555676"/>
+            <a:ext cx="906467" cy="772447"/>
+            <a:chOff x="5477386" y="2072585"/>
+            <a:chExt cx="906467" cy="772447"/>
+          </a:xfrm>
+        </p:grpSpPr>
+        <p:grpSp>
+          <p:nvGrpSpPr>
+            <p:cNvPr id="45" name="Gruppo 44"/>
+            <p:cNvGrpSpPr/>
+            <p:nvPr/>
+          </p:nvGrpSpPr>
+          <p:grpSpPr>
+            <a:xfrm>
+              <a:off x="5498762" y="2072585"/>
+              <a:ext cx="805955" cy="772447"/>
+              <a:chOff x="565700" y="4940367"/>
+              <a:chExt cx="805955" cy="772447"/>
+            </a:xfrm>
+          </p:grpSpPr>
+          <p:sp>
+            <p:nvSpPr>
+              <p:cNvPr id="47" name="Ovale 46"/>
+              <p:cNvSpPr/>
+              <p:nvPr/>
+            </p:nvSpPr>
+            <p:spPr>
+              <a:xfrm>
+                <a:off x="565700" y="4983583"/>
+                <a:ext cx="805955" cy="729231"/>
+              </a:xfrm>
+              <a:prstGeom prst="ellipse">
+                <a:avLst/>
+              </a:prstGeom>
+              <a:solidFill>
+                <a:srgbClr val="CCFF99"/>
+              </a:solidFill>
+              <a:ln/>
+            </p:spPr>
+            <p:style>
+              <a:lnRef idx="1">
+                <a:schemeClr val="accent4"/>
+              </a:lnRef>
+              <a:fillRef idx="2">
+                <a:schemeClr val="accent4"/>
+              </a:fillRef>
+              <a:effectRef idx="1">
+                <a:schemeClr val="accent4"/>
+              </a:effectRef>
+              <a:fontRef idx="minor">
+                <a:schemeClr val="dk1"/>
+              </a:fontRef>
+            </p:style>
+            <p:txBody>
+              <a:bodyPr rtlCol="0" anchor="ctr"/>
+              <a:lstStyle/>
+              <a:p>
+                <a:pPr algn="ctr"/>
+                <a:r>
+                  <a:rPr lang="en-GB" sz="1200" dirty="0"/>
+                  <a:t> </a:t>
+                </a:r>
+              </a:p>
+            </p:txBody>
+          </p:sp>
+          <p:sp>
+            <p:nvSpPr>
+              <p:cNvPr id="50" name="Triangolo isoscele 49"/>
+              <p:cNvSpPr/>
+              <p:nvPr/>
+            </p:nvSpPr>
+            <p:spPr>
+              <a:xfrm rot="16200000">
+                <a:off x="905299" y="4913952"/>
+                <a:ext cx="86434" cy="139263"/>
+              </a:xfrm>
+              <a:prstGeom prst="triangle">
+                <a:avLst/>
+              </a:prstGeom>
+              <a:solidFill>
+                <a:srgbClr val="C00000"/>
+              </a:solidFill>
+              <a:ln/>
+            </p:spPr>
+            <p:style>
+              <a:lnRef idx="1">
+                <a:schemeClr val="accent5"/>
+              </a:lnRef>
+              <a:fillRef idx="2">
+                <a:schemeClr val="accent5"/>
+              </a:fillRef>
+              <a:effectRef idx="1">
+                <a:schemeClr val="accent5"/>
+              </a:effectRef>
+              <a:fontRef idx="minor">
+                <a:schemeClr val="dk1"/>
+              </a:fontRef>
+            </p:style>
+            <p:txBody>
+              <a:bodyPr rtlCol="0" anchor="ctr"/>
+              <a:lstStyle/>
+              <a:p>
+                <a:pPr algn="ctr"/>
+                <a:endParaRPr lang="en-GB" sz="1200">
+                  <a:solidFill>
+                    <a:schemeClr val="dk1"/>
+                  </a:solidFill>
+                </a:endParaRPr>
+              </a:p>
+            </p:txBody>
+          </p:sp>
+        </p:grpSp>
+        <p:sp>
+          <p:nvSpPr>
+            <p:cNvPr id="46" name="CasellaDiTesto 45"/>
+            <p:cNvSpPr txBox="1"/>
+            <p:nvPr/>
+          </p:nvSpPr>
+          <p:spPr>
+            <a:xfrm>
+              <a:off x="5477386" y="2295750"/>
+              <a:ext cx="906467" cy="307777"/>
+            </a:xfrm>
+            <a:prstGeom prst="rect">
+              <a:avLst/>
+            </a:prstGeom>
+            <a:noFill/>
+          </p:spPr>
+          <p:txBody>
+            <a:bodyPr wrap="none" rtlCol="0">
+              <a:spAutoFit/>
+            </a:bodyPr>
+            <a:lstStyle/>
+            <a:p>
+              <a:r>
+                <a:rPr lang="en-GB" sz="1400" b="1" dirty="0" err="1"/>
+                <a:t>CHFacade</a:t>
+              </a:r>
+              <a:endParaRPr lang="en-GB" sz="1400" dirty="0"/>
+            </a:p>
+          </p:txBody>
+        </p:sp>
+      </p:grpSp>
+      <p:grpSp>
+        <p:nvGrpSpPr>
+          <p:cNvPr id="51" name="Gruppo 50"/>
+          <p:cNvGrpSpPr/>
+          <p:nvPr/>
+        </p:nvGrpSpPr>
+        <p:grpSpPr>
+          <a:xfrm>
+            <a:off x="6390583" y="2379765"/>
+            <a:ext cx="906467" cy="772447"/>
+            <a:chOff x="5477386" y="2072585"/>
+            <a:chExt cx="906467" cy="772447"/>
+          </a:xfrm>
+        </p:grpSpPr>
+        <p:grpSp>
+          <p:nvGrpSpPr>
+            <p:cNvPr id="52" name="Gruppo 51"/>
+            <p:cNvGrpSpPr/>
+            <p:nvPr/>
+          </p:nvGrpSpPr>
+          <p:grpSpPr>
+            <a:xfrm>
+              <a:off x="5498762" y="2072585"/>
+              <a:ext cx="805955" cy="772447"/>
+              <a:chOff x="565700" y="4940367"/>
+              <a:chExt cx="805955" cy="772447"/>
+            </a:xfrm>
+          </p:grpSpPr>
+          <p:sp>
+            <p:nvSpPr>
+              <p:cNvPr id="56" name="Ovale 55"/>
+              <p:cNvSpPr/>
+              <p:nvPr/>
+            </p:nvSpPr>
+            <p:spPr>
+              <a:xfrm>
+                <a:off x="565700" y="4983583"/>
+                <a:ext cx="805955" cy="729231"/>
+              </a:xfrm>
+              <a:prstGeom prst="ellipse">
+                <a:avLst/>
+              </a:prstGeom>
+              <a:solidFill>
+                <a:srgbClr val="CCFF99"/>
+              </a:solidFill>
+              <a:ln/>
+            </p:spPr>
+            <p:style>
+              <a:lnRef idx="1">
+                <a:schemeClr val="accent4"/>
+              </a:lnRef>
+              <a:fillRef idx="2">
+                <a:schemeClr val="accent4"/>
+              </a:fillRef>
+              <a:effectRef idx="1">
+                <a:schemeClr val="accent4"/>
+              </a:effectRef>
+              <a:fontRef idx="minor">
+                <a:schemeClr val="dk1"/>
+              </a:fontRef>
+            </p:style>
+            <p:txBody>
+              <a:bodyPr rtlCol="0" anchor="ctr"/>
+              <a:lstStyle/>
+              <a:p>
+                <a:pPr algn="ctr"/>
+                <a:r>
+                  <a:rPr lang="en-GB" sz="1200" dirty="0"/>
+                  <a:t> </a:t>
+                </a:r>
+              </a:p>
+            </p:txBody>
+          </p:sp>
+          <p:sp>
+            <p:nvSpPr>
+              <p:cNvPr id="57" name="Triangolo isoscele 56"/>
+              <p:cNvSpPr/>
+              <p:nvPr/>
+            </p:nvSpPr>
+            <p:spPr>
+              <a:xfrm rot="16200000">
+                <a:off x="905299" y="4913952"/>
+                <a:ext cx="86434" cy="139263"/>
+              </a:xfrm>
+              <a:prstGeom prst="triangle">
+                <a:avLst/>
+              </a:prstGeom>
+              <a:solidFill>
+                <a:srgbClr val="C00000"/>
+              </a:solidFill>
+              <a:ln/>
+            </p:spPr>
+            <p:style>
+              <a:lnRef idx="1">
+                <a:schemeClr val="accent5"/>
+              </a:lnRef>
+              <a:fillRef idx="2">
+                <a:schemeClr val="accent5"/>
+              </a:fillRef>
+              <a:effectRef idx="1">
+                <a:schemeClr val="accent5"/>
+              </a:effectRef>
+              <a:fontRef idx="minor">
+                <a:schemeClr val="dk1"/>
+              </a:fontRef>
+            </p:style>
+            <p:txBody>
+              <a:bodyPr rtlCol="0" anchor="ctr"/>
+              <a:lstStyle/>
+              <a:p>
+                <a:pPr algn="ctr"/>
+                <a:endParaRPr lang="en-GB" sz="1200">
+                  <a:solidFill>
+                    <a:schemeClr val="dk1"/>
+                  </a:solidFill>
+                </a:endParaRPr>
+              </a:p>
+            </p:txBody>
+          </p:sp>
+        </p:grpSp>
+        <p:sp>
+          <p:nvSpPr>
+            <p:cNvPr id="55" name="CasellaDiTesto 54"/>
+            <p:cNvSpPr txBox="1"/>
+            <p:nvPr/>
+          </p:nvSpPr>
+          <p:spPr>
+            <a:xfrm>
+              <a:off x="5477386" y="2295750"/>
+              <a:ext cx="906467" cy="523220"/>
+            </a:xfrm>
+            <a:prstGeom prst="rect">
+              <a:avLst/>
+            </a:prstGeom>
+            <a:noFill/>
+          </p:spPr>
+          <p:txBody>
+            <a:bodyPr wrap="none" rtlCol="0">
+              <a:spAutoFit/>
+            </a:bodyPr>
+            <a:lstStyle/>
+            <a:p>
+              <a:pPr algn="ctr"/>
+              <a:r>
+                <a:rPr lang="en-GB" sz="1400" b="1" dirty="0" err="1" smtClean="0"/>
+                <a:t>CHFacade</a:t>
+              </a:r>
+              <a:endParaRPr lang="en-GB" sz="1400" b="1" dirty="0" smtClean="0"/>
+            </a:p>
+            <a:p>
+              <a:pPr algn="ctr"/>
+              <a:r>
+                <a:rPr lang="it-IT" sz="1400" b="1" dirty="0" smtClean="0">
+                  <a:solidFill>
+                    <a:srgbClr val="0070C0"/>
+                  </a:solidFill>
+                </a:rPr>
+                <a:t>HL7</a:t>
+              </a:r>
+              <a:endParaRPr lang="en-GB" sz="1400" dirty="0">
+                <a:solidFill>
+                  <a:srgbClr val="0070C0"/>
+                </a:solidFill>
+              </a:endParaRPr>
+            </a:p>
+          </p:txBody>
+        </p:sp>
+      </p:grpSp>
+      <p:grpSp>
+        <p:nvGrpSpPr>
+          <p:cNvPr id="59" name="Gruppo 58"/>
+          <p:cNvGrpSpPr/>
+          <p:nvPr/>
+        </p:nvGrpSpPr>
+        <p:grpSpPr>
+          <a:xfrm>
+            <a:off x="1115617" y="1899069"/>
+            <a:ext cx="1053702" cy="965471"/>
+            <a:chOff x="565700" y="4940367"/>
+            <a:chExt cx="805955" cy="772447"/>
+          </a:xfrm>
+        </p:grpSpPr>
+        <p:sp>
+          <p:nvSpPr>
+            <p:cNvPr id="61" name="Ovale 60"/>
+            <p:cNvSpPr/>
+            <p:nvPr/>
+          </p:nvSpPr>
+          <p:spPr>
+            <a:xfrm>
+              <a:off x="565700" y="4983583"/>
+              <a:ext cx="805955" cy="729231"/>
+            </a:xfrm>
+            <a:prstGeom prst="ellipse">
+              <a:avLst/>
+            </a:prstGeom>
+            <a:solidFill>
+              <a:srgbClr val="FF99CC"/>
+            </a:solidFill>
+            <a:ln/>
+          </p:spPr>
+          <p:style>
+            <a:lnRef idx="1">
+              <a:schemeClr val="accent4"/>
+            </a:lnRef>
+            <a:fillRef idx="2">
+              <a:schemeClr val="accent4"/>
+            </a:fillRef>
+            <a:effectRef idx="1">
+              <a:schemeClr val="accent4"/>
+            </a:effectRef>
+            <a:fontRef idx="minor">
+              <a:schemeClr val="dk1"/>
+            </a:fontRef>
+          </p:style>
+          <p:txBody>
+            <a:bodyPr rtlCol="0" anchor="ctr"/>
+            <a:lstStyle/>
+            <a:p>
+              <a:pPr algn="ctr"/>
+              <a:r>
+                <a:rPr lang="en-GB" sz="1200" dirty="0"/>
+                <a:t> </a:t>
+              </a:r>
+            </a:p>
+          </p:txBody>
+        </p:sp>
+        <p:sp>
+          <p:nvSpPr>
+            <p:cNvPr id="64" name="Triangolo isoscele 63"/>
+            <p:cNvSpPr/>
+            <p:nvPr/>
+          </p:nvSpPr>
+          <p:spPr>
+            <a:xfrm rot="16200000">
+              <a:off x="905299" y="4913952"/>
+              <a:ext cx="86434" cy="139263"/>
+            </a:xfrm>
+            <a:prstGeom prst="triangle">
+              <a:avLst/>
+            </a:prstGeom>
+            <a:solidFill>
+              <a:srgbClr val="C00000"/>
+            </a:solidFill>
+            <a:ln/>
+          </p:spPr>
+          <p:style>
+            <a:lnRef idx="1">
+              <a:schemeClr val="accent5"/>
+            </a:lnRef>
+            <a:fillRef idx="2">
+              <a:schemeClr val="accent5"/>
+            </a:fillRef>
+            <a:effectRef idx="1">
+              <a:schemeClr val="accent5"/>
+            </a:effectRef>
+            <a:fontRef idx="minor">
+              <a:schemeClr val="dk1"/>
+            </a:fontRef>
+          </p:style>
+          <p:txBody>
+            <a:bodyPr rtlCol="0" anchor="ctr"/>
+            <a:lstStyle/>
+            <a:p>
+              <a:pPr algn="ctr"/>
+              <a:endParaRPr lang="en-GB" sz="1200">
+                <a:solidFill>
+                  <a:schemeClr val="dk1"/>
+                </a:solidFill>
+              </a:endParaRPr>
+            </a:p>
+          </p:txBody>
+        </p:sp>
+      </p:grpSp>
+      <p:sp>
+        <p:nvSpPr>
+          <p:cNvPr id="65" name="CasellaDiTesto 64"/>
+          <p:cNvSpPr txBox="1"/>
+          <p:nvPr/>
+        </p:nvSpPr>
+        <p:spPr>
+          <a:xfrm>
+            <a:off x="1196001" y="2123191"/>
+            <a:ext cx="1034194" cy="523220"/>
+          </a:xfrm>
+          <a:prstGeom prst="rect">
+            <a:avLst/>
+          </a:prstGeom>
+          <a:noFill/>
+        </p:spPr>
+        <p:txBody>
+          <a:bodyPr wrap="none" rtlCol="0">
+            <a:spAutoFit/>
+          </a:bodyPr>
+          <a:lstStyle/>
+          <a:p>
+            <a:pPr algn="ctr"/>
+            <a:r>
+              <a:rPr lang="en-GB" sz="1400" b="1" dirty="0" err="1" smtClean="0"/>
+              <a:t>Icore</a:t>
+            </a:r>
+            <a:endParaRPr lang="en-GB" sz="1400" b="1" dirty="0" smtClean="0"/>
+          </a:p>
+          <a:p>
+            <a:pPr algn="ctr"/>
+            <a:r>
+              <a:rPr lang="it-IT" sz="1400" b="1" dirty="0" smtClean="0"/>
+              <a:t>FHIR server</a:t>
+            </a:r>
+            <a:endParaRPr lang="en-GB" sz="1400" dirty="0"/>
+          </a:p>
+        </p:txBody>
+      </p:sp>
+      <p:grpSp>
+        <p:nvGrpSpPr>
+          <p:cNvPr id="44" name="Gruppo 43"/>
+          <p:cNvGrpSpPr/>
+          <p:nvPr/>
+        </p:nvGrpSpPr>
+        <p:grpSpPr>
+          <a:xfrm>
+            <a:off x="2628613" y="2489535"/>
+            <a:ext cx="666895" cy="86434"/>
+            <a:chOff x="4592177" y="4419530"/>
+            <a:chExt cx="666895" cy="86434"/>
+          </a:xfrm>
+        </p:grpSpPr>
+        <p:cxnSp>
+          <p:nvCxnSpPr>
+            <p:cNvPr id="63" name="Connettore 1 62"/>
+            <p:cNvCxnSpPr/>
+            <p:nvPr/>
+          </p:nvCxnSpPr>
+          <p:spPr>
+            <a:xfrm>
+              <a:off x="4611000" y="4462747"/>
+              <a:ext cx="648072" cy="0"/>
+            </a:xfrm>
+            <a:prstGeom prst="line">
+              <a:avLst/>
+            </a:prstGeom>
+            <a:ln/>
+          </p:spPr>
+          <p:style>
+            <a:lnRef idx="1">
+              <a:schemeClr val="accent6"/>
+            </a:lnRef>
+            <a:fillRef idx="2">
+              <a:schemeClr val="accent6"/>
+            </a:fillRef>
+            <a:effectRef idx="1">
+              <a:schemeClr val="accent6"/>
+            </a:effectRef>
+            <a:fontRef idx="minor">
+              <a:schemeClr val="dk1"/>
+            </a:fontRef>
+          </p:style>
+        </p:cxnSp>
+        <p:sp>
+          <p:nvSpPr>
+            <p:cNvPr id="66" name="Triangolo isoscele 65"/>
+            <p:cNvSpPr/>
+            <p:nvPr/>
+          </p:nvSpPr>
+          <p:spPr>
+            <a:xfrm rot="16200000">
+              <a:off x="4618592" y="4393115"/>
+              <a:ext cx="86434" cy="139263"/>
+            </a:xfrm>
+            <a:prstGeom prst="triangle">
+              <a:avLst/>
+            </a:prstGeom>
+            <a:ln/>
+          </p:spPr>
+          <p:style>
+            <a:lnRef idx="1">
+              <a:schemeClr val="accent6"/>
+            </a:lnRef>
+            <a:fillRef idx="2">
+              <a:schemeClr val="accent6"/>
+            </a:fillRef>
+            <a:effectRef idx="1">
+              <a:schemeClr val="accent6"/>
+            </a:effectRef>
+            <a:fontRef idx="minor">
+              <a:schemeClr val="dk1"/>
+            </a:fontRef>
+          </p:style>
+          <p:txBody>
+            <a:bodyPr rtlCol="0" anchor="ctr"/>
+            <a:lstStyle/>
+            <a:p>
+              <a:pPr algn="ctr"/>
+              <a:endParaRPr lang="en-GB" sz="1200"/>
+            </a:p>
+          </p:txBody>
+        </p:sp>
+      </p:grpSp>
+      <p:grpSp>
+        <p:nvGrpSpPr>
+          <p:cNvPr id="67" name="Gruppo 66"/>
+          <p:cNvGrpSpPr/>
+          <p:nvPr/>
+        </p:nvGrpSpPr>
+        <p:grpSpPr>
+          <a:xfrm>
+            <a:off x="2620526" y="2293330"/>
+            <a:ext cx="787334" cy="86434"/>
+            <a:chOff x="3452446" y="4176616"/>
+            <a:chExt cx="787334" cy="86434"/>
+          </a:xfrm>
+        </p:grpSpPr>
+        <p:sp>
+          <p:nvSpPr>
+            <p:cNvPr id="68" name="Triangolo isoscele 67"/>
+            <p:cNvSpPr/>
+            <p:nvPr/>
+          </p:nvSpPr>
+          <p:spPr>
+            <a:xfrm rot="5400000" flipH="1">
+              <a:off x="4126932" y="4150201"/>
+              <a:ext cx="86434" cy="139263"/>
+            </a:xfrm>
+            <a:prstGeom prst="triangle">
+              <a:avLst/>
+            </a:prstGeom>
+            <a:ln/>
+          </p:spPr>
+          <p:style>
+            <a:lnRef idx="1">
+              <a:schemeClr val="accent6"/>
+            </a:lnRef>
+            <a:fillRef idx="2">
+              <a:schemeClr val="accent6"/>
+            </a:fillRef>
+            <a:effectRef idx="1">
+              <a:schemeClr val="accent6"/>
+            </a:effectRef>
+            <a:fontRef idx="minor">
+              <a:schemeClr val="dk1"/>
+            </a:fontRef>
+          </p:style>
+          <p:txBody>
+            <a:bodyPr rtlCol="0" anchor="ctr"/>
+            <a:lstStyle/>
+            <a:p>
+              <a:pPr algn="ctr"/>
+              <a:endParaRPr lang="en-GB" sz="1200"/>
+            </a:p>
+          </p:txBody>
+        </p:sp>
+        <p:cxnSp>
+          <p:nvCxnSpPr>
+            <p:cNvPr id="70" name="Connettore 1 69"/>
+            <p:cNvCxnSpPr>
+              <a:endCxn id="68" idx="3"/>
+            </p:cNvCxnSpPr>
+            <p:nvPr/>
+          </p:nvCxnSpPr>
+          <p:spPr>
+            <a:xfrm>
+              <a:off x="3452446" y="4219627"/>
+              <a:ext cx="648072" cy="206"/>
+            </a:xfrm>
+            <a:prstGeom prst="line">
+              <a:avLst/>
+            </a:prstGeom>
+          </p:spPr>
+          <p:style>
+            <a:lnRef idx="1">
+              <a:schemeClr val="accent6"/>
+            </a:lnRef>
+            <a:fillRef idx="2">
+              <a:schemeClr val="accent6"/>
+            </a:fillRef>
+            <a:effectRef idx="1">
+              <a:schemeClr val="accent6"/>
+            </a:effectRef>
+            <a:fontRef idx="minor">
+              <a:schemeClr val="dk1"/>
+            </a:fontRef>
+          </p:style>
+        </p:cxnSp>
+      </p:grpSp>
+    </p:spTree>
+    <p:extLst>
+      <p:ext uri="{BB962C8B-B14F-4D97-AF65-F5344CB8AC3E}">
+        <p14:creationId xmlns:p14="http://schemas.microsoft.com/office/powerpoint/2010/main" val="1098200059"/>
+      </p:ext>
+    </p:extLst>
+  </p:cSld>
+  <p:clrMapOvr>
+    <a:masterClrMapping/>
+  </p:clrMapOvr>
+</p:sld>
+</file>
+
+<file path=ppt/slides/slide16.xml><?xml version="1.0" encoding="utf-8"?>
+<p:sld xmlns:a="http://schemas.openxmlformats.org/drawingml/2006/main" xmlns:r="http://schemas.openxmlformats.org/officeDocument/2006/relationships" xmlns:p="http://schemas.openxmlformats.org/presentationml/2006/main">
+  <p:cSld>
+    <p:spTree>
+      <p:nvGrpSpPr>
+        <p:cNvPr id="1" name=""/>
+        <p:cNvGrpSpPr/>
+        <p:nvPr/>
+      </p:nvGrpSpPr>
+      <p:grpSpPr>
+        <a:xfrm>
+          <a:off x="0" y="0"/>
+          <a:ext cx="0" cy="0"/>
+          <a:chOff x="0" y="0"/>
+          <a:chExt cx="0" cy="0"/>
+        </a:xfrm>
+      </p:grpSpPr>
+      <p:cxnSp>
+        <p:nvCxnSpPr>
           <p:cNvPr id="117" name="Connettore 1 116"/>
           <p:cNvCxnSpPr/>
           <p:nvPr/>
@@ -13181,7 +14792,7 @@
           <p:cNvPr id="2" name="TextBox 45">
             <a:extLst>
               <a:ext uri="{FF2B5EF4-FFF2-40B4-BE49-F238E27FC236}">
-                <a16:creationId xmlns="" xmlns:a16="http://schemas.microsoft.com/office/drawing/2014/main" id="{6BDA7693-CA76-4C97-8FED-A4A65AB5032B}"/>
+                <a16:creationId xmlns:a16="http://schemas.microsoft.com/office/drawing/2014/main" xmlns="" id="{6BDA7693-CA76-4C97-8FED-A4A65AB5032B}"/>
               </a:ext>
             </a:extLst>
           </p:cNvPr>
@@ -14152,7 +15763,7 @@
           <p:cNvPr id="34" name="TextBox 45">
             <a:extLst>
               <a:ext uri="{FF2B5EF4-FFF2-40B4-BE49-F238E27FC236}">
-                <a16:creationId xmlns="" xmlns:a16="http://schemas.microsoft.com/office/drawing/2014/main" id="{6BDA7693-CA76-4C97-8FED-A4A65AB5032B}"/>
+                <a16:creationId xmlns:a16="http://schemas.microsoft.com/office/drawing/2014/main" xmlns="" id="{6BDA7693-CA76-4C97-8FED-A4A65AB5032B}"/>
               </a:ext>
             </a:extLst>
           </p:cNvPr>
@@ -15675,7 +17286,7 @@
 </p:sld>
 </file>
 
-<file path=ppt/slides/slide16.xml><?xml version="1.0" encoding="utf-8"?>
+<file path=ppt/slides/slide17.xml><?xml version="1.0" encoding="utf-8"?>
 <p:sld xmlns:a="http://schemas.openxmlformats.org/drawingml/2006/main" xmlns:r="http://schemas.openxmlformats.org/officeDocument/2006/relationships" xmlns:p="http://schemas.openxmlformats.org/presentationml/2006/main">
   <p:cSld>
     <p:spTree>
@@ -15768,7 +17379,7 @@
           <p:cNvPr id="2" name="TextBox 45">
             <a:extLst>
               <a:ext uri="{FF2B5EF4-FFF2-40B4-BE49-F238E27FC236}">
-                <a16:creationId xmlns="" xmlns:a16="http://schemas.microsoft.com/office/drawing/2014/main" id="{6BDA7693-CA76-4C97-8FED-A4A65AB5032B}"/>
+                <a16:creationId xmlns:a16="http://schemas.microsoft.com/office/drawing/2014/main" xmlns="" id="{6BDA7693-CA76-4C97-8FED-A4A65AB5032B}"/>
               </a:ext>
             </a:extLst>
           </p:cNvPr>
@@ -16518,7 +18129,7 @@
           <p:cNvPr id="34" name="TextBox 45">
             <a:extLst>
               <a:ext uri="{FF2B5EF4-FFF2-40B4-BE49-F238E27FC236}">
-                <a16:creationId xmlns="" xmlns:a16="http://schemas.microsoft.com/office/drawing/2014/main" id="{6BDA7693-CA76-4C97-8FED-A4A65AB5032B}"/>
+                <a16:creationId xmlns:a16="http://schemas.microsoft.com/office/drawing/2014/main" xmlns="" id="{6BDA7693-CA76-4C97-8FED-A4A65AB5032B}"/>
               </a:ext>
             </a:extLst>
           </p:cNvPr>
@@ -17881,7 +19492,7 @@
           <p:cNvPr id="114" name="TextBox 45">
             <a:extLst>
               <a:ext uri="{FF2B5EF4-FFF2-40B4-BE49-F238E27FC236}">
-                <a16:creationId xmlns="" xmlns:a16="http://schemas.microsoft.com/office/drawing/2014/main" id="{6BDA7693-CA76-4C97-8FED-A4A65AB5032B}"/>
+                <a16:creationId xmlns:a16="http://schemas.microsoft.com/office/drawing/2014/main" xmlns="" id="{6BDA7693-CA76-4C97-8FED-A4A65AB5032B}"/>
               </a:ext>
             </a:extLst>
           </p:cNvPr>
@@ -17970,90 +19581,6 @@
     <p:extLst>
       <p:ext uri="{BB962C8B-B14F-4D97-AF65-F5344CB8AC3E}">
         <p14:creationId xmlns:p14="http://schemas.microsoft.com/office/powerpoint/2010/main" val="3166074293"/>
-      </p:ext>
-    </p:extLst>
-  </p:cSld>
-  <p:clrMapOvr>
-    <a:masterClrMapping/>
-  </p:clrMapOvr>
-</p:sld>
-</file>
-
-<file path=ppt/slides/slide17.xml><?xml version="1.0" encoding="utf-8"?>
-<p:sld xmlns:a="http://schemas.openxmlformats.org/drawingml/2006/main" xmlns:r="http://schemas.openxmlformats.org/officeDocument/2006/relationships" xmlns:p="http://schemas.openxmlformats.org/presentationml/2006/main">
-  <p:cSld>
-    <p:spTree>
-      <p:nvGrpSpPr>
-        <p:cNvPr id="1" name=""/>
-        <p:cNvGrpSpPr/>
-        <p:nvPr/>
-      </p:nvGrpSpPr>
-      <p:grpSpPr>
-        <a:xfrm>
-          <a:off x="0" y="0"/>
-          <a:ext cx="0" cy="0"/>
-          <a:chOff x="0" y="0"/>
-          <a:chExt cx="0" cy="0"/>
-        </a:xfrm>
-      </p:grpSpPr>
-      <p:pic>
-        <p:nvPicPr>
-          <p:cNvPr id="2050" name="Picture 2"/>
-          <p:cNvPicPr>
-            <a:picLocks noChangeAspect="1" noChangeArrowheads="1"/>
-          </p:cNvPicPr>
-          <p:nvPr/>
-        </p:nvPicPr>
-        <p:blipFill>
-          <a:blip r:embed="rId2">
-            <a:extLst>
-              <a:ext uri="{28A0092B-C50C-407E-A947-70E740481C1C}">
-                <a14:useLocalDpi xmlns:a14="http://schemas.microsoft.com/office/drawing/2010/main" val="0"/>
-              </a:ext>
-            </a:extLst>
-          </a:blip>
-          <a:srcRect/>
-          <a:stretch>
-            <a:fillRect/>
-          </a:stretch>
-        </p:blipFill>
-        <p:spPr bwMode="auto">
-          <a:xfrm>
-            <a:off x="185738" y="642938"/>
-            <a:ext cx="8772525" cy="5572125"/>
-          </a:xfrm>
-          <a:prstGeom prst="rect">
-            <a:avLst/>
-          </a:prstGeom>
-          <a:noFill/>
-          <a:ln>
-            <a:noFill/>
-          </a:ln>
-          <a:extLst>
-            <a:ext uri="{909E8E84-426E-40DD-AFC4-6F175D3DCCD1}">
-              <a14:hiddenFill xmlns:a14="http://schemas.microsoft.com/office/drawing/2010/main">
-                <a:solidFill>
-                  <a:schemeClr val="accent1"/>
-                </a:solidFill>
-              </a14:hiddenFill>
-            </a:ext>
-            <a:ext uri="{91240B29-F687-4F45-9708-019B960494DF}">
-              <a14:hiddenLine xmlns:a14="http://schemas.microsoft.com/office/drawing/2010/main" w="9525">
-                <a:solidFill>
-                  <a:schemeClr val="tx1"/>
-                </a:solidFill>
-                <a:miter lim="800000"/>
-                <a:headEnd/>
-                <a:tailEnd/>
-              </a14:hiddenLine>
-            </a:ext>
-          </a:extLst>
-        </p:spPr>
-      </p:pic>
-    </p:spTree>
-    <p:extLst>
-      <p:ext uri="{BB962C8B-B14F-4D97-AF65-F5344CB8AC3E}">
-        <p14:creationId xmlns:p14="http://schemas.microsoft.com/office/powerpoint/2010/main" val="2631222391"/>
       </p:ext>
     </p:extLst>
   </p:cSld>
@@ -18082,7 +19609,7 @@
       </p:grpSpPr>
       <p:pic>
         <p:nvPicPr>
-          <p:cNvPr id="1027" name="Picture 3"/>
+          <p:cNvPr id="2050" name="Picture 2"/>
           <p:cNvPicPr>
             <a:picLocks noChangeAspect="1" noChangeArrowheads="1"/>
           </p:cNvPicPr>
@@ -18103,8 +19630,8 @@
         </p:blipFill>
         <p:spPr bwMode="auto">
           <a:xfrm>
-            <a:off x="1252538" y="1119188"/>
-            <a:ext cx="6638925" cy="4619625"/>
+            <a:off x="185738" y="642938"/>
+            <a:ext cx="8772525" cy="5572125"/>
           </a:xfrm>
           <a:prstGeom prst="rect">
             <a:avLst/>
@@ -18137,7 +19664,7 @@
     </p:spTree>
     <p:extLst>
       <p:ext uri="{BB962C8B-B14F-4D97-AF65-F5344CB8AC3E}">
-        <p14:creationId xmlns:p14="http://schemas.microsoft.com/office/powerpoint/2010/main" val="2167669677"/>
+        <p14:creationId xmlns:p14="http://schemas.microsoft.com/office/powerpoint/2010/main" val="2631222391"/>
       </p:ext>
     </p:extLst>
   </p:cSld>
@@ -18166,7 +19693,7 @@
       </p:grpSpPr>
       <p:pic>
         <p:nvPicPr>
-          <p:cNvPr id="2050" name="Picture 2"/>
+          <p:cNvPr id="1027" name="Picture 3"/>
           <p:cNvPicPr>
             <a:picLocks noChangeAspect="1" noChangeArrowheads="1"/>
           </p:cNvPicPr>
@@ -18187,8 +19714,8 @@
         </p:blipFill>
         <p:spPr bwMode="auto">
           <a:xfrm>
-            <a:off x="1252538" y="1252538"/>
-            <a:ext cx="6638925" cy="4352925"/>
+            <a:off x="1252538" y="1119188"/>
+            <a:ext cx="6638925" cy="4619625"/>
           </a:xfrm>
           <a:prstGeom prst="rect">
             <a:avLst/>
@@ -18221,7 +19748,7 @@
     </p:spTree>
     <p:extLst>
       <p:ext uri="{BB962C8B-B14F-4D97-AF65-F5344CB8AC3E}">
-        <p14:creationId xmlns:p14="http://schemas.microsoft.com/office/powerpoint/2010/main" val="1461316647"/>
+        <p14:creationId xmlns:p14="http://schemas.microsoft.com/office/powerpoint/2010/main" val="2167669677"/>
       </p:ext>
     </p:extLst>
   </p:cSld>
@@ -19649,7 +21176,7 @@
       </p:grpSpPr>
       <p:pic>
         <p:nvPicPr>
-          <p:cNvPr id="3074" name="Picture 2"/>
+          <p:cNvPr id="2050" name="Picture 2"/>
           <p:cNvPicPr>
             <a:picLocks noChangeAspect="1" noChangeArrowheads="1"/>
           </p:cNvPicPr>
@@ -19670,8 +21197,8 @@
         </p:blipFill>
         <p:spPr bwMode="auto">
           <a:xfrm>
-            <a:off x="1252538" y="600075"/>
-            <a:ext cx="6638925" cy="5657850"/>
+            <a:off x="1252538" y="1252538"/>
+            <a:ext cx="6638925" cy="4352925"/>
           </a:xfrm>
           <a:prstGeom prst="rect">
             <a:avLst/>
@@ -19704,6 +21231,90 @@
     </p:spTree>
     <p:extLst>
       <p:ext uri="{BB962C8B-B14F-4D97-AF65-F5344CB8AC3E}">
+        <p14:creationId xmlns:p14="http://schemas.microsoft.com/office/powerpoint/2010/main" val="1461316647"/>
+      </p:ext>
+    </p:extLst>
+  </p:cSld>
+  <p:clrMapOvr>
+    <a:masterClrMapping/>
+  </p:clrMapOvr>
+</p:sld>
+</file>
+
+<file path=ppt/slides/slide21.xml><?xml version="1.0" encoding="utf-8"?>
+<p:sld xmlns:a="http://schemas.openxmlformats.org/drawingml/2006/main" xmlns:r="http://schemas.openxmlformats.org/officeDocument/2006/relationships" xmlns:p="http://schemas.openxmlformats.org/presentationml/2006/main">
+  <p:cSld>
+    <p:spTree>
+      <p:nvGrpSpPr>
+        <p:cNvPr id="1" name=""/>
+        <p:cNvGrpSpPr/>
+        <p:nvPr/>
+      </p:nvGrpSpPr>
+      <p:grpSpPr>
+        <a:xfrm>
+          <a:off x="0" y="0"/>
+          <a:ext cx="0" cy="0"/>
+          <a:chOff x="0" y="0"/>
+          <a:chExt cx="0" cy="0"/>
+        </a:xfrm>
+      </p:grpSpPr>
+      <p:pic>
+        <p:nvPicPr>
+          <p:cNvPr id="3074" name="Picture 2"/>
+          <p:cNvPicPr>
+            <a:picLocks noChangeAspect="1" noChangeArrowheads="1"/>
+          </p:cNvPicPr>
+          <p:nvPr/>
+        </p:nvPicPr>
+        <p:blipFill>
+          <a:blip r:embed="rId2">
+            <a:extLst>
+              <a:ext uri="{28A0092B-C50C-407E-A947-70E740481C1C}">
+                <a14:useLocalDpi xmlns:a14="http://schemas.microsoft.com/office/drawing/2010/main" val="0"/>
+              </a:ext>
+            </a:extLst>
+          </a:blip>
+          <a:srcRect/>
+          <a:stretch>
+            <a:fillRect/>
+          </a:stretch>
+        </p:blipFill>
+        <p:spPr bwMode="auto">
+          <a:xfrm>
+            <a:off x="1252538" y="600075"/>
+            <a:ext cx="6638925" cy="5657850"/>
+          </a:xfrm>
+          <a:prstGeom prst="rect">
+            <a:avLst/>
+          </a:prstGeom>
+          <a:noFill/>
+          <a:ln>
+            <a:noFill/>
+          </a:ln>
+          <a:extLst>
+            <a:ext uri="{909E8E84-426E-40DD-AFC4-6F175D3DCCD1}">
+              <a14:hiddenFill xmlns:a14="http://schemas.microsoft.com/office/drawing/2010/main">
+                <a:solidFill>
+                  <a:schemeClr val="accent1"/>
+                </a:solidFill>
+              </a14:hiddenFill>
+            </a:ext>
+            <a:ext uri="{91240B29-F687-4F45-9708-019B960494DF}">
+              <a14:hiddenLine xmlns:a14="http://schemas.microsoft.com/office/drawing/2010/main" w="9525">
+                <a:solidFill>
+                  <a:schemeClr val="tx1"/>
+                </a:solidFill>
+                <a:miter lim="800000"/>
+                <a:headEnd/>
+                <a:tailEnd/>
+              </a14:hiddenLine>
+            </a:ext>
+          </a:extLst>
+        </p:spPr>
+      </p:pic>
+    </p:spTree>
+    <p:extLst>
+      <p:ext uri="{BB962C8B-B14F-4D97-AF65-F5344CB8AC3E}">
         <p14:creationId xmlns:p14="http://schemas.microsoft.com/office/powerpoint/2010/main" val="3157537335"/>
       </p:ext>
     </p:extLst>
@@ -19714,7 +21325,7 @@
 </p:sld>
 </file>
 
-<file path=ppt/slides/slide21.xml><?xml version="1.0" encoding="utf-8"?>
+<file path=ppt/slides/slide22.xml><?xml version="1.0" encoding="utf-8"?>
 <p:sld xmlns:a="http://schemas.openxmlformats.org/drawingml/2006/main" xmlns:r="http://schemas.openxmlformats.org/officeDocument/2006/relationships" xmlns:p="http://schemas.openxmlformats.org/presentationml/2006/main">
   <p:cSld>
     <p:spTree>
@@ -23654,7 +25265,7 @@
           <p:cNvPr id="51" name="TextBox 50">
             <a:extLst>
               <a:ext uri="{FF2B5EF4-FFF2-40B4-BE49-F238E27FC236}">
-                <a16:creationId xmlns="" xmlns:a16="http://schemas.microsoft.com/office/drawing/2014/main" id="{38D92C47-6A24-433B-A9D7-48400DFBEE88}"/>
+                <a16:creationId xmlns:a16="http://schemas.microsoft.com/office/drawing/2014/main" xmlns="" id="{38D92C47-6A24-433B-A9D7-48400DFBEE88}"/>
               </a:ext>
             </a:extLst>
           </p:cNvPr>
@@ -23695,7 +25306,7 @@
           <p:cNvPr id="52" name="TextBox 51">
             <a:extLst>
               <a:ext uri="{FF2B5EF4-FFF2-40B4-BE49-F238E27FC236}">
-                <a16:creationId xmlns="" xmlns:a16="http://schemas.microsoft.com/office/drawing/2014/main" id="{46370455-EDDE-4BAF-A68F-1E721D22CFA3}"/>
+                <a16:creationId xmlns:a16="http://schemas.microsoft.com/office/drawing/2014/main" xmlns="" id="{46370455-EDDE-4BAF-A68F-1E721D22CFA3}"/>
               </a:ext>
             </a:extLst>
           </p:cNvPr>
@@ -23736,7 +25347,7 @@
           <p:cNvPr id="54" name="TextBox 53">
             <a:extLst>
               <a:ext uri="{FF2B5EF4-FFF2-40B4-BE49-F238E27FC236}">
-                <a16:creationId xmlns="" xmlns:a16="http://schemas.microsoft.com/office/drawing/2014/main" id="{1F0BD362-AB28-4ABC-B01D-E5FB51A4284F}"/>
+                <a16:creationId xmlns:a16="http://schemas.microsoft.com/office/drawing/2014/main" xmlns="" id="{1F0BD362-AB28-4ABC-B01D-E5FB51A4284F}"/>
               </a:ext>
             </a:extLst>
           </p:cNvPr>
@@ -23771,7 +25382,7 @@
           <p:cNvPr id="55" name="TextBox 54">
             <a:extLst>
               <a:ext uri="{FF2B5EF4-FFF2-40B4-BE49-F238E27FC236}">
-                <a16:creationId xmlns="" xmlns:a16="http://schemas.microsoft.com/office/drawing/2014/main" id="{66A6D040-E92F-405E-8F1C-224FD73DEB6A}"/>
+                <a16:creationId xmlns:a16="http://schemas.microsoft.com/office/drawing/2014/main" xmlns="" id="{66A6D040-E92F-405E-8F1C-224FD73DEB6A}"/>
               </a:ext>
             </a:extLst>
           </p:cNvPr>
@@ -23812,7 +25423,7 @@
           <p:cNvPr id="59" name="TextBox 58">
             <a:extLst>
               <a:ext uri="{FF2B5EF4-FFF2-40B4-BE49-F238E27FC236}">
-                <a16:creationId xmlns="" xmlns:a16="http://schemas.microsoft.com/office/drawing/2014/main" id="{8B737B46-BF72-4F50-880F-A81417342B9C}"/>
+                <a16:creationId xmlns:a16="http://schemas.microsoft.com/office/drawing/2014/main" xmlns="" id="{8B737B46-BF72-4F50-880F-A81417342B9C}"/>
               </a:ext>
             </a:extLst>
           </p:cNvPr>
@@ -23853,7 +25464,7 @@
           <p:cNvPr id="60" name="TextBox 59">
             <a:extLst>
               <a:ext uri="{FF2B5EF4-FFF2-40B4-BE49-F238E27FC236}">
-                <a16:creationId xmlns="" xmlns:a16="http://schemas.microsoft.com/office/drawing/2014/main" id="{635E5AB3-11BB-4188-A9F5-6624D8487908}"/>
+                <a16:creationId xmlns:a16="http://schemas.microsoft.com/office/drawing/2014/main" xmlns="" id="{635E5AB3-11BB-4188-A9F5-6624D8487908}"/>
               </a:ext>
             </a:extLst>
           </p:cNvPr>
@@ -25927,7 +27538,7 @@
           <p:cNvPr id="43" name="TextBox 42">
             <a:extLst>
               <a:ext uri="{FF2B5EF4-FFF2-40B4-BE49-F238E27FC236}">
-                <a16:creationId xmlns="" xmlns:a16="http://schemas.microsoft.com/office/drawing/2014/main" id="{C66D85E0-1A23-448C-9466-6DADEA26156A}"/>
+                <a16:creationId xmlns:a16="http://schemas.microsoft.com/office/drawing/2014/main" xmlns="" id="{C66D85E0-1A23-448C-9466-6DADEA26156A}"/>
               </a:ext>
             </a:extLst>
           </p:cNvPr>
@@ -25968,7 +27579,7 @@
           <p:cNvPr id="44" name="TextBox 43">
             <a:extLst>
               <a:ext uri="{FF2B5EF4-FFF2-40B4-BE49-F238E27FC236}">
-                <a16:creationId xmlns="" xmlns:a16="http://schemas.microsoft.com/office/drawing/2014/main" id="{73BB0B6F-DBD2-4682-88DA-A68E1C43C8EE}"/>
+                <a16:creationId xmlns:a16="http://schemas.microsoft.com/office/drawing/2014/main" xmlns="" id="{73BB0B6F-DBD2-4682-88DA-A68E1C43C8EE}"/>
               </a:ext>
             </a:extLst>
           </p:cNvPr>
@@ -26009,7 +27620,7 @@
           <p:cNvPr id="45" name="TextBox 44">
             <a:extLst>
               <a:ext uri="{FF2B5EF4-FFF2-40B4-BE49-F238E27FC236}">
-                <a16:creationId xmlns="" xmlns:a16="http://schemas.microsoft.com/office/drawing/2014/main" id="{06BB9D57-20AB-4911-8F91-1EAAD2C3D635}"/>
+                <a16:creationId xmlns:a16="http://schemas.microsoft.com/office/drawing/2014/main" xmlns="" id="{06BB9D57-20AB-4911-8F91-1EAAD2C3D635}"/>
               </a:ext>
             </a:extLst>
           </p:cNvPr>
@@ -26044,7 +27655,7 @@
           <p:cNvPr id="46" name="TextBox 45">
             <a:extLst>
               <a:ext uri="{FF2B5EF4-FFF2-40B4-BE49-F238E27FC236}">
-                <a16:creationId xmlns="" xmlns:a16="http://schemas.microsoft.com/office/drawing/2014/main" id="{6BDA7693-CA76-4C97-8FED-A4A65AB5032B}"/>
+                <a16:creationId xmlns:a16="http://schemas.microsoft.com/office/drawing/2014/main" xmlns="" id="{6BDA7693-CA76-4C97-8FED-A4A65AB5032B}"/>
               </a:ext>
             </a:extLst>
           </p:cNvPr>
@@ -26085,7 +27696,7 @@
           <p:cNvPr id="47" name="TextBox 46">
             <a:extLst>
               <a:ext uri="{FF2B5EF4-FFF2-40B4-BE49-F238E27FC236}">
-                <a16:creationId xmlns="" xmlns:a16="http://schemas.microsoft.com/office/drawing/2014/main" id="{F3FF60E3-5733-4A51-BB64-B5D227CFB6FE}"/>
+                <a16:creationId xmlns:a16="http://schemas.microsoft.com/office/drawing/2014/main" xmlns="" id="{F3FF60E3-5733-4A51-BB64-B5D227CFB6FE}"/>
               </a:ext>
             </a:extLst>
           </p:cNvPr>
@@ -26126,7 +27737,7 @@
           <p:cNvPr id="48" name="TextBox 47">
             <a:extLst>
               <a:ext uri="{FF2B5EF4-FFF2-40B4-BE49-F238E27FC236}">
-                <a16:creationId xmlns="" xmlns:a16="http://schemas.microsoft.com/office/drawing/2014/main" id="{6CFBFA02-2444-480B-B78F-A1A7AD55973E}"/>
+                <a16:creationId xmlns:a16="http://schemas.microsoft.com/office/drawing/2014/main" xmlns="" id="{6CFBFA02-2444-480B-B78F-A1A7AD55973E}"/>
               </a:ext>
             </a:extLst>
           </p:cNvPr>
@@ -26917,7 +28528,7 @@
           <p:cNvPr id="12" name="TextBox 45">
             <a:extLst>
               <a:ext uri="{FF2B5EF4-FFF2-40B4-BE49-F238E27FC236}">
-                <a16:creationId xmlns="" xmlns:a16="http://schemas.microsoft.com/office/drawing/2014/main" id="{6BDA7693-CA76-4C97-8FED-A4A65AB5032B}"/>
+                <a16:creationId xmlns:a16="http://schemas.microsoft.com/office/drawing/2014/main" xmlns="" id="{6BDA7693-CA76-4C97-8FED-A4A65AB5032B}"/>
               </a:ext>
             </a:extLst>
           </p:cNvPr>
@@ -27595,7 +29206,7 @@
           <p:cNvPr id="33" name="TextBox 45">
             <a:extLst>
               <a:ext uri="{FF2B5EF4-FFF2-40B4-BE49-F238E27FC236}">
-                <a16:creationId xmlns="" xmlns:a16="http://schemas.microsoft.com/office/drawing/2014/main" id="{6BDA7693-CA76-4C97-8FED-A4A65AB5032B}"/>
+                <a16:creationId xmlns:a16="http://schemas.microsoft.com/office/drawing/2014/main" xmlns="" id="{6BDA7693-CA76-4C97-8FED-A4A65AB5032B}"/>
               </a:ext>
             </a:extLst>
           </p:cNvPr>
@@ -27631,7 +29242,7 @@
           <p:cNvPr id="34" name="TextBox 45">
             <a:extLst>
               <a:ext uri="{FF2B5EF4-FFF2-40B4-BE49-F238E27FC236}">
-                <a16:creationId xmlns="" xmlns:a16="http://schemas.microsoft.com/office/drawing/2014/main" id="{6BDA7693-CA76-4C97-8FED-A4A65AB5032B}"/>
+                <a16:creationId xmlns:a16="http://schemas.microsoft.com/office/drawing/2014/main" xmlns="" id="{6BDA7693-CA76-4C97-8FED-A4A65AB5032B}"/>
               </a:ext>
             </a:extLst>
           </p:cNvPr>
@@ -28041,7 +29652,7 @@
           <p:cNvPr id="52" name="TextBox 45">
             <a:extLst>
               <a:ext uri="{FF2B5EF4-FFF2-40B4-BE49-F238E27FC236}">
-                <a16:creationId xmlns="" xmlns:a16="http://schemas.microsoft.com/office/drawing/2014/main" id="{6BDA7693-CA76-4C97-8FED-A4A65AB5032B}"/>
+                <a16:creationId xmlns:a16="http://schemas.microsoft.com/office/drawing/2014/main" xmlns="" id="{6BDA7693-CA76-4C97-8FED-A4A65AB5032B}"/>
               </a:ext>
             </a:extLst>
           </p:cNvPr>

</xml_diff>

<commit_message>
server with and without authorization
</commit_message>
<xml_diff>
--- a/health/userDocs/UniboFigs.pptx
+++ b/health/userDocs/UniboFigs.pptx
@@ -45,6 +45,7 @@
     <p:sldId id="298" r:id="rId39"/>
     <p:sldId id="299" r:id="rId40"/>
     <p:sldId id="300" r:id="rId41"/>
+    <p:sldId id="301" r:id="rId42"/>
   </p:sldIdLst>
   <p:sldSz cx="9144000" cy="6858000" type="screen4x3"/>
   <p:notesSz cx="6858000" cy="9144000"/>
@@ -145,7 +146,7 @@
   </p:defaultTextStyle>
   <p:extLst>
     <p:ext uri="{EFAFB233-063F-42B5-8137-9DF3F51BA10A}">
-      <p15:sldGuideLst xmlns="" xmlns:p15="http://schemas.microsoft.com/office/powerpoint/2012/main">
+      <p15:sldGuideLst xmlns:p15="http://schemas.microsoft.com/office/powerpoint/2012/main" xmlns="">
         <p15:guide id="1" orient="horz" pos="2160">
           <p15:clr>
             <a:srgbClr val="A4A3A4"/>
@@ -343,7 +344,7 @@
           <a:p>
             <a:fld id="{486DFF9D-000F-417D-A1D1-C441A4010B1E}" type="datetimeFigureOut">
               <a:rPr lang="en-GB" smtClean="0"/>
-              <a:t>07/10/2020</a:t>
+              <a:t>17/10/2020</a:t>
             </a:fld>
             <a:endParaRPr lang="en-GB"/>
           </a:p>
@@ -513,7 +514,7 @@
           <a:p>
             <a:fld id="{486DFF9D-000F-417D-A1D1-C441A4010B1E}" type="datetimeFigureOut">
               <a:rPr lang="en-GB" smtClean="0"/>
-              <a:t>07/10/2020</a:t>
+              <a:t>17/10/2020</a:t>
             </a:fld>
             <a:endParaRPr lang="en-GB"/>
           </a:p>
@@ -693,7 +694,7 @@
           <a:p>
             <a:fld id="{486DFF9D-000F-417D-A1D1-C441A4010B1E}" type="datetimeFigureOut">
               <a:rPr lang="en-GB" smtClean="0"/>
-              <a:t>07/10/2020</a:t>
+              <a:t>17/10/2020</a:t>
             </a:fld>
             <a:endParaRPr lang="en-GB"/>
           </a:p>
@@ -863,7 +864,7 @@
           <a:p>
             <a:fld id="{486DFF9D-000F-417D-A1D1-C441A4010B1E}" type="datetimeFigureOut">
               <a:rPr lang="en-GB" smtClean="0"/>
-              <a:t>07/10/2020</a:t>
+              <a:t>17/10/2020</a:t>
             </a:fld>
             <a:endParaRPr lang="en-GB"/>
           </a:p>
@@ -1109,7 +1110,7 @@
           <a:p>
             <a:fld id="{486DFF9D-000F-417D-A1D1-C441A4010B1E}" type="datetimeFigureOut">
               <a:rPr lang="en-GB" smtClean="0"/>
-              <a:t>07/10/2020</a:t>
+              <a:t>17/10/2020</a:t>
             </a:fld>
             <a:endParaRPr lang="en-GB"/>
           </a:p>
@@ -1397,7 +1398,7 @@
           <a:p>
             <a:fld id="{486DFF9D-000F-417D-A1D1-C441A4010B1E}" type="datetimeFigureOut">
               <a:rPr lang="en-GB" smtClean="0"/>
-              <a:t>07/10/2020</a:t>
+              <a:t>17/10/2020</a:t>
             </a:fld>
             <a:endParaRPr lang="en-GB"/>
           </a:p>
@@ -1819,7 +1820,7 @@
           <a:p>
             <a:fld id="{486DFF9D-000F-417D-A1D1-C441A4010B1E}" type="datetimeFigureOut">
               <a:rPr lang="en-GB" smtClean="0"/>
-              <a:t>07/10/2020</a:t>
+              <a:t>17/10/2020</a:t>
             </a:fld>
             <a:endParaRPr lang="en-GB"/>
           </a:p>
@@ -1937,7 +1938,7 @@
           <a:p>
             <a:fld id="{486DFF9D-000F-417D-A1D1-C441A4010B1E}" type="datetimeFigureOut">
               <a:rPr lang="en-GB" smtClean="0"/>
-              <a:t>07/10/2020</a:t>
+              <a:t>17/10/2020</a:t>
             </a:fld>
             <a:endParaRPr lang="en-GB"/>
           </a:p>
@@ -2032,7 +2033,7 @@
           <a:p>
             <a:fld id="{486DFF9D-000F-417D-A1D1-C441A4010B1E}" type="datetimeFigureOut">
               <a:rPr lang="en-GB" smtClean="0"/>
-              <a:t>07/10/2020</a:t>
+              <a:t>17/10/2020</a:t>
             </a:fld>
             <a:endParaRPr lang="en-GB"/>
           </a:p>
@@ -2309,7 +2310,7 @@
           <a:p>
             <a:fld id="{486DFF9D-000F-417D-A1D1-C441A4010B1E}" type="datetimeFigureOut">
               <a:rPr lang="en-GB" smtClean="0"/>
-              <a:t>07/10/2020</a:t>
+              <a:t>17/10/2020</a:t>
             </a:fld>
             <a:endParaRPr lang="en-GB"/>
           </a:p>
@@ -2562,7 +2563,7 @@
           <a:p>
             <a:fld id="{486DFF9D-000F-417D-A1D1-C441A4010B1E}" type="datetimeFigureOut">
               <a:rPr lang="en-GB" smtClean="0"/>
-              <a:t>07/10/2020</a:t>
+              <a:t>17/10/2020</a:t>
             </a:fld>
             <a:endParaRPr lang="en-GB"/>
           </a:p>
@@ -2775,7 +2776,7 @@
           <a:p>
             <a:fld id="{486DFF9D-000F-417D-A1D1-C441A4010B1E}" type="datetimeFigureOut">
               <a:rPr lang="en-GB" smtClean="0"/>
-              <a:t>07/10/2020</a:t>
+              <a:t>17/10/2020</a:t>
             </a:fld>
             <a:endParaRPr lang="en-GB"/>
           </a:p>
@@ -6207,7 +6208,7 @@
           <p:cNvPr id="12" name="TextBox 45">
             <a:extLst>
               <a:ext uri="{FF2B5EF4-FFF2-40B4-BE49-F238E27FC236}">
-                <a16:creationId xmlns="" xmlns:a16="http://schemas.microsoft.com/office/drawing/2014/main" id="{6BDA7693-CA76-4C97-8FED-A4A65AB5032B}"/>
+                <a16:creationId xmlns:a16="http://schemas.microsoft.com/office/drawing/2014/main" xmlns="" id="{6BDA7693-CA76-4C97-8FED-A4A65AB5032B}"/>
               </a:ext>
             </a:extLst>
           </p:cNvPr>
@@ -7755,7 +7756,7 @@
           <p:cNvPr id="12" name="TextBox 45">
             <a:extLst>
               <a:ext uri="{FF2B5EF4-FFF2-40B4-BE49-F238E27FC236}">
-                <a16:creationId xmlns="" xmlns:a16="http://schemas.microsoft.com/office/drawing/2014/main" id="{6BDA7693-CA76-4C97-8FED-A4A65AB5032B}"/>
+                <a16:creationId xmlns:a16="http://schemas.microsoft.com/office/drawing/2014/main" xmlns="" id="{6BDA7693-CA76-4C97-8FED-A4A65AB5032B}"/>
               </a:ext>
             </a:extLst>
           </p:cNvPr>
@@ -9768,7 +9769,7 @@
           <p:cNvPr id="6" name="TextBox 45">
             <a:extLst>
               <a:ext uri="{FF2B5EF4-FFF2-40B4-BE49-F238E27FC236}">
-                <a16:creationId xmlns="" xmlns:a16="http://schemas.microsoft.com/office/drawing/2014/main" id="{6BDA7693-CA76-4C97-8FED-A4A65AB5032B}"/>
+                <a16:creationId xmlns:a16="http://schemas.microsoft.com/office/drawing/2014/main" xmlns="" id="{6BDA7693-CA76-4C97-8FED-A4A65AB5032B}"/>
               </a:ext>
             </a:extLst>
           </p:cNvPr>
@@ -10276,7 +10277,7 @@
           <p:cNvPr id="27" name="TextBox 45">
             <a:extLst>
               <a:ext uri="{FF2B5EF4-FFF2-40B4-BE49-F238E27FC236}">
-                <a16:creationId xmlns="" xmlns:a16="http://schemas.microsoft.com/office/drawing/2014/main" id="{6BDA7693-CA76-4C97-8FED-A4A65AB5032B}"/>
+                <a16:creationId xmlns:a16="http://schemas.microsoft.com/office/drawing/2014/main" xmlns="" id="{6BDA7693-CA76-4C97-8FED-A4A65AB5032B}"/>
               </a:ext>
             </a:extLst>
           </p:cNvPr>
@@ -10312,7 +10313,7 @@
           <p:cNvPr id="28" name="TextBox 45">
             <a:extLst>
               <a:ext uri="{FF2B5EF4-FFF2-40B4-BE49-F238E27FC236}">
-                <a16:creationId xmlns="" xmlns:a16="http://schemas.microsoft.com/office/drawing/2014/main" id="{6BDA7693-CA76-4C97-8FED-A4A65AB5032B}"/>
+                <a16:creationId xmlns:a16="http://schemas.microsoft.com/office/drawing/2014/main" xmlns="" id="{6BDA7693-CA76-4C97-8FED-A4A65AB5032B}"/>
               </a:ext>
             </a:extLst>
           </p:cNvPr>
@@ -11860,7 +11861,7 @@
           <p:cNvPr id="6" name="TextBox 45">
             <a:extLst>
               <a:ext uri="{FF2B5EF4-FFF2-40B4-BE49-F238E27FC236}">
-                <a16:creationId xmlns="" xmlns:a16="http://schemas.microsoft.com/office/drawing/2014/main" id="{6BDA7693-CA76-4C97-8FED-A4A65AB5032B}"/>
+                <a16:creationId xmlns:a16="http://schemas.microsoft.com/office/drawing/2014/main" xmlns="" id="{6BDA7693-CA76-4C97-8FED-A4A65AB5032B}"/>
               </a:ext>
             </a:extLst>
           </p:cNvPr>
@@ -13392,7 +13393,7 @@
           <p:cNvPr id="6" name="TextBox 45">
             <a:extLst>
               <a:ext uri="{FF2B5EF4-FFF2-40B4-BE49-F238E27FC236}">
-                <a16:creationId xmlns="" xmlns:a16="http://schemas.microsoft.com/office/drawing/2014/main" id="{6BDA7693-CA76-4C97-8FED-A4A65AB5032B}"/>
+                <a16:creationId xmlns:a16="http://schemas.microsoft.com/office/drawing/2014/main" xmlns="" id="{6BDA7693-CA76-4C97-8FED-A4A65AB5032B}"/>
               </a:ext>
             </a:extLst>
           </p:cNvPr>
@@ -14817,7 +14818,7 @@
           <p:cNvPr id="2" name="TextBox 45">
             <a:extLst>
               <a:ext uri="{FF2B5EF4-FFF2-40B4-BE49-F238E27FC236}">
-                <a16:creationId xmlns="" xmlns:a16="http://schemas.microsoft.com/office/drawing/2014/main" id="{6BDA7693-CA76-4C97-8FED-A4A65AB5032B}"/>
+                <a16:creationId xmlns:a16="http://schemas.microsoft.com/office/drawing/2014/main" xmlns="" id="{6BDA7693-CA76-4C97-8FED-A4A65AB5032B}"/>
               </a:ext>
             </a:extLst>
           </p:cNvPr>
@@ -15788,7 +15789,7 @@
           <p:cNvPr id="34" name="TextBox 45">
             <a:extLst>
               <a:ext uri="{FF2B5EF4-FFF2-40B4-BE49-F238E27FC236}">
-                <a16:creationId xmlns="" xmlns:a16="http://schemas.microsoft.com/office/drawing/2014/main" id="{6BDA7693-CA76-4C97-8FED-A4A65AB5032B}"/>
+                <a16:creationId xmlns:a16="http://schemas.microsoft.com/office/drawing/2014/main" xmlns="" id="{6BDA7693-CA76-4C97-8FED-A4A65AB5032B}"/>
               </a:ext>
             </a:extLst>
           </p:cNvPr>
@@ -17404,7 +17405,7 @@
           <p:cNvPr id="2" name="TextBox 45">
             <a:extLst>
               <a:ext uri="{FF2B5EF4-FFF2-40B4-BE49-F238E27FC236}">
-                <a16:creationId xmlns="" xmlns:a16="http://schemas.microsoft.com/office/drawing/2014/main" id="{6BDA7693-CA76-4C97-8FED-A4A65AB5032B}"/>
+                <a16:creationId xmlns:a16="http://schemas.microsoft.com/office/drawing/2014/main" xmlns="" id="{6BDA7693-CA76-4C97-8FED-A4A65AB5032B}"/>
               </a:ext>
             </a:extLst>
           </p:cNvPr>
@@ -18154,7 +18155,7 @@
           <p:cNvPr id="34" name="TextBox 45">
             <a:extLst>
               <a:ext uri="{FF2B5EF4-FFF2-40B4-BE49-F238E27FC236}">
-                <a16:creationId xmlns="" xmlns:a16="http://schemas.microsoft.com/office/drawing/2014/main" id="{6BDA7693-CA76-4C97-8FED-A4A65AB5032B}"/>
+                <a16:creationId xmlns:a16="http://schemas.microsoft.com/office/drawing/2014/main" xmlns="" id="{6BDA7693-CA76-4C97-8FED-A4A65AB5032B}"/>
               </a:ext>
             </a:extLst>
           </p:cNvPr>
@@ -19517,7 +19518,7 @@
           <p:cNvPr id="114" name="TextBox 45">
             <a:extLst>
               <a:ext uri="{FF2B5EF4-FFF2-40B4-BE49-F238E27FC236}">
-                <a16:creationId xmlns="" xmlns:a16="http://schemas.microsoft.com/office/drawing/2014/main" id="{6BDA7693-CA76-4C97-8FED-A4A65AB5032B}"/>
+                <a16:creationId xmlns:a16="http://schemas.microsoft.com/office/drawing/2014/main" xmlns="" id="{6BDA7693-CA76-4C97-8FED-A4A65AB5032B}"/>
               </a:ext>
             </a:extLst>
           </p:cNvPr>
@@ -19691,7 +19692,7 @@
           <p:cNvPr id="2" name="TextBox 45">
             <a:extLst>
               <a:ext uri="{FF2B5EF4-FFF2-40B4-BE49-F238E27FC236}">
-                <a16:creationId xmlns="" xmlns:a16="http://schemas.microsoft.com/office/drawing/2014/main" id="{6BDA7693-CA76-4C97-8FED-A4A65AB5032B}"/>
+                <a16:creationId xmlns:a16="http://schemas.microsoft.com/office/drawing/2014/main" xmlns="" id="{6BDA7693-CA76-4C97-8FED-A4A65AB5032B}"/>
               </a:ext>
             </a:extLst>
           </p:cNvPr>
@@ -20630,7 +20631,7 @@
           <p:cNvPr id="114" name="TextBox 45">
             <a:extLst>
               <a:ext uri="{FF2B5EF4-FFF2-40B4-BE49-F238E27FC236}">
-                <a16:creationId xmlns="" xmlns:a16="http://schemas.microsoft.com/office/drawing/2014/main" id="{6BDA7693-CA76-4C97-8FED-A4A65AB5032B}"/>
+                <a16:creationId xmlns:a16="http://schemas.microsoft.com/office/drawing/2014/main" xmlns="" id="{6BDA7693-CA76-4C97-8FED-A4A65AB5032B}"/>
               </a:ext>
             </a:extLst>
           </p:cNvPr>
@@ -22382,7 +22383,7 @@
           <p:cNvPr id="2" name="TextBox 45">
             <a:extLst>
               <a:ext uri="{FF2B5EF4-FFF2-40B4-BE49-F238E27FC236}">
-                <a16:creationId xmlns="" xmlns:a16="http://schemas.microsoft.com/office/drawing/2014/main" id="{6BDA7693-CA76-4C97-8FED-A4A65AB5032B}"/>
+                <a16:creationId xmlns:a16="http://schemas.microsoft.com/office/drawing/2014/main" xmlns="" id="{6BDA7693-CA76-4C97-8FED-A4A65AB5032B}"/>
               </a:ext>
             </a:extLst>
           </p:cNvPr>
@@ -23961,7 +23962,7 @@
           <p:cNvPr id="2" name="TextBox 45">
             <a:extLst>
               <a:ext uri="{FF2B5EF4-FFF2-40B4-BE49-F238E27FC236}">
-                <a16:creationId xmlns="" xmlns:a16="http://schemas.microsoft.com/office/drawing/2014/main" id="{6BDA7693-CA76-4C97-8FED-A4A65AB5032B}"/>
+                <a16:creationId xmlns:a16="http://schemas.microsoft.com/office/drawing/2014/main" xmlns="" id="{6BDA7693-CA76-4C97-8FED-A4A65AB5032B}"/>
               </a:ext>
             </a:extLst>
           </p:cNvPr>
@@ -24954,7 +24955,7 @@
           <p:cNvPr id="114" name="TextBox 45">
             <a:extLst>
               <a:ext uri="{FF2B5EF4-FFF2-40B4-BE49-F238E27FC236}">
-                <a16:creationId xmlns="" xmlns:a16="http://schemas.microsoft.com/office/drawing/2014/main" id="{6BDA7693-CA76-4C97-8FED-A4A65AB5032B}"/>
+                <a16:creationId xmlns:a16="http://schemas.microsoft.com/office/drawing/2014/main" xmlns="" id="{6BDA7693-CA76-4C97-8FED-A4A65AB5032B}"/>
               </a:ext>
             </a:extLst>
           </p:cNvPr>
@@ -25769,7 +25770,7 @@
           <p:cNvPr id="2" name="TextBox 45">
             <a:extLst>
               <a:ext uri="{FF2B5EF4-FFF2-40B4-BE49-F238E27FC236}">
-                <a16:creationId xmlns="" xmlns:a16="http://schemas.microsoft.com/office/drawing/2014/main" id="{6BDA7693-CA76-4C97-8FED-A4A65AB5032B}"/>
+                <a16:creationId xmlns:a16="http://schemas.microsoft.com/office/drawing/2014/main" xmlns="" id="{6BDA7693-CA76-4C97-8FED-A4A65AB5032B}"/>
               </a:ext>
             </a:extLst>
           </p:cNvPr>
@@ -26332,7 +26333,7 @@
           <p:cNvPr id="26" name="TextBox 45">
             <a:extLst>
               <a:ext uri="{FF2B5EF4-FFF2-40B4-BE49-F238E27FC236}">
-                <a16:creationId xmlns="" xmlns:a16="http://schemas.microsoft.com/office/drawing/2014/main" id="{6BDA7693-CA76-4C97-8FED-A4A65AB5032B}"/>
+                <a16:creationId xmlns:a16="http://schemas.microsoft.com/office/drawing/2014/main" xmlns="" id="{6BDA7693-CA76-4C97-8FED-A4A65AB5032B}"/>
               </a:ext>
             </a:extLst>
           </p:cNvPr>
@@ -26448,7 +26449,7 @@
           <p:cNvPr id="32" name="TextBox 45">
             <a:extLst>
               <a:ext uri="{FF2B5EF4-FFF2-40B4-BE49-F238E27FC236}">
-                <a16:creationId xmlns="" xmlns:a16="http://schemas.microsoft.com/office/drawing/2014/main" id="{6BDA7693-CA76-4C97-8FED-A4A65AB5032B}"/>
+                <a16:creationId xmlns:a16="http://schemas.microsoft.com/office/drawing/2014/main" xmlns="" id="{6BDA7693-CA76-4C97-8FED-A4A65AB5032B}"/>
               </a:ext>
             </a:extLst>
           </p:cNvPr>
@@ -27011,7 +27012,7 @@
           <p:cNvPr id="48" name="TextBox 45">
             <a:extLst>
               <a:ext uri="{FF2B5EF4-FFF2-40B4-BE49-F238E27FC236}">
-                <a16:creationId xmlns="" xmlns:a16="http://schemas.microsoft.com/office/drawing/2014/main" id="{6BDA7693-CA76-4C97-8FED-A4A65AB5032B}"/>
+                <a16:creationId xmlns:a16="http://schemas.microsoft.com/office/drawing/2014/main" xmlns="" id="{6BDA7693-CA76-4C97-8FED-A4A65AB5032B}"/>
               </a:ext>
             </a:extLst>
           </p:cNvPr>
@@ -27101,7 +27102,7 @@
           <p:cNvPr id="49" name="TextBox 45">
             <a:extLst>
               <a:ext uri="{FF2B5EF4-FFF2-40B4-BE49-F238E27FC236}">
-                <a16:creationId xmlns="" xmlns:a16="http://schemas.microsoft.com/office/drawing/2014/main" id="{6BDA7693-CA76-4C97-8FED-A4A65AB5032B}"/>
+                <a16:creationId xmlns:a16="http://schemas.microsoft.com/office/drawing/2014/main" xmlns="" id="{6BDA7693-CA76-4C97-8FED-A4A65AB5032B}"/>
               </a:ext>
             </a:extLst>
           </p:cNvPr>
@@ -27270,7 +27271,7 @@
           <p:cNvPr id="2" name="TextBox 45">
             <a:extLst>
               <a:ext uri="{FF2B5EF4-FFF2-40B4-BE49-F238E27FC236}">
-                <a16:creationId xmlns="" xmlns:a16="http://schemas.microsoft.com/office/drawing/2014/main" id="{6BDA7693-CA76-4C97-8FED-A4A65AB5032B}"/>
+                <a16:creationId xmlns:a16="http://schemas.microsoft.com/office/drawing/2014/main" xmlns="" id="{6BDA7693-CA76-4C97-8FED-A4A65AB5032B}"/>
               </a:ext>
             </a:extLst>
           </p:cNvPr>
@@ -28042,7 +28043,7 @@
           <p:cNvPr id="23" name="TextBox 45">
             <a:extLst>
               <a:ext uri="{FF2B5EF4-FFF2-40B4-BE49-F238E27FC236}">
-                <a16:creationId xmlns="" xmlns:a16="http://schemas.microsoft.com/office/drawing/2014/main" id="{6BDA7693-CA76-4C97-8FED-A4A65AB5032B}"/>
+                <a16:creationId xmlns:a16="http://schemas.microsoft.com/office/drawing/2014/main" xmlns="" id="{6BDA7693-CA76-4C97-8FED-A4A65AB5032B}"/>
               </a:ext>
             </a:extLst>
           </p:cNvPr>
@@ -37019,7 +37020,7 @@
           <p:cNvPr id="2" name="TextBox 45">
             <a:extLst>
               <a:ext uri="{FF2B5EF4-FFF2-40B4-BE49-F238E27FC236}">
-                <a16:creationId xmlns="" xmlns:a16="http://schemas.microsoft.com/office/drawing/2014/main" id="{6BDA7693-CA76-4C97-8FED-A4A65AB5032B}"/>
+                <a16:creationId xmlns:a16="http://schemas.microsoft.com/office/drawing/2014/main" xmlns="" id="{6BDA7693-CA76-4C97-8FED-A4A65AB5032B}"/>
               </a:ext>
             </a:extLst>
           </p:cNvPr>
@@ -37958,7 +37959,7 @@
           <p:cNvPr id="114" name="TextBox 45">
             <a:extLst>
               <a:ext uri="{FF2B5EF4-FFF2-40B4-BE49-F238E27FC236}">
-                <a16:creationId xmlns="" xmlns:a16="http://schemas.microsoft.com/office/drawing/2014/main" id="{6BDA7693-CA76-4C97-8FED-A4A65AB5032B}"/>
+                <a16:creationId xmlns:a16="http://schemas.microsoft.com/office/drawing/2014/main" xmlns="" id="{6BDA7693-CA76-4C97-8FED-A4A65AB5032B}"/>
               </a:ext>
             </a:extLst>
           </p:cNvPr>
@@ -39105,7 +39106,7 @@
           <p:cNvPr id="2" name="TextBox 45">
             <a:extLst>
               <a:ext uri="{FF2B5EF4-FFF2-40B4-BE49-F238E27FC236}">
-                <a16:creationId xmlns="" xmlns:a16="http://schemas.microsoft.com/office/drawing/2014/main" id="{6BDA7693-CA76-4C97-8FED-A4A65AB5032B}"/>
+                <a16:creationId xmlns:a16="http://schemas.microsoft.com/office/drawing/2014/main" xmlns="" id="{6BDA7693-CA76-4C97-8FED-A4A65AB5032B}"/>
               </a:ext>
             </a:extLst>
           </p:cNvPr>
@@ -46782,7 +46783,7 @@
           <p:cNvPr id="51" name="TextBox 50">
             <a:extLst>
               <a:ext uri="{FF2B5EF4-FFF2-40B4-BE49-F238E27FC236}">
-                <a16:creationId xmlns="" xmlns:a16="http://schemas.microsoft.com/office/drawing/2014/main" id="{38D92C47-6A24-433B-A9D7-48400DFBEE88}"/>
+                <a16:creationId xmlns:a16="http://schemas.microsoft.com/office/drawing/2014/main" xmlns="" id="{38D92C47-6A24-433B-A9D7-48400DFBEE88}"/>
               </a:ext>
             </a:extLst>
           </p:cNvPr>
@@ -46823,7 +46824,7 @@
           <p:cNvPr id="52" name="TextBox 51">
             <a:extLst>
               <a:ext uri="{FF2B5EF4-FFF2-40B4-BE49-F238E27FC236}">
-                <a16:creationId xmlns="" xmlns:a16="http://schemas.microsoft.com/office/drawing/2014/main" id="{46370455-EDDE-4BAF-A68F-1E721D22CFA3}"/>
+                <a16:creationId xmlns:a16="http://schemas.microsoft.com/office/drawing/2014/main" xmlns="" id="{46370455-EDDE-4BAF-A68F-1E721D22CFA3}"/>
               </a:ext>
             </a:extLst>
           </p:cNvPr>
@@ -46864,7 +46865,7 @@
           <p:cNvPr id="54" name="TextBox 53">
             <a:extLst>
               <a:ext uri="{FF2B5EF4-FFF2-40B4-BE49-F238E27FC236}">
-                <a16:creationId xmlns="" xmlns:a16="http://schemas.microsoft.com/office/drawing/2014/main" id="{1F0BD362-AB28-4ABC-B01D-E5FB51A4284F}"/>
+                <a16:creationId xmlns:a16="http://schemas.microsoft.com/office/drawing/2014/main" xmlns="" id="{1F0BD362-AB28-4ABC-B01D-E5FB51A4284F}"/>
               </a:ext>
             </a:extLst>
           </p:cNvPr>
@@ -46899,7 +46900,7 @@
           <p:cNvPr id="55" name="TextBox 54">
             <a:extLst>
               <a:ext uri="{FF2B5EF4-FFF2-40B4-BE49-F238E27FC236}">
-                <a16:creationId xmlns="" xmlns:a16="http://schemas.microsoft.com/office/drawing/2014/main" id="{66A6D040-E92F-405E-8F1C-224FD73DEB6A}"/>
+                <a16:creationId xmlns:a16="http://schemas.microsoft.com/office/drawing/2014/main" xmlns="" id="{66A6D040-E92F-405E-8F1C-224FD73DEB6A}"/>
               </a:ext>
             </a:extLst>
           </p:cNvPr>
@@ -46940,7 +46941,7 @@
           <p:cNvPr id="59" name="TextBox 58">
             <a:extLst>
               <a:ext uri="{FF2B5EF4-FFF2-40B4-BE49-F238E27FC236}">
-                <a16:creationId xmlns="" xmlns:a16="http://schemas.microsoft.com/office/drawing/2014/main" id="{8B737B46-BF72-4F50-880F-A81417342B9C}"/>
+                <a16:creationId xmlns:a16="http://schemas.microsoft.com/office/drawing/2014/main" xmlns="" id="{8B737B46-BF72-4F50-880F-A81417342B9C}"/>
               </a:ext>
             </a:extLst>
           </p:cNvPr>
@@ -46981,7 +46982,7 @@
           <p:cNvPr id="60" name="TextBox 59">
             <a:extLst>
               <a:ext uri="{FF2B5EF4-FFF2-40B4-BE49-F238E27FC236}">
-                <a16:creationId xmlns="" xmlns:a16="http://schemas.microsoft.com/office/drawing/2014/main" id="{635E5AB3-11BB-4188-A9F5-6624D8487908}"/>
+                <a16:creationId xmlns:a16="http://schemas.microsoft.com/office/drawing/2014/main" xmlns="" id="{635E5AB3-11BB-4188-A9F5-6624D8487908}"/>
               </a:ext>
             </a:extLst>
           </p:cNvPr>
@@ -47826,11 +47827,7 @@
           <a:p>
             <a:r>
               <a:rPr lang="en-GB" sz="1400" dirty="0" smtClean="0"/>
-              <a:t>import(Patient </a:t>
-            </a:r>
-            <a:r>
-              <a:rPr lang="en-GB" sz="1400" dirty="0" smtClean="0"/>
-              <a:t>String  </a:t>
+              <a:t>import(Patient String  </a:t>
             </a:r>
             <a:r>
               <a:rPr lang="en-GB" sz="1400" dirty="0" err="1" smtClean="0"/>
@@ -49505,7 +49502,6 @@
               <a:rPr lang="en-GB" dirty="0"/>
               <a:t>ITEL-FHIR</a:t>
             </a:r>
-            <a:endParaRPr lang="en-GB" dirty="0"/>
           </a:p>
         </p:txBody>
       </p:sp>
@@ -49586,6 +49582,36 @@
     <p:extLst>
       <p:ext uri="{BB962C8B-B14F-4D97-AF65-F5344CB8AC3E}">
         <p14:creationId xmlns:p14="http://schemas.microsoft.com/office/powerpoint/2010/main" val="957851576"/>
+      </p:ext>
+    </p:extLst>
+  </p:cSld>
+  <p:clrMapOvr>
+    <a:masterClrMapping/>
+  </p:clrMapOvr>
+</p:sld>
+</file>
+
+<file path=ppt/slides/slide41.xml><?xml version="1.0" encoding="utf-8"?>
+<p:sld xmlns:a="http://schemas.openxmlformats.org/drawingml/2006/main" xmlns:r="http://schemas.openxmlformats.org/officeDocument/2006/relationships" xmlns:p="http://schemas.openxmlformats.org/presentationml/2006/main">
+  <p:cSld>
+    <p:spTree>
+      <p:nvGrpSpPr>
+        <p:cNvPr id="1" name=""/>
+        <p:cNvGrpSpPr/>
+        <p:nvPr/>
+      </p:nvGrpSpPr>
+      <p:grpSpPr>
+        <a:xfrm>
+          <a:off x="0" y="0"/>
+          <a:ext cx="0" cy="0"/>
+          <a:chOff x="0" y="0"/>
+          <a:chExt cx="0" cy="0"/>
+        </a:xfrm>
+      </p:grpSpPr>
+    </p:spTree>
+    <p:extLst>
+      <p:ext uri="{BB962C8B-B14F-4D97-AF65-F5344CB8AC3E}">
+        <p14:creationId xmlns:p14="http://schemas.microsoft.com/office/powerpoint/2010/main" val="2122436077"/>
       </p:ext>
     </p:extLst>
   </p:cSld>
@@ -51613,7 +51639,7 @@
           <p:cNvPr id="43" name="TextBox 42">
             <a:extLst>
               <a:ext uri="{FF2B5EF4-FFF2-40B4-BE49-F238E27FC236}">
-                <a16:creationId xmlns="" xmlns:a16="http://schemas.microsoft.com/office/drawing/2014/main" id="{C66D85E0-1A23-448C-9466-6DADEA26156A}"/>
+                <a16:creationId xmlns:a16="http://schemas.microsoft.com/office/drawing/2014/main" xmlns="" id="{C66D85E0-1A23-448C-9466-6DADEA26156A}"/>
               </a:ext>
             </a:extLst>
           </p:cNvPr>
@@ -51654,7 +51680,7 @@
           <p:cNvPr id="44" name="TextBox 43">
             <a:extLst>
               <a:ext uri="{FF2B5EF4-FFF2-40B4-BE49-F238E27FC236}">
-                <a16:creationId xmlns="" xmlns:a16="http://schemas.microsoft.com/office/drawing/2014/main" id="{73BB0B6F-DBD2-4682-88DA-A68E1C43C8EE}"/>
+                <a16:creationId xmlns:a16="http://schemas.microsoft.com/office/drawing/2014/main" xmlns="" id="{73BB0B6F-DBD2-4682-88DA-A68E1C43C8EE}"/>
               </a:ext>
             </a:extLst>
           </p:cNvPr>
@@ -51695,7 +51721,7 @@
           <p:cNvPr id="45" name="TextBox 44">
             <a:extLst>
               <a:ext uri="{FF2B5EF4-FFF2-40B4-BE49-F238E27FC236}">
-                <a16:creationId xmlns="" xmlns:a16="http://schemas.microsoft.com/office/drawing/2014/main" id="{06BB9D57-20AB-4911-8F91-1EAAD2C3D635}"/>
+                <a16:creationId xmlns:a16="http://schemas.microsoft.com/office/drawing/2014/main" xmlns="" id="{06BB9D57-20AB-4911-8F91-1EAAD2C3D635}"/>
               </a:ext>
             </a:extLst>
           </p:cNvPr>
@@ -51730,7 +51756,7 @@
           <p:cNvPr id="46" name="TextBox 45">
             <a:extLst>
               <a:ext uri="{FF2B5EF4-FFF2-40B4-BE49-F238E27FC236}">
-                <a16:creationId xmlns="" xmlns:a16="http://schemas.microsoft.com/office/drawing/2014/main" id="{6BDA7693-CA76-4C97-8FED-A4A65AB5032B}"/>
+                <a16:creationId xmlns:a16="http://schemas.microsoft.com/office/drawing/2014/main" xmlns="" id="{6BDA7693-CA76-4C97-8FED-A4A65AB5032B}"/>
               </a:ext>
             </a:extLst>
           </p:cNvPr>
@@ -51771,7 +51797,7 @@
           <p:cNvPr id="47" name="TextBox 46">
             <a:extLst>
               <a:ext uri="{FF2B5EF4-FFF2-40B4-BE49-F238E27FC236}">
-                <a16:creationId xmlns="" xmlns:a16="http://schemas.microsoft.com/office/drawing/2014/main" id="{F3FF60E3-5733-4A51-BB64-B5D227CFB6FE}"/>
+                <a16:creationId xmlns:a16="http://schemas.microsoft.com/office/drawing/2014/main" xmlns="" id="{F3FF60E3-5733-4A51-BB64-B5D227CFB6FE}"/>
               </a:ext>
             </a:extLst>
           </p:cNvPr>
@@ -51812,7 +51838,7 @@
           <p:cNvPr id="48" name="TextBox 47">
             <a:extLst>
               <a:ext uri="{FF2B5EF4-FFF2-40B4-BE49-F238E27FC236}">
-                <a16:creationId xmlns="" xmlns:a16="http://schemas.microsoft.com/office/drawing/2014/main" id="{6CFBFA02-2444-480B-B78F-A1A7AD55973E}"/>
+                <a16:creationId xmlns:a16="http://schemas.microsoft.com/office/drawing/2014/main" xmlns="" id="{6CFBFA02-2444-480B-B78F-A1A7AD55973E}"/>
               </a:ext>
             </a:extLst>
           </p:cNvPr>
@@ -52603,7 +52629,7 @@
           <p:cNvPr id="12" name="TextBox 45">
             <a:extLst>
               <a:ext uri="{FF2B5EF4-FFF2-40B4-BE49-F238E27FC236}">
-                <a16:creationId xmlns="" xmlns:a16="http://schemas.microsoft.com/office/drawing/2014/main" id="{6BDA7693-CA76-4C97-8FED-A4A65AB5032B}"/>
+                <a16:creationId xmlns:a16="http://schemas.microsoft.com/office/drawing/2014/main" xmlns="" id="{6BDA7693-CA76-4C97-8FED-A4A65AB5032B}"/>
               </a:ext>
             </a:extLst>
           </p:cNvPr>
@@ -53281,7 +53307,7 @@
           <p:cNvPr id="33" name="TextBox 45">
             <a:extLst>
               <a:ext uri="{FF2B5EF4-FFF2-40B4-BE49-F238E27FC236}">
-                <a16:creationId xmlns="" xmlns:a16="http://schemas.microsoft.com/office/drawing/2014/main" id="{6BDA7693-CA76-4C97-8FED-A4A65AB5032B}"/>
+                <a16:creationId xmlns:a16="http://schemas.microsoft.com/office/drawing/2014/main" xmlns="" id="{6BDA7693-CA76-4C97-8FED-A4A65AB5032B}"/>
               </a:ext>
             </a:extLst>
           </p:cNvPr>
@@ -53317,7 +53343,7 @@
           <p:cNvPr id="34" name="TextBox 45">
             <a:extLst>
               <a:ext uri="{FF2B5EF4-FFF2-40B4-BE49-F238E27FC236}">
-                <a16:creationId xmlns="" xmlns:a16="http://schemas.microsoft.com/office/drawing/2014/main" id="{6BDA7693-CA76-4C97-8FED-A4A65AB5032B}"/>
+                <a16:creationId xmlns:a16="http://schemas.microsoft.com/office/drawing/2014/main" xmlns="" id="{6BDA7693-CA76-4C97-8FED-A4A65AB5032B}"/>
               </a:ext>
             </a:extLst>
           </p:cNvPr>
@@ -53727,7 +53753,7 @@
           <p:cNvPr id="52" name="TextBox 45">
             <a:extLst>
               <a:ext uri="{FF2B5EF4-FFF2-40B4-BE49-F238E27FC236}">
-                <a16:creationId xmlns="" xmlns:a16="http://schemas.microsoft.com/office/drawing/2014/main" id="{6BDA7693-CA76-4C97-8FED-A4A65AB5032B}"/>
+                <a16:creationId xmlns:a16="http://schemas.microsoft.com/office/drawing/2014/main" xmlns="" id="{6BDA7693-CA76-4C97-8FED-A4A65AB5032B}"/>
               </a:ext>
             </a:extLst>
           </p:cNvPr>

</xml_diff>